<commit_message>
Final work on project, getting correlation map and county covid map.
</commit_message>
<xml_diff>
--- a/Presentation/CovidProjectPresentation.pptx
+++ b/Presentation/CovidProjectPresentation.pptx
@@ -7,19 +7,23 @@
   <p:sldIdLst>
     <p:sldId id="256" r:id="rId2"/>
     <p:sldId id="257" r:id="rId3"/>
-    <p:sldId id="259" r:id="rId4"/>
-    <p:sldId id="258" r:id="rId5"/>
-    <p:sldId id="261" r:id="rId6"/>
-    <p:sldId id="265" r:id="rId7"/>
-    <p:sldId id="268" r:id="rId8"/>
-    <p:sldId id="267" r:id="rId9"/>
-    <p:sldId id="260" r:id="rId10"/>
-    <p:sldId id="264" r:id="rId11"/>
-    <p:sldId id="269" r:id="rId12"/>
-    <p:sldId id="262" r:id="rId13"/>
-    <p:sldId id="263" r:id="rId14"/>
-    <p:sldId id="266" r:id="rId15"/>
-    <p:sldId id="270" r:id="rId16"/>
+    <p:sldId id="272" r:id="rId4"/>
+    <p:sldId id="265" r:id="rId5"/>
+    <p:sldId id="259" r:id="rId6"/>
+    <p:sldId id="258" r:id="rId7"/>
+    <p:sldId id="261" r:id="rId8"/>
+    <p:sldId id="268" r:id="rId9"/>
+    <p:sldId id="267" r:id="rId10"/>
+    <p:sldId id="274" r:id="rId11"/>
+    <p:sldId id="260" r:id="rId12"/>
+    <p:sldId id="273" r:id="rId13"/>
+    <p:sldId id="264" r:id="rId14"/>
+    <p:sldId id="271" r:id="rId15"/>
+    <p:sldId id="269" r:id="rId16"/>
+    <p:sldId id="262" r:id="rId17"/>
+    <p:sldId id="263" r:id="rId18"/>
+    <p:sldId id="266" r:id="rId19"/>
+    <p:sldId id="270" r:id="rId20"/>
   </p:sldIdLst>
   <p:sldSz cx="12192000" cy="6858000"/>
   <p:notesSz cx="6858000" cy="9144000"/>
@@ -3335,6 +3339,38 @@
           <a:chExt cx="0" cy="0"/>
         </a:xfrm>
       </p:grpSpPr>
+      <p:pic>
+        <p:nvPicPr>
+          <p:cNvPr id="5" name="Picture 4">
+            <a:extLst>
+              <a:ext uri="{FF2B5EF4-FFF2-40B4-BE49-F238E27FC236}">
+                <a16:creationId xmlns:a16="http://schemas.microsoft.com/office/drawing/2014/main" id="{CF896F0B-5D21-0B42-9A64-75AE197B705A}"/>
+              </a:ext>
+            </a:extLst>
+          </p:cNvPr>
+          <p:cNvPicPr>
+            <a:picLocks noChangeAspect="1"/>
+          </p:cNvPicPr>
+          <p:nvPr/>
+        </p:nvPicPr>
+        <p:blipFill>
+          <a:blip r:embed="rId2">
+            <a:alphaModFix amt="36000"/>
+          </a:blip>
+          <a:stretch>
+            <a:fillRect/>
+          </a:stretch>
+        </p:blipFill>
+        <p:spPr>
+          <a:xfrm>
+            <a:off x="677333" y="0"/>
+            <a:ext cx="10837333" cy="6858000"/>
+          </a:xfrm>
+          <a:prstGeom prst="rect">
+            <a:avLst/>
+          </a:prstGeom>
+        </p:spPr>
+      </p:pic>
       <p:sp>
         <p:nvSpPr>
           <p:cNvPr id="2" name="Title 1">
@@ -3351,30 +3387,28 @@
             <p:ph type="ctrTitle"/>
           </p:nvPr>
         </p:nvSpPr>
-        <p:spPr/>
+        <p:spPr>
+          <a:xfrm>
+            <a:off x="1524000" y="1704254"/>
+            <a:ext cx="9144000" cy="2387600"/>
+          </a:xfrm>
+        </p:spPr>
         <p:txBody>
           <a:bodyPr>
-            <a:normAutofit fontScale="90000"/>
+            <a:normAutofit/>
           </a:bodyPr>
           <a:lstStyle/>
           <a:p>
             <a:r>
               <a:rPr lang="en-US" dirty="0"/>
-              <a:t>Predicting US County </a:t>
+              <a:t>Predicting Covid-19 Deaths</a:t>
             </a:r>
             <a:br>
               <a:rPr lang="en-US" dirty="0"/>
             </a:br>
             <a:r>
               <a:rPr lang="en-US" dirty="0"/>
-              <a:t>Covid-19 Deaths</a:t>
-            </a:r>
-            <a:br>
-              <a:rPr lang="en-US" dirty="0"/>
-            </a:br>
-            <a:r>
-              <a:rPr lang="en-US" dirty="0"/>
-              <a:t>Using Census Data</a:t>
+              <a:t>at the US County Level</a:t>
             </a:r>
           </a:p>
         </p:txBody>
@@ -3395,7 +3429,12 @@
             <p:ph type="subTitle" idx="1"/>
           </p:nvPr>
         </p:nvSpPr>
-        <p:spPr/>
+        <p:spPr>
+          <a:xfrm>
+            <a:off x="1524000" y="4183929"/>
+            <a:ext cx="9144000" cy="1655762"/>
+          </a:xfrm>
+        </p:spPr>
         <p:txBody>
           <a:bodyPr/>
           <a:lstStyle/>
@@ -3443,63 +3482,130 @@
           <a:chExt cx="0" cy="0"/>
         </a:xfrm>
       </p:grpSpPr>
-      <p:sp>
-        <p:nvSpPr>
-          <p:cNvPr id="2" name="Title 1">
-            <a:extLst>
-              <a:ext uri="{FF2B5EF4-FFF2-40B4-BE49-F238E27FC236}">
-                <a16:creationId xmlns:a16="http://schemas.microsoft.com/office/drawing/2014/main" id="{546FD65D-CD88-7246-B80C-84452B604F54}"/>
-              </a:ext>
-            </a:extLst>
-          </p:cNvPr>
-          <p:cNvSpPr>
-            <a:spLocks noGrp="1"/>
-          </p:cNvSpPr>
-          <p:nvPr>
-            <p:ph type="title"/>
-          </p:nvPr>
-        </p:nvSpPr>
-        <p:spPr/>
-        <p:txBody>
-          <a:bodyPr/>
-          <a:lstStyle/>
-          <a:p>
-            <a:r>
-              <a:rPr lang="en-US" dirty="0"/>
-              <a:t>Appendix</a:t>
-            </a:r>
-          </a:p>
-        </p:txBody>
-      </p:sp>
-      <p:sp>
-        <p:nvSpPr>
-          <p:cNvPr id="3" name="Content Placeholder 2">
-            <a:extLst>
-              <a:ext uri="{FF2B5EF4-FFF2-40B4-BE49-F238E27FC236}">
-                <a16:creationId xmlns:a16="http://schemas.microsoft.com/office/drawing/2014/main" id="{F719B4F5-395D-6440-97CC-A2C4DBCB9469}"/>
-              </a:ext>
-            </a:extLst>
-          </p:cNvPr>
-          <p:cNvSpPr>
-            <a:spLocks noGrp="1"/>
-          </p:cNvSpPr>
-          <p:nvPr>
-            <p:ph idx="1"/>
-          </p:nvPr>
-        </p:nvSpPr>
-        <p:spPr/>
-        <p:txBody>
-          <a:bodyPr/>
-          <a:lstStyle/>
-          <a:p>
-            <a:endParaRPr lang="en-US"/>
-          </a:p>
-        </p:txBody>
-      </p:sp>
+      <p:pic>
+        <p:nvPicPr>
+          <p:cNvPr id="5" name="Picture 4">
+            <a:extLst>
+              <a:ext uri="{FF2B5EF4-FFF2-40B4-BE49-F238E27FC236}">
+                <a16:creationId xmlns:a16="http://schemas.microsoft.com/office/drawing/2014/main" id="{F501AEC5-2765-0A4C-B1F4-91170928E95B}"/>
+              </a:ext>
+            </a:extLst>
+          </p:cNvPr>
+          <p:cNvPicPr>
+            <a:picLocks noChangeAspect="1"/>
+          </p:cNvPicPr>
+          <p:nvPr/>
+        </p:nvPicPr>
+        <p:blipFill>
+          <a:blip r:embed="rId2"/>
+          <a:stretch>
+            <a:fillRect/>
+          </a:stretch>
+        </p:blipFill>
+        <p:spPr>
+          <a:xfrm>
+            <a:off x="1524000" y="2514600"/>
+            <a:ext cx="9144000" cy="1828800"/>
+          </a:xfrm>
+          <a:prstGeom prst="rect">
+            <a:avLst/>
+          </a:prstGeom>
+        </p:spPr>
+      </p:pic>
+      <p:pic>
+        <p:nvPicPr>
+          <p:cNvPr id="7" name="Picture 6">
+            <a:extLst>
+              <a:ext uri="{FF2B5EF4-FFF2-40B4-BE49-F238E27FC236}">
+                <a16:creationId xmlns:a16="http://schemas.microsoft.com/office/drawing/2014/main" id="{5E821FEE-68EC-AC4E-B379-8A6E8F3E0A9F}"/>
+              </a:ext>
+            </a:extLst>
+          </p:cNvPr>
+          <p:cNvPicPr>
+            <a:picLocks noChangeAspect="1"/>
+          </p:cNvPicPr>
+          <p:nvPr/>
+        </p:nvPicPr>
+        <p:blipFill>
+          <a:blip r:embed="rId3"/>
+          <a:stretch>
+            <a:fillRect/>
+          </a:stretch>
+        </p:blipFill>
+        <p:spPr>
+          <a:xfrm>
+            <a:off x="1674000" y="2664600"/>
+            <a:ext cx="9144000" cy="1828800"/>
+          </a:xfrm>
+          <a:prstGeom prst="rect">
+            <a:avLst/>
+          </a:prstGeom>
+        </p:spPr>
+      </p:pic>
+      <p:pic>
+        <p:nvPicPr>
+          <p:cNvPr id="9" name="Picture 8">
+            <a:extLst>
+              <a:ext uri="{FF2B5EF4-FFF2-40B4-BE49-F238E27FC236}">
+                <a16:creationId xmlns:a16="http://schemas.microsoft.com/office/drawing/2014/main" id="{CE47551E-DC50-0E4A-A2E8-CCF3A2AF0F7B}"/>
+              </a:ext>
+            </a:extLst>
+          </p:cNvPr>
+          <p:cNvPicPr>
+            <a:picLocks noChangeAspect="1"/>
+          </p:cNvPicPr>
+          <p:nvPr/>
+        </p:nvPicPr>
+        <p:blipFill>
+          <a:blip r:embed="rId4"/>
+          <a:stretch>
+            <a:fillRect/>
+          </a:stretch>
+        </p:blipFill>
+        <p:spPr>
+          <a:xfrm>
+            <a:off x="2586000" y="300000"/>
+            <a:ext cx="7620000" cy="6858000"/>
+          </a:xfrm>
+          <a:prstGeom prst="rect">
+            <a:avLst/>
+          </a:prstGeom>
+        </p:spPr>
+      </p:pic>
+      <p:pic>
+        <p:nvPicPr>
+          <p:cNvPr id="11" name="Picture 10">
+            <a:extLst>
+              <a:ext uri="{FF2B5EF4-FFF2-40B4-BE49-F238E27FC236}">
+                <a16:creationId xmlns:a16="http://schemas.microsoft.com/office/drawing/2014/main" id="{0098160C-A7E8-8A48-ACB5-AA4786E78C59}"/>
+              </a:ext>
+            </a:extLst>
+          </p:cNvPr>
+          <p:cNvPicPr>
+            <a:picLocks noChangeAspect="1"/>
+          </p:cNvPicPr>
+          <p:nvPr/>
+        </p:nvPicPr>
+        <p:blipFill>
+          <a:blip r:embed="rId5"/>
+          <a:stretch>
+            <a:fillRect/>
+          </a:stretch>
+        </p:blipFill>
+        <p:spPr>
+          <a:xfrm>
+            <a:off x="2736000" y="450000"/>
+            <a:ext cx="7620000" cy="6858000"/>
+          </a:xfrm>
+          <a:prstGeom prst="rect">
+            <a:avLst/>
+          </a:prstGeom>
+        </p:spPr>
+      </p:pic>
     </p:spTree>
     <p:extLst>
       <p:ext uri="{BB962C8B-B14F-4D97-AF65-F5344CB8AC3E}">
-        <p14:creationId xmlns:p14="http://schemas.microsoft.com/office/powerpoint/2010/main" val="1111206884"/>
+        <p14:creationId xmlns:p14="http://schemas.microsoft.com/office/powerpoint/2010/main" val="2365396721"/>
       </p:ext>
     </p:extLst>
   </p:cSld>
@@ -3526,114 +3632,129 @@
           <a:chExt cx="0" cy="0"/>
         </a:xfrm>
       </p:grpSpPr>
-      <p:sp>
-        <p:nvSpPr>
-          <p:cNvPr id="2" name="Title 1">
-            <a:extLst>
-              <a:ext uri="{FF2B5EF4-FFF2-40B4-BE49-F238E27FC236}">
-                <a16:creationId xmlns:a16="http://schemas.microsoft.com/office/drawing/2014/main" id="{A9EF4D6B-D225-1947-BF09-F62D8B7A6C0A}"/>
-              </a:ext>
-            </a:extLst>
-          </p:cNvPr>
-          <p:cNvSpPr>
-            <a:spLocks noGrp="1"/>
-          </p:cNvSpPr>
-          <p:nvPr>
-            <p:ph type="title"/>
-          </p:nvPr>
-        </p:nvSpPr>
-        <p:spPr/>
-        <p:txBody>
-          <a:bodyPr/>
-          <a:lstStyle/>
-          <a:p>
-            <a:r>
-              <a:rPr lang="en-US" dirty="0"/>
-              <a:t>Model progression (on training data)</a:t>
-            </a:r>
-          </a:p>
-        </p:txBody>
-      </p:sp>
-      <p:sp>
-        <p:nvSpPr>
-          <p:cNvPr id="3" name="Content Placeholder 2">
-            <a:extLst>
-              <a:ext uri="{FF2B5EF4-FFF2-40B4-BE49-F238E27FC236}">
-                <a16:creationId xmlns:a16="http://schemas.microsoft.com/office/drawing/2014/main" id="{1ED42D3F-B8B0-8F49-96CE-9510E2F829C2}"/>
-              </a:ext>
-            </a:extLst>
-          </p:cNvPr>
-          <p:cNvSpPr>
-            <a:spLocks noGrp="1"/>
-          </p:cNvSpPr>
-          <p:nvPr>
-            <p:ph idx="1"/>
-          </p:nvPr>
-        </p:nvSpPr>
-        <p:spPr/>
-        <p:txBody>
-          <a:bodyPr/>
-          <a:lstStyle/>
-          <a:p>
-            <a:r>
-              <a:rPr lang="en-US" dirty="0"/>
-              <a:t>~0.1 with simple linear regression using most correlated features</a:t>
-            </a:r>
-          </a:p>
-          <a:p>
-            <a:r>
-              <a:rPr lang="en-US" dirty="0"/>
-              <a:t>~0.2 after reducing features manually</a:t>
-            </a:r>
-          </a:p>
-          <a:p>
-            <a:r>
-              <a:rPr lang="en-US" dirty="0"/>
-              <a:t>~0.27 after Box-Cox transform of target</a:t>
-            </a:r>
-          </a:p>
-          <a:p>
-            <a:r>
-              <a:rPr lang="en-US" dirty="0"/>
-              <a:t>~0.315 after poly transform of features</a:t>
-            </a:r>
-          </a:p>
-          <a:p>
-            <a:r>
-              <a:rPr lang="en-US" dirty="0"/>
-              <a:t>~0.36 using Lasso on poly features</a:t>
-            </a:r>
-          </a:p>
-          <a:p>
-            <a:endParaRPr lang="en-US" dirty="0"/>
-          </a:p>
-          <a:p>
-            <a:pPr marL="0" indent="0">
-              <a:buNone/>
+      <p:pic>
+        <p:nvPicPr>
+          <p:cNvPr id="34" name="Picture 33">
+            <a:extLst>
+              <a:ext uri="{FF2B5EF4-FFF2-40B4-BE49-F238E27FC236}">
+                <a16:creationId xmlns:a16="http://schemas.microsoft.com/office/drawing/2014/main" id="{82A06525-FFD1-2242-A2D0-6343B61E2716}"/>
+              </a:ext>
+            </a:extLst>
+          </p:cNvPr>
+          <p:cNvPicPr>
+            <a:picLocks noChangeAspect="1"/>
+          </p:cNvPicPr>
+          <p:nvPr/>
+        </p:nvPicPr>
+        <p:blipFill>
+          <a:blip r:embed="rId2"/>
+          <a:stretch>
+            <a:fillRect/>
+          </a:stretch>
+        </p:blipFill>
+        <p:spPr>
+          <a:xfrm>
+            <a:off x="6109854" y="623454"/>
+            <a:ext cx="6248400" cy="3124200"/>
+          </a:xfrm>
+          <a:prstGeom prst="rect">
+            <a:avLst/>
+          </a:prstGeom>
+        </p:spPr>
+      </p:pic>
+      <p:pic>
+        <p:nvPicPr>
+          <p:cNvPr id="35" name="Picture 34">
+            <a:extLst>
+              <a:ext uri="{FF2B5EF4-FFF2-40B4-BE49-F238E27FC236}">
+                <a16:creationId xmlns:a16="http://schemas.microsoft.com/office/drawing/2014/main" id="{DF29A3C1-D6C5-B94C-8FF5-43D7BF9D2107}"/>
+              </a:ext>
+            </a:extLst>
+          </p:cNvPr>
+          <p:cNvPicPr>
+            <a:picLocks noChangeAspect="1"/>
+          </p:cNvPicPr>
+          <p:nvPr/>
+        </p:nvPicPr>
+        <p:blipFill>
+          <a:blip r:embed="rId3"/>
+          <a:stretch>
+            <a:fillRect/>
+          </a:stretch>
+        </p:blipFill>
+        <p:spPr>
+          <a:xfrm>
+            <a:off x="277091" y="256309"/>
+            <a:ext cx="6400800" cy="6400800"/>
+          </a:xfrm>
+          <a:prstGeom prst="rect">
+            <a:avLst/>
+          </a:prstGeom>
+        </p:spPr>
+      </p:pic>
+      <p:sp>
+        <p:nvSpPr>
+          <p:cNvPr id="36" name="TextBox 35">
+            <a:extLst>
+              <a:ext uri="{FF2B5EF4-FFF2-40B4-BE49-F238E27FC236}">
+                <a16:creationId xmlns:a16="http://schemas.microsoft.com/office/drawing/2014/main" id="{E6C0960E-09E1-8A4E-80A8-C8F6B9365351}"/>
+              </a:ext>
+            </a:extLst>
+          </p:cNvPr>
+          <p:cNvSpPr txBox="1"/>
+          <p:nvPr/>
+        </p:nvSpPr>
+        <p:spPr>
+          <a:xfrm>
+            <a:off x="6677891" y="4114799"/>
+            <a:ext cx="5112327" cy="2462213"/>
+          </a:xfrm>
+          <a:prstGeom prst="rect">
+            <a:avLst/>
+          </a:prstGeom>
+          <a:noFill/>
+        </p:spPr>
+        <p:txBody>
+          <a:bodyPr wrap="square" rtlCol="0">
+            <a:spAutoFit/>
+          </a:bodyPr>
+          <a:lstStyle/>
+          <a:p>
+            <a:pPr marL="285750" indent="-285750">
+              <a:buFont typeface="Arial" panose="020B0604020202020204" pitchFamily="34" charset="0"/>
+              <a:buChar char="•"/>
             </a:pPr>
             <a:r>
-              <a:rPr lang="en-US" dirty="0"/>
-              <a:t>Ridge and Lasso were basically equivalent</a:t>
-            </a:r>
-          </a:p>
-          <a:p>
-            <a:pPr marL="0" indent="0">
-              <a:buNone/>
+              <a:rPr lang="en-US" sz="2200" dirty="0"/>
+              <a:t>Residuals are relatively happy</a:t>
+            </a:r>
+          </a:p>
+          <a:p>
+            <a:pPr marL="285750" indent="-285750">
+              <a:buFont typeface="Arial" panose="020B0604020202020204" pitchFamily="34" charset="0"/>
+              <a:buChar char="•"/>
             </a:pPr>
             <a:r>
-              <a:rPr lang="en-US" dirty="0"/>
-              <a:t>I chose Lasso because it zeroed out a good amount of the poly features</a:t>
-            </a:r>
-          </a:p>
-          <a:p>
-            <a:endParaRPr lang="en-US" dirty="0"/>
+              <a:rPr lang="en-US" sz="2200" dirty="0"/>
+              <a:t>The predicted vs actual plot shows that my model tends to overestimate the number of deaths</a:t>
+            </a:r>
+          </a:p>
+          <a:p>
+            <a:pPr marL="285750" indent="-285750">
+              <a:buFont typeface="Arial" panose="020B0604020202020204" pitchFamily="34" charset="0"/>
+              <a:buChar char="•"/>
+            </a:pPr>
+            <a:r>
+              <a:rPr lang="en-US" sz="2200" dirty="0"/>
+              <a:t>Ultimately, the explained variance would need to be improved for the model to be of any real use</a:t>
+            </a:r>
           </a:p>
         </p:txBody>
       </p:sp>
     </p:spTree>
     <p:extLst>
       <p:ext uri="{BB962C8B-B14F-4D97-AF65-F5344CB8AC3E}">
-        <p14:creationId xmlns:p14="http://schemas.microsoft.com/office/powerpoint/2010/main" val="1178381554"/>
+        <p14:creationId xmlns:p14="http://schemas.microsoft.com/office/powerpoint/2010/main" val="1775091389"/>
       </p:ext>
     </p:extLst>
   </p:cSld>
@@ -3660,130 +3781,76 @@
           <a:chExt cx="0" cy="0"/>
         </a:xfrm>
       </p:grpSpPr>
-      <p:pic>
-        <p:nvPicPr>
-          <p:cNvPr id="2" name="Picture 1">
-            <a:extLst>
-              <a:ext uri="{FF2B5EF4-FFF2-40B4-BE49-F238E27FC236}">
-                <a16:creationId xmlns:a16="http://schemas.microsoft.com/office/drawing/2014/main" id="{D7E046CB-B5A6-A64B-8FFA-27B229994121}"/>
-              </a:ext>
-            </a:extLst>
-          </p:cNvPr>
-          <p:cNvPicPr>
-            <a:picLocks noChangeAspect="1"/>
-          </p:cNvPicPr>
-          <p:nvPr/>
-        </p:nvPicPr>
-        <p:blipFill>
-          <a:blip r:embed="rId2"/>
-          <a:stretch>
-            <a:fillRect/>
-          </a:stretch>
-        </p:blipFill>
-        <p:spPr>
-          <a:xfrm>
-            <a:off x="487309" y="220990"/>
-            <a:ext cx="5486400" cy="3657600"/>
-          </a:xfrm>
-          <a:prstGeom prst="rect">
-            <a:avLst/>
-          </a:prstGeom>
-        </p:spPr>
-      </p:pic>
-      <p:pic>
-        <p:nvPicPr>
-          <p:cNvPr id="3" name="Picture 2">
-            <a:extLst>
-              <a:ext uri="{FF2B5EF4-FFF2-40B4-BE49-F238E27FC236}">
-                <a16:creationId xmlns:a16="http://schemas.microsoft.com/office/drawing/2014/main" id="{7D68DEE5-ECBF-AA49-A0B6-703DFF94EF24}"/>
-              </a:ext>
-            </a:extLst>
-          </p:cNvPr>
-          <p:cNvPicPr>
-            <a:picLocks noChangeAspect="1"/>
-          </p:cNvPicPr>
-          <p:nvPr/>
-        </p:nvPicPr>
-        <p:blipFill>
-          <a:blip r:embed="rId3"/>
-          <a:stretch>
-            <a:fillRect/>
-          </a:stretch>
-        </p:blipFill>
-        <p:spPr>
-          <a:xfrm>
-            <a:off x="5973709" y="0"/>
-            <a:ext cx="5486400" cy="3657600"/>
-          </a:xfrm>
-          <a:prstGeom prst="rect">
-            <a:avLst/>
-          </a:prstGeom>
-        </p:spPr>
-      </p:pic>
-      <p:pic>
-        <p:nvPicPr>
-          <p:cNvPr id="4" name="Picture 3">
-            <a:extLst>
-              <a:ext uri="{FF2B5EF4-FFF2-40B4-BE49-F238E27FC236}">
-                <a16:creationId xmlns:a16="http://schemas.microsoft.com/office/drawing/2014/main" id="{A7C447CE-EFDB-D748-9A41-78DF9B9E2BE0}"/>
-              </a:ext>
-            </a:extLst>
-          </p:cNvPr>
-          <p:cNvPicPr>
-            <a:picLocks noChangeAspect="1"/>
-          </p:cNvPicPr>
-          <p:nvPr/>
-        </p:nvPicPr>
-        <p:blipFill>
-          <a:blip r:embed="rId4"/>
-          <a:stretch>
-            <a:fillRect/>
-          </a:stretch>
-        </p:blipFill>
-        <p:spPr>
-          <a:xfrm>
-            <a:off x="5973709" y="2954344"/>
-            <a:ext cx="5486400" cy="3657600"/>
-          </a:xfrm>
-          <a:prstGeom prst="rect">
-            <a:avLst/>
-          </a:prstGeom>
-        </p:spPr>
-      </p:pic>
-      <p:pic>
-        <p:nvPicPr>
-          <p:cNvPr id="5" name="Picture 4">
-            <a:extLst>
-              <a:ext uri="{FF2B5EF4-FFF2-40B4-BE49-F238E27FC236}">
-                <a16:creationId xmlns:a16="http://schemas.microsoft.com/office/drawing/2014/main" id="{87C18726-1E54-3A4A-A839-BF67C7572739}"/>
-              </a:ext>
-            </a:extLst>
-          </p:cNvPr>
-          <p:cNvPicPr>
-            <a:picLocks noChangeAspect="1"/>
-          </p:cNvPicPr>
-          <p:nvPr/>
-        </p:nvPicPr>
-        <p:blipFill>
-          <a:blip r:embed="rId5"/>
-          <a:stretch>
-            <a:fillRect/>
-          </a:stretch>
-        </p:blipFill>
-        <p:spPr>
-          <a:xfrm>
-            <a:off x="487309" y="2954344"/>
-            <a:ext cx="5486400" cy="3657600"/>
-          </a:xfrm>
-          <a:prstGeom prst="rect">
-            <a:avLst/>
-          </a:prstGeom>
-        </p:spPr>
-      </p:pic>
+      <p:sp>
+        <p:nvSpPr>
+          <p:cNvPr id="2" name="Title 1">
+            <a:extLst>
+              <a:ext uri="{FF2B5EF4-FFF2-40B4-BE49-F238E27FC236}">
+                <a16:creationId xmlns:a16="http://schemas.microsoft.com/office/drawing/2014/main" id="{11E43953-8BE2-1A43-9915-E90E1B2EB714}"/>
+              </a:ext>
+            </a:extLst>
+          </p:cNvPr>
+          <p:cNvSpPr>
+            <a:spLocks noGrp="1"/>
+          </p:cNvSpPr>
+          <p:nvPr>
+            <p:ph type="title"/>
+          </p:nvPr>
+        </p:nvSpPr>
+        <p:spPr/>
+        <p:txBody>
+          <a:bodyPr/>
+          <a:lstStyle/>
+          <a:p>
+            <a:r>
+              <a:rPr lang="en-US" dirty="0"/>
+              <a:t>Future Work</a:t>
+            </a:r>
+          </a:p>
+        </p:txBody>
+      </p:sp>
+      <p:sp>
+        <p:nvSpPr>
+          <p:cNvPr id="3" name="Content Placeholder 2">
+            <a:extLst>
+              <a:ext uri="{FF2B5EF4-FFF2-40B4-BE49-F238E27FC236}">
+                <a16:creationId xmlns:a16="http://schemas.microsoft.com/office/drawing/2014/main" id="{43F28E92-F331-984E-948B-0CE1EC37FF98}"/>
+              </a:ext>
+            </a:extLst>
+          </p:cNvPr>
+          <p:cNvSpPr>
+            <a:spLocks noGrp="1"/>
+          </p:cNvSpPr>
+          <p:nvPr>
+            <p:ph idx="1"/>
+          </p:nvPr>
+        </p:nvSpPr>
+        <p:spPr/>
+        <p:txBody>
+          <a:bodyPr/>
+          <a:lstStyle/>
+          <a:p>
+            <a:r>
+              <a:rPr lang="en-US" dirty="0"/>
+              <a:t>Other features could be included to improve the model</a:t>
+            </a:r>
+          </a:p>
+          <a:p>
+            <a:pPr lvl="1"/>
+            <a:r>
+              <a:rPr lang="en-US" dirty="0"/>
+              <a:t>More healthcare related statistics</a:t>
+            </a:r>
+          </a:p>
+          <a:p>
+            <a:endParaRPr lang="en-US" dirty="0"/>
+          </a:p>
+        </p:txBody>
+      </p:sp>
     </p:spTree>
     <p:extLst>
       <p:ext uri="{BB962C8B-B14F-4D97-AF65-F5344CB8AC3E}">
-        <p14:creationId xmlns:p14="http://schemas.microsoft.com/office/powerpoint/2010/main" val="3761961825"/>
+        <p14:creationId xmlns:p14="http://schemas.microsoft.com/office/powerpoint/2010/main" val="1829879884"/>
       </p:ext>
     </p:extLst>
   </p:cSld>
@@ -3810,70 +3877,63 @@
           <a:chExt cx="0" cy="0"/>
         </a:xfrm>
       </p:grpSpPr>
-      <p:pic>
-        <p:nvPicPr>
-          <p:cNvPr id="2" name="Picture 1">
-            <a:extLst>
-              <a:ext uri="{FF2B5EF4-FFF2-40B4-BE49-F238E27FC236}">
-                <a16:creationId xmlns:a16="http://schemas.microsoft.com/office/drawing/2014/main" id="{466CE6E6-EB1C-2348-A58E-28407FDBF295}"/>
-              </a:ext>
-            </a:extLst>
-          </p:cNvPr>
-          <p:cNvPicPr>
-            <a:picLocks noChangeAspect="1"/>
-          </p:cNvPicPr>
-          <p:nvPr/>
-        </p:nvPicPr>
-        <p:blipFill>
-          <a:blip r:embed="rId2"/>
-          <a:stretch>
-            <a:fillRect/>
-          </a:stretch>
-        </p:blipFill>
-        <p:spPr>
-          <a:xfrm>
-            <a:off x="1674000" y="3200400"/>
-            <a:ext cx="5486400" cy="3657600"/>
-          </a:xfrm>
-          <a:prstGeom prst="rect">
-            <a:avLst/>
-          </a:prstGeom>
-        </p:spPr>
-      </p:pic>
-      <p:pic>
-        <p:nvPicPr>
-          <p:cNvPr id="3" name="Picture 2">
-            <a:extLst>
-              <a:ext uri="{FF2B5EF4-FFF2-40B4-BE49-F238E27FC236}">
-                <a16:creationId xmlns:a16="http://schemas.microsoft.com/office/drawing/2014/main" id="{53C632F4-70B0-FF49-AF7C-C5950C8CB650}"/>
-              </a:ext>
-            </a:extLst>
-          </p:cNvPr>
-          <p:cNvPicPr>
-            <a:picLocks noChangeAspect="1"/>
-          </p:cNvPicPr>
-          <p:nvPr/>
-        </p:nvPicPr>
-        <p:blipFill>
-          <a:blip r:embed="rId3"/>
-          <a:stretch>
-            <a:fillRect/>
-          </a:stretch>
-        </p:blipFill>
-        <p:spPr>
-          <a:xfrm>
-            <a:off x="8005527" y="516326"/>
-            <a:ext cx="5486400" cy="3657600"/>
-          </a:xfrm>
-          <a:prstGeom prst="rect">
-            <a:avLst/>
-          </a:prstGeom>
-        </p:spPr>
-      </p:pic>
+      <p:sp>
+        <p:nvSpPr>
+          <p:cNvPr id="2" name="Title 1">
+            <a:extLst>
+              <a:ext uri="{FF2B5EF4-FFF2-40B4-BE49-F238E27FC236}">
+                <a16:creationId xmlns:a16="http://schemas.microsoft.com/office/drawing/2014/main" id="{546FD65D-CD88-7246-B80C-84452B604F54}"/>
+              </a:ext>
+            </a:extLst>
+          </p:cNvPr>
+          <p:cNvSpPr>
+            <a:spLocks noGrp="1"/>
+          </p:cNvSpPr>
+          <p:nvPr>
+            <p:ph type="title"/>
+          </p:nvPr>
+        </p:nvSpPr>
+        <p:spPr/>
+        <p:txBody>
+          <a:bodyPr/>
+          <a:lstStyle/>
+          <a:p>
+            <a:r>
+              <a:rPr lang="en-US" dirty="0"/>
+              <a:t>Appendix</a:t>
+            </a:r>
+          </a:p>
+        </p:txBody>
+      </p:sp>
+      <p:sp>
+        <p:nvSpPr>
+          <p:cNvPr id="3" name="Content Placeholder 2">
+            <a:extLst>
+              <a:ext uri="{FF2B5EF4-FFF2-40B4-BE49-F238E27FC236}">
+                <a16:creationId xmlns:a16="http://schemas.microsoft.com/office/drawing/2014/main" id="{F719B4F5-395D-6440-97CC-A2C4DBCB9469}"/>
+              </a:ext>
+            </a:extLst>
+          </p:cNvPr>
+          <p:cNvSpPr>
+            <a:spLocks noGrp="1"/>
+          </p:cNvSpPr>
+          <p:nvPr>
+            <p:ph idx="1"/>
+          </p:nvPr>
+        </p:nvSpPr>
+        <p:spPr/>
+        <p:txBody>
+          <a:bodyPr/>
+          <a:lstStyle/>
+          <a:p>
+            <a:endParaRPr lang="en-US"/>
+          </a:p>
+        </p:txBody>
+      </p:sp>
     </p:spTree>
     <p:extLst>
       <p:ext uri="{BB962C8B-B14F-4D97-AF65-F5344CB8AC3E}">
-        <p14:creationId xmlns:p14="http://schemas.microsoft.com/office/powerpoint/2010/main" val="2008309720"/>
+        <p14:creationId xmlns:p14="http://schemas.microsoft.com/office/powerpoint/2010/main" val="1111206884"/>
       </p:ext>
     </p:extLst>
   </p:cSld>
@@ -3900,6 +3960,406 @@
           <a:chExt cx="0" cy="0"/>
         </a:xfrm>
       </p:grpSpPr>
+    </p:spTree>
+    <p:extLst>
+      <p:ext uri="{BB962C8B-B14F-4D97-AF65-F5344CB8AC3E}">
+        <p14:creationId xmlns:p14="http://schemas.microsoft.com/office/powerpoint/2010/main" val="193698195"/>
+      </p:ext>
+    </p:extLst>
+  </p:cSld>
+  <p:clrMapOvr>
+    <a:masterClrMapping/>
+  </p:clrMapOvr>
+</p:sld>
+</file>
+
+<file path=ppt/slides/slide15.xml><?xml version="1.0" encoding="utf-8"?>
+<p:sld xmlns:a="http://schemas.openxmlformats.org/drawingml/2006/main" xmlns:r="http://schemas.openxmlformats.org/officeDocument/2006/relationships" xmlns:p="http://schemas.openxmlformats.org/presentationml/2006/main">
+  <p:cSld>
+    <p:spTree>
+      <p:nvGrpSpPr>
+        <p:cNvPr id="1" name=""/>
+        <p:cNvGrpSpPr/>
+        <p:nvPr/>
+      </p:nvGrpSpPr>
+      <p:grpSpPr>
+        <a:xfrm>
+          <a:off x="0" y="0"/>
+          <a:ext cx="0" cy="0"/>
+          <a:chOff x="0" y="0"/>
+          <a:chExt cx="0" cy="0"/>
+        </a:xfrm>
+      </p:grpSpPr>
+      <p:sp>
+        <p:nvSpPr>
+          <p:cNvPr id="2" name="Title 1">
+            <a:extLst>
+              <a:ext uri="{FF2B5EF4-FFF2-40B4-BE49-F238E27FC236}">
+                <a16:creationId xmlns:a16="http://schemas.microsoft.com/office/drawing/2014/main" id="{A9EF4D6B-D225-1947-BF09-F62D8B7A6C0A}"/>
+              </a:ext>
+            </a:extLst>
+          </p:cNvPr>
+          <p:cNvSpPr>
+            <a:spLocks noGrp="1"/>
+          </p:cNvSpPr>
+          <p:nvPr>
+            <p:ph type="title"/>
+          </p:nvPr>
+        </p:nvSpPr>
+        <p:spPr/>
+        <p:txBody>
+          <a:bodyPr/>
+          <a:lstStyle/>
+          <a:p>
+            <a:r>
+              <a:rPr lang="en-US" dirty="0"/>
+              <a:t>Model progression (on training data)</a:t>
+            </a:r>
+          </a:p>
+        </p:txBody>
+      </p:sp>
+      <p:sp>
+        <p:nvSpPr>
+          <p:cNvPr id="3" name="Content Placeholder 2">
+            <a:extLst>
+              <a:ext uri="{FF2B5EF4-FFF2-40B4-BE49-F238E27FC236}">
+                <a16:creationId xmlns:a16="http://schemas.microsoft.com/office/drawing/2014/main" id="{1ED42D3F-B8B0-8F49-96CE-9510E2F829C2}"/>
+              </a:ext>
+            </a:extLst>
+          </p:cNvPr>
+          <p:cNvSpPr>
+            <a:spLocks noGrp="1"/>
+          </p:cNvSpPr>
+          <p:nvPr>
+            <p:ph idx="1"/>
+          </p:nvPr>
+        </p:nvSpPr>
+        <p:spPr/>
+        <p:txBody>
+          <a:bodyPr>
+            <a:normAutofit lnSpcReduction="10000"/>
+          </a:bodyPr>
+          <a:lstStyle/>
+          <a:p>
+            <a:r>
+              <a:rPr lang="en-US" dirty="0"/>
+              <a:t>~0.1 with simple linear regression using most correlated features</a:t>
+            </a:r>
+          </a:p>
+          <a:p>
+            <a:r>
+              <a:rPr lang="en-US" dirty="0"/>
+              <a:t>~0.2 after reducing features manually</a:t>
+            </a:r>
+          </a:p>
+          <a:p>
+            <a:r>
+              <a:rPr lang="en-US" dirty="0"/>
+              <a:t>~0.27 after Box-Cox transform of target</a:t>
+            </a:r>
+          </a:p>
+          <a:p>
+            <a:r>
+              <a:rPr lang="en-US" dirty="0"/>
+              <a:t>~0.315 after poly transform of features</a:t>
+            </a:r>
+          </a:p>
+          <a:p>
+            <a:r>
+              <a:rPr lang="en-US" dirty="0"/>
+              <a:t>~0.36 using Lasso on poly features</a:t>
+            </a:r>
+          </a:p>
+          <a:p>
+            <a:endParaRPr lang="en-US" dirty="0"/>
+          </a:p>
+          <a:p>
+            <a:r>
+              <a:rPr lang="en-US" dirty="0"/>
+              <a:t>Ridge and Lasso were basically equivalent</a:t>
+            </a:r>
+          </a:p>
+          <a:p>
+            <a:r>
+              <a:rPr lang="en-US" dirty="0"/>
+              <a:t>I chose Lasso because it zeroed out a good amount of the polynomial features</a:t>
+            </a:r>
+          </a:p>
+          <a:p>
+            <a:endParaRPr lang="en-US" dirty="0"/>
+          </a:p>
+        </p:txBody>
+      </p:sp>
+    </p:spTree>
+    <p:extLst>
+      <p:ext uri="{BB962C8B-B14F-4D97-AF65-F5344CB8AC3E}">
+        <p14:creationId xmlns:p14="http://schemas.microsoft.com/office/powerpoint/2010/main" val="1178381554"/>
+      </p:ext>
+    </p:extLst>
+  </p:cSld>
+  <p:clrMapOvr>
+    <a:masterClrMapping/>
+  </p:clrMapOvr>
+</p:sld>
+</file>
+
+<file path=ppt/slides/slide16.xml><?xml version="1.0" encoding="utf-8"?>
+<p:sld xmlns:a="http://schemas.openxmlformats.org/drawingml/2006/main" xmlns:r="http://schemas.openxmlformats.org/officeDocument/2006/relationships" xmlns:p="http://schemas.openxmlformats.org/presentationml/2006/main">
+  <p:cSld>
+    <p:spTree>
+      <p:nvGrpSpPr>
+        <p:cNvPr id="1" name=""/>
+        <p:cNvGrpSpPr/>
+        <p:nvPr/>
+      </p:nvGrpSpPr>
+      <p:grpSpPr>
+        <a:xfrm>
+          <a:off x="0" y="0"/>
+          <a:ext cx="0" cy="0"/>
+          <a:chOff x="0" y="0"/>
+          <a:chExt cx="0" cy="0"/>
+        </a:xfrm>
+      </p:grpSpPr>
+      <p:pic>
+        <p:nvPicPr>
+          <p:cNvPr id="2" name="Picture 1">
+            <a:extLst>
+              <a:ext uri="{FF2B5EF4-FFF2-40B4-BE49-F238E27FC236}">
+                <a16:creationId xmlns:a16="http://schemas.microsoft.com/office/drawing/2014/main" id="{D7E046CB-B5A6-A64B-8FFA-27B229994121}"/>
+              </a:ext>
+            </a:extLst>
+          </p:cNvPr>
+          <p:cNvPicPr>
+            <a:picLocks noChangeAspect="1"/>
+          </p:cNvPicPr>
+          <p:nvPr/>
+        </p:nvPicPr>
+        <p:blipFill>
+          <a:blip r:embed="rId2"/>
+          <a:stretch>
+            <a:fillRect/>
+          </a:stretch>
+        </p:blipFill>
+        <p:spPr>
+          <a:xfrm>
+            <a:off x="689154" y="419631"/>
+            <a:ext cx="4927906" cy="2378988"/>
+          </a:xfrm>
+          <a:prstGeom prst="rect">
+            <a:avLst/>
+          </a:prstGeom>
+        </p:spPr>
+      </p:pic>
+      <p:pic>
+        <p:nvPicPr>
+          <p:cNvPr id="4" name="Picture 3">
+            <a:extLst>
+              <a:ext uri="{FF2B5EF4-FFF2-40B4-BE49-F238E27FC236}">
+                <a16:creationId xmlns:a16="http://schemas.microsoft.com/office/drawing/2014/main" id="{A7C447CE-EFDB-D748-9A41-78DF9B9E2BE0}"/>
+              </a:ext>
+            </a:extLst>
+          </p:cNvPr>
+          <p:cNvPicPr>
+            <a:picLocks noChangeAspect="1"/>
+          </p:cNvPicPr>
+          <p:nvPr/>
+        </p:nvPicPr>
+        <p:blipFill>
+          <a:blip r:embed="rId3"/>
+          <a:stretch>
+            <a:fillRect/>
+          </a:stretch>
+        </p:blipFill>
+        <p:spPr>
+          <a:xfrm>
+            <a:off x="6689344" y="3419179"/>
+            <a:ext cx="4394291" cy="2929527"/>
+          </a:xfrm>
+          <a:prstGeom prst="rect">
+            <a:avLst/>
+          </a:prstGeom>
+        </p:spPr>
+      </p:pic>
+      <p:pic>
+        <p:nvPicPr>
+          <p:cNvPr id="5" name="Picture 4">
+            <a:extLst>
+              <a:ext uri="{FF2B5EF4-FFF2-40B4-BE49-F238E27FC236}">
+                <a16:creationId xmlns:a16="http://schemas.microsoft.com/office/drawing/2014/main" id="{87C18726-1E54-3A4A-A839-BF67C7572739}"/>
+              </a:ext>
+            </a:extLst>
+          </p:cNvPr>
+          <p:cNvPicPr>
+            <a:picLocks noChangeAspect="1"/>
+          </p:cNvPicPr>
+          <p:nvPr/>
+        </p:nvPicPr>
+        <p:blipFill>
+          <a:blip r:embed="rId4"/>
+          <a:stretch>
+            <a:fillRect/>
+          </a:stretch>
+        </p:blipFill>
+        <p:spPr>
+          <a:xfrm>
+            <a:off x="1222769" y="3419179"/>
+            <a:ext cx="4394291" cy="2929527"/>
+          </a:xfrm>
+          <a:prstGeom prst="rect">
+            <a:avLst/>
+          </a:prstGeom>
+        </p:spPr>
+      </p:pic>
+      <p:pic>
+        <p:nvPicPr>
+          <p:cNvPr id="6" name="Picture 5">
+            <a:extLst>
+              <a:ext uri="{FF2B5EF4-FFF2-40B4-BE49-F238E27FC236}">
+                <a16:creationId xmlns:a16="http://schemas.microsoft.com/office/drawing/2014/main" id="{3825C4EF-0D41-8142-AF40-15C5C2EE9C2A}"/>
+              </a:ext>
+            </a:extLst>
+          </p:cNvPr>
+          <p:cNvPicPr>
+            <a:picLocks noChangeAspect="1"/>
+          </p:cNvPicPr>
+          <p:nvPr/>
+        </p:nvPicPr>
+        <p:blipFill>
+          <a:blip r:embed="rId5"/>
+          <a:stretch>
+            <a:fillRect/>
+          </a:stretch>
+        </p:blipFill>
+        <p:spPr>
+          <a:xfrm>
+            <a:off x="6689345" y="274856"/>
+            <a:ext cx="4394291" cy="2929527"/>
+          </a:xfrm>
+          <a:prstGeom prst="rect">
+            <a:avLst/>
+          </a:prstGeom>
+        </p:spPr>
+      </p:pic>
+    </p:spTree>
+    <p:extLst>
+      <p:ext uri="{BB962C8B-B14F-4D97-AF65-F5344CB8AC3E}">
+        <p14:creationId xmlns:p14="http://schemas.microsoft.com/office/powerpoint/2010/main" val="3761961825"/>
+      </p:ext>
+    </p:extLst>
+  </p:cSld>
+  <p:clrMapOvr>
+    <a:masterClrMapping/>
+  </p:clrMapOvr>
+</p:sld>
+</file>
+
+<file path=ppt/slides/slide17.xml><?xml version="1.0" encoding="utf-8"?>
+<p:sld xmlns:a="http://schemas.openxmlformats.org/drawingml/2006/main" xmlns:r="http://schemas.openxmlformats.org/officeDocument/2006/relationships" xmlns:p="http://schemas.openxmlformats.org/presentationml/2006/main">
+  <p:cSld>
+    <p:spTree>
+      <p:nvGrpSpPr>
+        <p:cNvPr id="1" name=""/>
+        <p:cNvGrpSpPr/>
+        <p:nvPr/>
+      </p:nvGrpSpPr>
+      <p:grpSpPr>
+        <a:xfrm>
+          <a:off x="0" y="0"/>
+          <a:ext cx="0" cy="0"/>
+          <a:chOff x="0" y="0"/>
+          <a:chExt cx="0" cy="0"/>
+        </a:xfrm>
+      </p:grpSpPr>
+      <p:pic>
+        <p:nvPicPr>
+          <p:cNvPr id="2" name="Picture 1">
+            <a:extLst>
+              <a:ext uri="{FF2B5EF4-FFF2-40B4-BE49-F238E27FC236}">
+                <a16:creationId xmlns:a16="http://schemas.microsoft.com/office/drawing/2014/main" id="{466CE6E6-EB1C-2348-A58E-28407FDBF295}"/>
+              </a:ext>
+            </a:extLst>
+          </p:cNvPr>
+          <p:cNvPicPr>
+            <a:picLocks noChangeAspect="1"/>
+          </p:cNvPicPr>
+          <p:nvPr/>
+        </p:nvPicPr>
+        <p:blipFill>
+          <a:blip r:embed="rId2"/>
+          <a:stretch>
+            <a:fillRect/>
+          </a:stretch>
+        </p:blipFill>
+        <p:spPr>
+          <a:xfrm>
+            <a:off x="246982" y="1716561"/>
+            <a:ext cx="5486400" cy="3657600"/>
+          </a:xfrm>
+          <a:prstGeom prst="rect">
+            <a:avLst/>
+          </a:prstGeom>
+        </p:spPr>
+      </p:pic>
+      <p:pic>
+        <p:nvPicPr>
+          <p:cNvPr id="3" name="Picture 2">
+            <a:extLst>
+              <a:ext uri="{FF2B5EF4-FFF2-40B4-BE49-F238E27FC236}">
+                <a16:creationId xmlns:a16="http://schemas.microsoft.com/office/drawing/2014/main" id="{53C632F4-70B0-FF49-AF7C-C5950C8CB650}"/>
+              </a:ext>
+            </a:extLst>
+          </p:cNvPr>
+          <p:cNvPicPr>
+            <a:picLocks noChangeAspect="1"/>
+          </p:cNvPicPr>
+          <p:nvPr/>
+        </p:nvPicPr>
+        <p:blipFill>
+          <a:blip r:embed="rId3"/>
+          <a:stretch>
+            <a:fillRect/>
+          </a:stretch>
+        </p:blipFill>
+        <p:spPr>
+          <a:xfrm>
+            <a:off x="6259854" y="1809911"/>
+            <a:ext cx="5486400" cy="3564250"/>
+          </a:xfrm>
+          <a:prstGeom prst="rect">
+            <a:avLst/>
+          </a:prstGeom>
+        </p:spPr>
+      </p:pic>
+    </p:spTree>
+    <p:extLst>
+      <p:ext uri="{BB962C8B-B14F-4D97-AF65-F5344CB8AC3E}">
+        <p14:creationId xmlns:p14="http://schemas.microsoft.com/office/powerpoint/2010/main" val="2008309720"/>
+      </p:ext>
+    </p:extLst>
+  </p:cSld>
+  <p:clrMapOvr>
+    <a:masterClrMapping/>
+  </p:clrMapOvr>
+</p:sld>
+</file>
+
+<file path=ppt/slides/slide18.xml><?xml version="1.0" encoding="utf-8"?>
+<p:sld xmlns:a="http://schemas.openxmlformats.org/drawingml/2006/main" xmlns:r="http://schemas.openxmlformats.org/officeDocument/2006/relationships" xmlns:p="http://schemas.openxmlformats.org/presentationml/2006/main">
+  <p:cSld>
+    <p:spTree>
+      <p:nvGrpSpPr>
+        <p:cNvPr id="1" name=""/>
+        <p:cNvGrpSpPr/>
+        <p:nvPr/>
+      </p:nvGrpSpPr>
+      <p:grpSpPr>
+        <a:xfrm>
+          <a:off x="0" y="0"/>
+          <a:ext cx="0" cy="0"/>
+          <a:chOff x="0" y="0"/>
+          <a:chExt cx="0" cy="0"/>
+        </a:xfrm>
+      </p:grpSpPr>
       <p:sp>
         <p:nvSpPr>
           <p:cNvPr id="2" name="Title 1">
@@ -4131,7 +4591,7 @@
 </p:sld>
 </file>
 
-<file path=ppt/slides/slide15.xml><?xml version="1.0" encoding="utf-8"?>
+<file path=ppt/slides/slide19.xml><?xml version="1.0" encoding="utf-8"?>
 <p:sld xmlns:a="http://schemas.openxmlformats.org/drawingml/2006/main" xmlns:r="http://schemas.openxmlformats.org/officeDocument/2006/relationships" xmlns:p="http://schemas.openxmlformats.org/presentationml/2006/main">
   <p:cSld>
     <p:spTree>
@@ -4226,72 +4686,76 @@
         </p:nvSpPr>
         <p:spPr/>
         <p:txBody>
+          <a:bodyPr>
+            <a:normAutofit fontScale="90000"/>
+          </a:bodyPr>
+          <a:lstStyle/>
+          <a:p>
+            <a:r>
+              <a:rPr lang="en-US" dirty="0"/>
+              <a:t>Knowing which counties are more at risk means resources can be deployed more efficiently.</a:t>
+            </a:r>
+          </a:p>
+        </p:txBody>
+      </p:sp>
+      <p:sp>
+        <p:nvSpPr>
+          <p:cNvPr id="3" name="Content Placeholder 2">
+            <a:extLst>
+              <a:ext uri="{FF2B5EF4-FFF2-40B4-BE49-F238E27FC236}">
+                <a16:creationId xmlns:a16="http://schemas.microsoft.com/office/drawing/2014/main" id="{CA864295-F54C-2A47-9A16-2D351F45F714}"/>
+              </a:ext>
+            </a:extLst>
+          </p:cNvPr>
+          <p:cNvSpPr>
+            <a:spLocks noGrp="1"/>
+          </p:cNvSpPr>
+          <p:nvPr>
+            <p:ph idx="1"/>
+          </p:nvPr>
+        </p:nvSpPr>
+        <p:spPr>
+          <a:xfrm>
+            <a:off x="838200" y="2047301"/>
+            <a:ext cx="10515600" cy="4351338"/>
+          </a:xfrm>
+        </p:spPr>
+        <p:txBody>
           <a:bodyPr/>
           <a:lstStyle/>
-          <a:p>
-            <a:r>
-              <a:rPr lang="en-US" dirty="0"/>
-              <a:t>Data</a:t>
-            </a:r>
-          </a:p>
-        </p:txBody>
-      </p:sp>
-      <p:sp>
-        <p:nvSpPr>
-          <p:cNvPr id="3" name="Content Placeholder 2">
-            <a:extLst>
-              <a:ext uri="{FF2B5EF4-FFF2-40B4-BE49-F238E27FC236}">
-                <a16:creationId xmlns:a16="http://schemas.microsoft.com/office/drawing/2014/main" id="{CA864295-F54C-2A47-9A16-2D351F45F714}"/>
-              </a:ext>
-            </a:extLst>
-          </p:cNvPr>
-          <p:cNvSpPr>
-            <a:spLocks noGrp="1"/>
-          </p:cNvSpPr>
-          <p:nvPr>
-            <p:ph idx="1"/>
-          </p:nvPr>
-        </p:nvSpPr>
-        <p:spPr/>
-        <p:txBody>
-          <a:bodyPr/>
-          <a:lstStyle/>
-          <a:p>
-            <a:r>
-              <a:rPr lang="en-US" dirty="0"/>
-              <a:t>Purpose:</a:t>
-            </a:r>
-          </a:p>
           <a:p>
             <a:pPr marL="0" indent="0">
               <a:buNone/>
             </a:pPr>
             <a:r>
               <a:rPr lang="en-US" dirty="0"/>
-              <a:t>	Knowing which counties are more at risk means resources can be deployed more efficiently.</a:t>
-            </a:r>
-          </a:p>
-          <a:p>
-            <a:endParaRPr lang="en-US" dirty="0"/>
-          </a:p>
-          <a:p>
+              <a:t>Target:  </a:t>
+            </a:r>
+            <a:r>
+              <a:rPr lang="en-US" dirty="0">
+                <a:solidFill>
+                  <a:srgbClr val="FF0000"/>
+                </a:solidFill>
+              </a:rPr>
+              <a:t>Cumulative</a:t>
+            </a:r>
             <a:r>
               <a:rPr lang="en-US" dirty="0"/>
-              <a:t>Data</a:t>
-            </a:r>
-          </a:p>
-          <a:p>
-            <a:pPr lvl="1"/>
+              <a:t> Covid-19 deaths per county </a:t>
+            </a:r>
+            <a:r>
+              <a:rPr lang="en-US" dirty="0">
+                <a:solidFill>
+                  <a:srgbClr val="FF0000"/>
+                </a:solidFill>
+              </a:rPr>
+              <a:t>scaled by population</a:t>
+            </a:r>
+          </a:p>
+          <a:p>
             <a:r>
               <a:rPr lang="en-US" dirty="0"/>
-              <a:t>US Census data scraped from the Census Bureau</a:t>
-            </a:r>
-          </a:p>
-          <a:p>
-            <a:pPr lvl="1"/>
-            <a:r>
-              <a:rPr lang="en-US" dirty="0"/>
-              <a:t>Aggregate Covid-19 statistics from NYT Covid-19 </a:t>
+              <a:t>Data acquired from from the NYT Covid-19 </a:t>
             </a:r>
             <a:r>
               <a:rPr lang="en-US" dirty="0" err="1"/>
@@ -4305,8 +4769,36 @@
           <a:p>
             <a:r>
               <a:rPr lang="en-US" dirty="0"/>
-              <a:t>Target: Cumulative Covid-19 deaths per county</a:t>
-            </a:r>
+              <a:t>(Originally I scraped the CDC website directly, aiming to predict weekly deaths or some other measure, however that was too fine of a granularity to model.)</a:t>
+            </a:r>
+          </a:p>
+          <a:p>
+            <a:pPr marL="0" indent="0">
+              <a:buNone/>
+            </a:pPr>
+            <a:endParaRPr lang="en-US" dirty="0"/>
+          </a:p>
+          <a:p>
+            <a:pPr marL="0" indent="0">
+              <a:buNone/>
+            </a:pPr>
+            <a:r>
+              <a:rPr lang="en-US" dirty="0"/>
+              <a:t>Features: US Census data scraped from the Census Bureau</a:t>
+            </a:r>
+          </a:p>
+          <a:p>
+            <a:pPr lvl="1"/>
+            <a:r>
+              <a:rPr lang="en-US" dirty="0"/>
+              <a:t>62 features consisting of various demographic and economic data</a:t>
+            </a:r>
+          </a:p>
+          <a:p>
+            <a:pPr marL="0" indent="0">
+              <a:buNone/>
+            </a:pPr>
+            <a:endParaRPr lang="en-US" dirty="0"/>
           </a:p>
         </p:txBody>
       </p:sp>
@@ -4340,58 +4832,112 @@
           <a:chExt cx="0" cy="0"/>
         </a:xfrm>
       </p:grpSpPr>
-      <p:sp>
-        <p:nvSpPr>
-          <p:cNvPr id="2" name="Title 1">
-            <a:extLst>
-              <a:ext uri="{FF2B5EF4-FFF2-40B4-BE49-F238E27FC236}">
-                <a16:creationId xmlns:a16="http://schemas.microsoft.com/office/drawing/2014/main" id="{4DB86FB4-A010-F449-80D8-8123FED3B8FA}"/>
-              </a:ext>
-            </a:extLst>
-          </p:cNvPr>
-          <p:cNvSpPr>
-            <a:spLocks noGrp="1"/>
-          </p:cNvSpPr>
-          <p:nvPr>
-            <p:ph type="title"/>
-          </p:nvPr>
-        </p:nvSpPr>
-        <p:spPr/>
-        <p:txBody>
-          <a:bodyPr/>
-          <a:lstStyle/>
-          <a:p>
-            <a:r>
-              <a:rPr lang="en-US" dirty="0"/>
-              <a:t>What influences the number of deaths</a:t>
-            </a:r>
-          </a:p>
-        </p:txBody>
-      </p:sp>
-      <p:sp>
-        <p:nvSpPr>
-          <p:cNvPr id="3" name="Content Placeholder 2">
-            <a:extLst>
-              <a:ext uri="{FF2B5EF4-FFF2-40B4-BE49-F238E27FC236}">
-                <a16:creationId xmlns:a16="http://schemas.microsoft.com/office/drawing/2014/main" id="{344E0AFB-4054-8D45-93FD-D1FB209BEE8D}"/>
-              </a:ext>
-            </a:extLst>
-          </p:cNvPr>
-          <p:cNvSpPr>
-            <a:spLocks noGrp="1"/>
-          </p:cNvSpPr>
-          <p:nvPr>
-            <p:ph idx="1"/>
-          </p:nvPr>
-        </p:nvSpPr>
-        <p:spPr/>
-        <p:txBody>
-          <a:bodyPr/>
-          <a:lstStyle/>
-          <a:p>
-            <a:r>
-              <a:rPr lang="en-US" dirty="0"/>
-              <a:t>Demographics</a:t>
+      <p:pic>
+        <p:nvPicPr>
+          <p:cNvPr id="5" name="Picture 4">
+            <a:extLst>
+              <a:ext uri="{FF2B5EF4-FFF2-40B4-BE49-F238E27FC236}">
+                <a16:creationId xmlns:a16="http://schemas.microsoft.com/office/drawing/2014/main" id="{3AA3A028-0686-E84B-8BEA-930CC70070DF}"/>
+              </a:ext>
+            </a:extLst>
+          </p:cNvPr>
+          <p:cNvPicPr>
+            <a:picLocks noChangeAspect="1"/>
+          </p:cNvPicPr>
+          <p:nvPr/>
+        </p:nvPicPr>
+        <p:blipFill>
+          <a:blip r:embed="rId2"/>
+          <a:stretch>
+            <a:fillRect/>
+          </a:stretch>
+        </p:blipFill>
+        <p:spPr>
+          <a:xfrm>
+            <a:off x="-34006" y="350610"/>
+            <a:ext cx="12226006" cy="6507390"/>
+          </a:xfrm>
+          <a:prstGeom prst="rect">
+            <a:avLst/>
+          </a:prstGeom>
+        </p:spPr>
+      </p:pic>
+      <p:sp>
+        <p:nvSpPr>
+          <p:cNvPr id="6" name="TextBox 5">
+            <a:extLst>
+              <a:ext uri="{FF2B5EF4-FFF2-40B4-BE49-F238E27FC236}">
+                <a16:creationId xmlns:a16="http://schemas.microsoft.com/office/drawing/2014/main" id="{4040B43B-850A-D748-B4A7-5E8194B9F087}"/>
+              </a:ext>
+            </a:extLst>
+          </p:cNvPr>
+          <p:cNvSpPr txBox="1"/>
+          <p:nvPr/>
+        </p:nvSpPr>
+        <p:spPr>
+          <a:xfrm>
+            <a:off x="318655" y="124690"/>
+            <a:ext cx="9756966" cy="707886"/>
+          </a:xfrm>
+          <a:prstGeom prst="rect">
+            <a:avLst/>
+          </a:prstGeom>
+          <a:noFill/>
+        </p:spPr>
+        <p:txBody>
+          <a:bodyPr wrap="none" rtlCol="0">
+            <a:spAutoFit/>
+          </a:bodyPr>
+          <a:lstStyle/>
+          <a:p>
+            <a:r>
+              <a:rPr lang="en-US" sz="4000" dirty="0">
+                <a:latin typeface="+mj-lt"/>
+              </a:rPr>
+              <a:t>US County Cumulative Deaths per 100k People</a:t>
+            </a:r>
+          </a:p>
+        </p:txBody>
+      </p:sp>
+      <p:sp>
+        <p:nvSpPr>
+          <p:cNvPr id="7" name="TextBox 6">
+            <a:extLst>
+              <a:ext uri="{FF2B5EF4-FFF2-40B4-BE49-F238E27FC236}">
+                <a16:creationId xmlns:a16="http://schemas.microsoft.com/office/drawing/2014/main" id="{087E1A3A-1B54-A246-83A0-87C62D061703}"/>
+              </a:ext>
+            </a:extLst>
+          </p:cNvPr>
+          <p:cNvSpPr txBox="1"/>
+          <p:nvPr/>
+        </p:nvSpPr>
+        <p:spPr>
+          <a:xfrm>
+            <a:off x="318655" y="6550223"/>
+            <a:ext cx="10391499" cy="307777"/>
+          </a:xfrm>
+          <a:prstGeom prst="rect">
+            <a:avLst/>
+          </a:prstGeom>
+          <a:noFill/>
+        </p:spPr>
+        <p:txBody>
+          <a:bodyPr wrap="none" rtlCol="0">
+            <a:spAutoFit/>
+          </a:bodyPr>
+          <a:lstStyle/>
+          <a:p>
+            <a:r>
+              <a:rPr lang="en-US" sz="1400" dirty="0"/>
+              <a:t>Made using </a:t>
+            </a:r>
+            <a:r>
+              <a:rPr lang="en-US" sz="1400" dirty="0" err="1"/>
+              <a:t>Plotly</a:t>
+            </a:r>
+            <a:r>
+              <a:rPr lang="en-US" sz="1400" dirty="0"/>
+              <a:t> Choropleth Map. Blank counties are places where either my web-scraping failed, or I dropped outliers/entries with issues.</a:t>
             </a:r>
           </a:p>
         </p:txBody>
@@ -4399,7 +4945,7 @@
     </p:spTree>
     <p:extLst>
       <p:ext uri="{BB962C8B-B14F-4D97-AF65-F5344CB8AC3E}">
-        <p14:creationId xmlns:p14="http://schemas.microsoft.com/office/powerpoint/2010/main" val="2815407192"/>
+        <p14:creationId xmlns:p14="http://schemas.microsoft.com/office/powerpoint/2010/main" val="2383290767"/>
       </p:ext>
     </p:extLst>
   </p:cSld>
@@ -4426,11 +4972,280 @@
           <a:chExt cx="0" cy="0"/>
         </a:xfrm>
       </p:grpSpPr>
+      <p:pic>
+        <p:nvPicPr>
+          <p:cNvPr id="5" name="Picture 4">
+            <a:extLst>
+              <a:ext uri="{FF2B5EF4-FFF2-40B4-BE49-F238E27FC236}">
+                <a16:creationId xmlns:a16="http://schemas.microsoft.com/office/drawing/2014/main" id="{95D21B39-D584-3E4F-ABAF-C91F96D43F13}"/>
+              </a:ext>
+            </a:extLst>
+          </p:cNvPr>
+          <p:cNvPicPr>
+            <a:picLocks noChangeAspect="1"/>
+          </p:cNvPicPr>
+          <p:nvPr/>
+        </p:nvPicPr>
+        <p:blipFill>
+          <a:blip r:embed="rId2"/>
+          <a:stretch>
+            <a:fillRect/>
+          </a:stretch>
+        </p:blipFill>
+        <p:spPr>
+          <a:xfrm>
+            <a:off x="616529" y="832576"/>
+            <a:ext cx="11064242" cy="5029200"/>
+          </a:xfrm>
+          <a:prstGeom prst="rect">
+            <a:avLst/>
+          </a:prstGeom>
+        </p:spPr>
+      </p:pic>
+      <p:sp>
+        <p:nvSpPr>
+          <p:cNvPr id="6" name="TextBox 5">
+            <a:extLst>
+              <a:ext uri="{FF2B5EF4-FFF2-40B4-BE49-F238E27FC236}">
+                <a16:creationId xmlns:a16="http://schemas.microsoft.com/office/drawing/2014/main" id="{CCCF14F0-08FB-FA43-81C5-7D277436BD02}"/>
+              </a:ext>
+            </a:extLst>
+          </p:cNvPr>
+          <p:cNvSpPr txBox="1"/>
+          <p:nvPr/>
+        </p:nvSpPr>
+        <p:spPr>
+          <a:xfrm>
+            <a:off x="318655" y="124690"/>
+            <a:ext cx="11574964" cy="707886"/>
+          </a:xfrm>
+          <a:prstGeom prst="rect">
+            <a:avLst/>
+          </a:prstGeom>
+          <a:noFill/>
+        </p:spPr>
+        <p:txBody>
+          <a:bodyPr wrap="none" rtlCol="0">
+            <a:spAutoFit/>
+          </a:bodyPr>
+          <a:lstStyle/>
+          <a:p>
+            <a:r>
+              <a:rPr lang="en-US" sz="4000" dirty="0">
+                <a:latin typeface="+mj-lt"/>
+              </a:rPr>
+              <a:t>Target Distribution with and without Box-Cox Transform</a:t>
+            </a:r>
+          </a:p>
+        </p:txBody>
+      </p:sp>
+      <p:sp>
+        <p:nvSpPr>
+          <p:cNvPr id="7" name="TextBox 6">
+            <a:extLst>
+              <a:ext uri="{FF2B5EF4-FFF2-40B4-BE49-F238E27FC236}">
+                <a16:creationId xmlns:a16="http://schemas.microsoft.com/office/drawing/2014/main" id="{8C31D40A-575B-8D45-9DAA-50764C3A732F}"/>
+              </a:ext>
+            </a:extLst>
+          </p:cNvPr>
+          <p:cNvSpPr txBox="1"/>
+          <p:nvPr/>
+        </p:nvSpPr>
+        <p:spPr>
+          <a:xfrm>
+            <a:off x="292335" y="6027003"/>
+            <a:ext cx="11388436" cy="830997"/>
+          </a:xfrm>
+          <a:prstGeom prst="rect">
+            <a:avLst/>
+          </a:prstGeom>
+          <a:noFill/>
+        </p:spPr>
+        <p:txBody>
+          <a:bodyPr wrap="square" rtlCol="0">
+            <a:spAutoFit/>
+          </a:bodyPr>
+          <a:lstStyle/>
+          <a:p>
+            <a:pPr marL="342900" indent="-342900">
+              <a:buFont typeface="Arial" panose="020B0604020202020204" pitchFamily="34" charset="0"/>
+              <a:buChar char="•"/>
+            </a:pPr>
+            <a:r>
+              <a:rPr lang="en-US" sz="2400" dirty="0"/>
+              <a:t>Transforming the target distribution to a normal shape was necessary for my regression to work consistently.</a:t>
+            </a:r>
+          </a:p>
+        </p:txBody>
+      </p:sp>
+    </p:spTree>
+    <p:extLst>
+      <p:ext uri="{BB962C8B-B14F-4D97-AF65-F5344CB8AC3E}">
+        <p14:creationId xmlns:p14="http://schemas.microsoft.com/office/powerpoint/2010/main" val="1881972753"/>
+      </p:ext>
+    </p:extLst>
+  </p:cSld>
+  <p:clrMapOvr>
+    <a:masterClrMapping/>
+  </p:clrMapOvr>
+</p:sld>
+</file>
+
+<file path=ppt/slides/slide5.xml><?xml version="1.0" encoding="utf-8"?>
+<p:sld xmlns:a="http://schemas.openxmlformats.org/drawingml/2006/main" xmlns:r="http://schemas.openxmlformats.org/officeDocument/2006/relationships" xmlns:p="http://schemas.openxmlformats.org/presentationml/2006/main">
+  <p:cSld>
+    <p:spTree>
+      <p:nvGrpSpPr>
+        <p:cNvPr id="1" name=""/>
+        <p:cNvGrpSpPr/>
+        <p:nvPr/>
+      </p:nvGrpSpPr>
+      <p:grpSpPr>
+        <a:xfrm>
+          <a:off x="0" y="0"/>
+          <a:ext cx="0" cy="0"/>
+          <a:chOff x="0" y="0"/>
+          <a:chExt cx="0" cy="0"/>
+        </a:xfrm>
+      </p:grpSpPr>
       <p:sp>
         <p:nvSpPr>
           <p:cNvPr id="2" name="Title 1">
             <a:extLst>
               <a:ext uri="{FF2B5EF4-FFF2-40B4-BE49-F238E27FC236}">
+                <a16:creationId xmlns:a16="http://schemas.microsoft.com/office/drawing/2014/main" id="{4DB86FB4-A010-F449-80D8-8123FED3B8FA}"/>
+              </a:ext>
+            </a:extLst>
+          </p:cNvPr>
+          <p:cNvSpPr>
+            <a:spLocks noGrp="1"/>
+          </p:cNvSpPr>
+          <p:nvPr>
+            <p:ph type="title"/>
+          </p:nvPr>
+        </p:nvSpPr>
+        <p:spPr/>
+        <p:txBody>
+          <a:bodyPr/>
+          <a:lstStyle/>
+          <a:p>
+            <a:r>
+              <a:rPr lang="en-US" dirty="0"/>
+              <a:t>What influences the number of deaths?</a:t>
+            </a:r>
+          </a:p>
+        </p:txBody>
+      </p:sp>
+      <p:sp>
+        <p:nvSpPr>
+          <p:cNvPr id="3" name="Content Placeholder 2">
+            <a:extLst>
+              <a:ext uri="{FF2B5EF4-FFF2-40B4-BE49-F238E27FC236}">
+                <a16:creationId xmlns:a16="http://schemas.microsoft.com/office/drawing/2014/main" id="{344E0AFB-4054-8D45-93FD-D1FB209BEE8D}"/>
+              </a:ext>
+            </a:extLst>
+          </p:cNvPr>
+          <p:cNvSpPr>
+            <a:spLocks noGrp="1"/>
+          </p:cNvSpPr>
+          <p:nvPr>
+            <p:ph idx="1"/>
+          </p:nvPr>
+        </p:nvSpPr>
+        <p:spPr/>
+        <p:txBody>
+          <a:bodyPr>
+            <a:normAutofit lnSpcReduction="10000"/>
+          </a:bodyPr>
+          <a:lstStyle/>
+          <a:p>
+            <a:r>
+              <a:rPr lang="en-US" dirty="0"/>
+              <a:t>Age</a:t>
+            </a:r>
+          </a:p>
+          <a:p>
+            <a:r>
+              <a:rPr lang="en-US" dirty="0"/>
+              <a:t>Race</a:t>
+            </a:r>
+          </a:p>
+          <a:p>
+            <a:r>
+              <a:rPr lang="en-US" dirty="0"/>
+              <a:t>Income</a:t>
+            </a:r>
+          </a:p>
+          <a:p>
+            <a:r>
+              <a:rPr lang="en-US" dirty="0"/>
+              <a:t>Education</a:t>
+            </a:r>
+          </a:p>
+          <a:p>
+            <a:r>
+              <a:rPr lang="en-US" dirty="0"/>
+              <a:t>Health </a:t>
+            </a:r>
+          </a:p>
+          <a:p>
+            <a:r>
+              <a:rPr lang="en-US" dirty="0"/>
+              <a:t>Etc.</a:t>
+            </a:r>
+          </a:p>
+          <a:p>
+            <a:endParaRPr lang="en-US" dirty="0"/>
+          </a:p>
+          <a:p>
+            <a:r>
+              <a:rPr lang="en-US" dirty="0"/>
+              <a:t>A lot of these are somewhat to significantly correlated</a:t>
+            </a:r>
+          </a:p>
+          <a:p>
+            <a:r>
+              <a:rPr lang="en-US" dirty="0"/>
+              <a:t>By trial and error I selected 12 features for my model</a:t>
+            </a:r>
+          </a:p>
+        </p:txBody>
+      </p:sp>
+    </p:spTree>
+    <p:extLst>
+      <p:ext uri="{BB962C8B-B14F-4D97-AF65-F5344CB8AC3E}">
+        <p14:creationId xmlns:p14="http://schemas.microsoft.com/office/powerpoint/2010/main" val="2815407192"/>
+      </p:ext>
+    </p:extLst>
+  </p:cSld>
+  <p:clrMapOvr>
+    <a:masterClrMapping/>
+  </p:clrMapOvr>
+</p:sld>
+</file>
+
+<file path=ppt/slides/slide6.xml><?xml version="1.0" encoding="utf-8"?>
+<p:sld xmlns:a="http://schemas.openxmlformats.org/drawingml/2006/main" xmlns:r="http://schemas.openxmlformats.org/officeDocument/2006/relationships" xmlns:p="http://schemas.openxmlformats.org/presentationml/2006/main">
+  <p:cSld>
+    <p:spTree>
+      <p:nvGrpSpPr>
+        <p:cNvPr id="1" name=""/>
+        <p:cNvGrpSpPr/>
+        <p:nvPr/>
+      </p:nvGrpSpPr>
+      <p:grpSpPr>
+        <a:xfrm>
+          <a:off x="0" y="0"/>
+          <a:ext cx="0" cy="0"/>
+          <a:chOff x="0" y="0"/>
+          <a:chExt cx="0" cy="0"/>
+        </a:xfrm>
+      </p:grpSpPr>
+      <p:sp>
+        <p:nvSpPr>
+          <p:cNvPr id="2" name="Title 1">
+            <a:extLst>
+              <a:ext uri="{FF2B5EF4-FFF2-40B4-BE49-F238E27FC236}">
                 <a16:creationId xmlns:a16="http://schemas.microsoft.com/office/drawing/2014/main" id="{357E9FB1-DCA8-8A4D-A762-5C2E2956C8D7}"/>
               </a:ext>
             </a:extLst>
@@ -4449,7 +5264,7 @@
           <a:p>
             <a:r>
               <a:rPr lang="en-US" dirty="0"/>
-              <a:t>Features</a:t>
+              <a:t>Selected Features</a:t>
             </a:r>
           </a:p>
         </p:txBody>
@@ -5326,7 +6141,7 @@
 </p:sld>
 </file>
 
-<file path=ppt/slides/slide5.xml><?xml version="1.0" encoding="utf-8"?>
+<file path=ppt/slides/slide7.xml><?xml version="1.0" encoding="utf-8"?>
 <p:sld xmlns:a="http://schemas.openxmlformats.org/drawingml/2006/main" xmlns:r="http://schemas.openxmlformats.org/officeDocument/2006/relationships" xmlns:p="http://schemas.openxmlformats.org/presentationml/2006/main">
   <p:cSld>
     <p:spTree>
@@ -5365,8 +6180,8 @@
         </p:blipFill>
         <p:spPr>
           <a:xfrm>
-            <a:off x="893891" y="3200400"/>
-            <a:ext cx="5486400" cy="3657600"/>
+            <a:off x="136533" y="3617383"/>
+            <a:ext cx="6093455" cy="3068646"/>
           </a:xfrm>
           <a:prstGeom prst="rect">
             <a:avLst/>
@@ -5395,8 +6210,8 @@
         </p:blipFill>
         <p:spPr>
           <a:xfrm>
-            <a:off x="6117055" y="3200400"/>
-            <a:ext cx="5486400" cy="3657600"/>
+            <a:off x="6575787" y="3617382"/>
+            <a:ext cx="5172862" cy="3068647"/>
           </a:xfrm>
           <a:prstGeom prst="rect">
             <a:avLst/>
@@ -5405,10 +6220,10 @@
       </p:pic>
       <p:pic>
         <p:nvPicPr>
-          <p:cNvPr id="4" name="Picture 3">
-            <a:extLst>
-              <a:ext uri="{FF2B5EF4-FFF2-40B4-BE49-F238E27FC236}">
-                <a16:creationId xmlns:a16="http://schemas.microsoft.com/office/drawing/2014/main" id="{C8141254-D5D5-2248-896D-365C729CADCD}"/>
+          <p:cNvPr id="8" name="Picture 7">
+            <a:extLst>
+              <a:ext uri="{FF2B5EF4-FFF2-40B4-BE49-F238E27FC236}">
+                <a16:creationId xmlns:a16="http://schemas.microsoft.com/office/drawing/2014/main" id="{CD279CCD-9BB6-974B-8052-D1953BB28A92}"/>
               </a:ext>
             </a:extLst>
           </p:cNvPr>
@@ -5425,8 +6240,8 @@
         </p:blipFill>
         <p:spPr>
           <a:xfrm>
-            <a:off x="6117055" y="-110835"/>
-            <a:ext cx="5486400" cy="3657600"/>
+            <a:off x="554177" y="278514"/>
+            <a:ext cx="4779704" cy="3186469"/>
           </a:xfrm>
           <a:prstGeom prst="rect">
             <a:avLst/>
@@ -5435,10 +6250,10 @@
       </p:pic>
       <p:pic>
         <p:nvPicPr>
-          <p:cNvPr id="8" name="Picture 7">
-            <a:extLst>
-              <a:ext uri="{FF2B5EF4-FFF2-40B4-BE49-F238E27FC236}">
-                <a16:creationId xmlns:a16="http://schemas.microsoft.com/office/drawing/2014/main" id="{CD279CCD-9BB6-974B-8052-D1953BB28A92}"/>
+          <p:cNvPr id="9" name="Picture 8">
+            <a:extLst>
+              <a:ext uri="{FF2B5EF4-FFF2-40B4-BE49-F238E27FC236}">
+                <a16:creationId xmlns:a16="http://schemas.microsoft.com/office/drawing/2014/main" id="{1CE77481-4C16-5544-A376-D342A76956AD}"/>
               </a:ext>
             </a:extLst>
           </p:cNvPr>
@@ -5455,8 +6270,8 @@
         </p:blipFill>
         <p:spPr>
           <a:xfrm>
-            <a:off x="893891" y="-110835"/>
-            <a:ext cx="5486400" cy="3657600"/>
+            <a:off x="6229988" y="278514"/>
+            <a:ext cx="5852348" cy="3068646"/>
           </a:xfrm>
           <a:prstGeom prst="rect">
             <a:avLst/>
@@ -5467,149 +6282,6 @@
     <p:extLst>
       <p:ext uri="{BB962C8B-B14F-4D97-AF65-F5344CB8AC3E}">
         <p14:creationId xmlns:p14="http://schemas.microsoft.com/office/powerpoint/2010/main" val="3661406890"/>
-      </p:ext>
-    </p:extLst>
-  </p:cSld>
-  <p:clrMapOvr>
-    <a:masterClrMapping/>
-  </p:clrMapOvr>
-</p:sld>
-</file>
-
-<file path=ppt/slides/slide6.xml><?xml version="1.0" encoding="utf-8"?>
-<p:sld xmlns:a="http://schemas.openxmlformats.org/drawingml/2006/main" xmlns:r="http://schemas.openxmlformats.org/officeDocument/2006/relationships" xmlns:p="http://schemas.openxmlformats.org/presentationml/2006/main">
-  <p:cSld>
-    <p:spTree>
-      <p:nvGrpSpPr>
-        <p:cNvPr id="1" name=""/>
-        <p:cNvGrpSpPr/>
-        <p:nvPr/>
-      </p:nvGrpSpPr>
-      <p:grpSpPr>
-        <a:xfrm>
-          <a:off x="0" y="0"/>
-          <a:ext cx="0" cy="0"/>
-          <a:chOff x="0" y="0"/>
-          <a:chExt cx="0" cy="0"/>
-        </a:xfrm>
-      </p:grpSpPr>
-      <p:pic>
-        <p:nvPicPr>
-          <p:cNvPr id="5" name="Picture 4">
-            <a:extLst>
-              <a:ext uri="{FF2B5EF4-FFF2-40B4-BE49-F238E27FC236}">
-                <a16:creationId xmlns:a16="http://schemas.microsoft.com/office/drawing/2014/main" id="{95D21B39-D584-3E4F-ABAF-C91F96D43F13}"/>
-              </a:ext>
-            </a:extLst>
-          </p:cNvPr>
-          <p:cNvPicPr>
-            <a:picLocks noChangeAspect="1"/>
-          </p:cNvPicPr>
-          <p:nvPr/>
-        </p:nvPicPr>
-        <p:blipFill>
-          <a:blip r:embed="rId2"/>
-          <a:stretch>
-            <a:fillRect/>
-          </a:stretch>
-        </p:blipFill>
-        <p:spPr>
-          <a:xfrm>
-            <a:off x="1496291" y="1461654"/>
-            <a:ext cx="9144000" cy="4572000"/>
-          </a:xfrm>
-          <a:prstGeom prst="rect">
-            <a:avLst/>
-          </a:prstGeom>
-        </p:spPr>
-      </p:pic>
-    </p:spTree>
-    <p:extLst>
-      <p:ext uri="{BB962C8B-B14F-4D97-AF65-F5344CB8AC3E}">
-        <p14:creationId xmlns:p14="http://schemas.microsoft.com/office/powerpoint/2010/main" val="1881972753"/>
-      </p:ext>
-    </p:extLst>
-  </p:cSld>
-  <p:clrMapOvr>
-    <a:masterClrMapping/>
-  </p:clrMapOvr>
-</p:sld>
-</file>
-
-<file path=ppt/slides/slide7.xml><?xml version="1.0" encoding="utf-8"?>
-<p:sld xmlns:a="http://schemas.openxmlformats.org/drawingml/2006/main" xmlns:r="http://schemas.openxmlformats.org/officeDocument/2006/relationships" xmlns:p="http://schemas.openxmlformats.org/presentationml/2006/main">
-  <p:cSld>
-    <p:spTree>
-      <p:nvGrpSpPr>
-        <p:cNvPr id="1" name=""/>
-        <p:cNvGrpSpPr/>
-        <p:nvPr/>
-      </p:nvGrpSpPr>
-      <p:grpSpPr>
-        <a:xfrm>
-          <a:off x="0" y="0"/>
-          <a:ext cx="0" cy="0"/>
-          <a:chOff x="0" y="0"/>
-          <a:chExt cx="0" cy="0"/>
-        </a:xfrm>
-      </p:grpSpPr>
-      <p:sp>
-        <p:nvSpPr>
-          <p:cNvPr id="2" name="Title 1">
-            <a:extLst>
-              <a:ext uri="{FF2B5EF4-FFF2-40B4-BE49-F238E27FC236}">
-                <a16:creationId xmlns:a16="http://schemas.microsoft.com/office/drawing/2014/main" id="{8DA41935-2CAC-D94C-8B99-F9451E0706C3}"/>
-              </a:ext>
-            </a:extLst>
-          </p:cNvPr>
-          <p:cNvSpPr>
-            <a:spLocks noGrp="1"/>
-          </p:cNvSpPr>
-          <p:nvPr>
-            <p:ph type="title"/>
-          </p:nvPr>
-        </p:nvSpPr>
-        <p:spPr/>
-        <p:txBody>
-          <a:bodyPr/>
-          <a:lstStyle/>
-          <a:p>
-            <a:r>
-              <a:rPr lang="en-US" dirty="0"/>
-              <a:t>Motivation for model choice</a:t>
-            </a:r>
-          </a:p>
-        </p:txBody>
-      </p:sp>
-      <p:sp>
-        <p:nvSpPr>
-          <p:cNvPr id="3" name="Content Placeholder 2">
-            <a:extLst>
-              <a:ext uri="{FF2B5EF4-FFF2-40B4-BE49-F238E27FC236}">
-                <a16:creationId xmlns:a16="http://schemas.microsoft.com/office/drawing/2014/main" id="{6CE2C99C-795D-0043-BC58-1D96AC1074C2}"/>
-              </a:ext>
-            </a:extLst>
-          </p:cNvPr>
-          <p:cNvSpPr>
-            <a:spLocks noGrp="1"/>
-          </p:cNvSpPr>
-          <p:nvPr>
-            <p:ph idx="1"/>
-          </p:nvPr>
-        </p:nvSpPr>
-        <p:spPr/>
-        <p:txBody>
-          <a:bodyPr/>
-          <a:lstStyle/>
-          <a:p>
-            <a:endParaRPr lang="en-US" dirty="0"/>
-          </a:p>
-        </p:txBody>
-      </p:sp>
-    </p:spTree>
-    <p:extLst>
-      <p:ext uri="{BB962C8B-B14F-4D97-AF65-F5344CB8AC3E}">
-        <p14:creationId xmlns:p14="http://schemas.microsoft.com/office/powerpoint/2010/main" val="655216211"/>
       </p:ext>
     </p:extLst>
   </p:cSld>
@@ -5641,7 +6313,7 @@
           <p:cNvPr id="2" name="Title 1">
             <a:extLst>
               <a:ext uri="{FF2B5EF4-FFF2-40B4-BE49-F238E27FC236}">
-                <a16:creationId xmlns:a16="http://schemas.microsoft.com/office/drawing/2014/main" id="{30855D2E-FA3D-BA40-97C1-9DDD4BC8969F}"/>
+                <a16:creationId xmlns:a16="http://schemas.microsoft.com/office/drawing/2014/main" id="{8DA41935-2CAC-D94C-8B99-F9451E0706C3}"/>
               </a:ext>
             </a:extLst>
           </p:cNvPr>
@@ -5659,7 +6331,7 @@
           <a:p>
             <a:r>
               <a:rPr lang="en-US" dirty="0"/>
-              <a:t>Final Model</a:t>
+              <a:t>Model Choice</a:t>
             </a:r>
           </a:p>
         </p:txBody>
@@ -5669,7 +6341,7 @@
           <p:cNvPr id="3" name="Content Placeholder 2">
             <a:extLst>
               <a:ext uri="{FF2B5EF4-FFF2-40B4-BE49-F238E27FC236}">
-                <a16:creationId xmlns:a16="http://schemas.microsoft.com/office/drawing/2014/main" id="{77DB341F-6332-384C-971A-AAC12A4425D3}"/>
+                <a16:creationId xmlns:a16="http://schemas.microsoft.com/office/drawing/2014/main" id="{6CE2C99C-795D-0043-BC58-1D96AC1074C2}"/>
               </a:ext>
             </a:extLst>
           </p:cNvPr>
@@ -5682,57 +6354,76 @@
         </p:nvSpPr>
         <p:spPr/>
         <p:txBody>
-          <a:bodyPr/>
-          <a:lstStyle/>
-          <a:p>
+          <a:bodyPr>
+            <a:normAutofit lnSpcReduction="10000"/>
+          </a:bodyPr>
+          <a:lstStyle/>
+          <a:p>
+            <a:r>
+              <a:rPr lang="en-US" dirty="0"/>
+              <a:t>Model Tests:</a:t>
+            </a:r>
+          </a:p>
+          <a:p>
+            <a:pPr lvl="1"/>
+            <a:r>
+              <a:rPr lang="en-US" dirty="0"/>
+              <a:t>Linear regression with and without polynomial features</a:t>
+            </a:r>
+          </a:p>
+          <a:p>
+            <a:pPr lvl="1"/>
+            <a:r>
+              <a:rPr lang="en-US" dirty="0"/>
+              <a:t>Lasso and ridge regression with scaled features, with and without polynomial features</a:t>
+            </a:r>
+          </a:p>
+          <a:p>
+            <a:pPr lvl="1"/>
+            <a:endParaRPr lang="en-US" dirty="0"/>
+          </a:p>
+          <a:p>
+            <a:pPr lvl="1"/>
+            <a:endParaRPr lang="en-US" dirty="0"/>
+          </a:p>
+          <a:p>
+            <a:r>
+              <a:rPr lang="en-US" dirty="0"/>
+              <a:t>Ultimately I selected the model which performed the best, regardless of complexity:</a:t>
+            </a:r>
+          </a:p>
+          <a:p>
+            <a:pPr lvl="1"/>
             <a:r>
               <a:rPr lang="en-US" dirty="0" err="1"/>
               <a:t>LassoCV</a:t>
             </a:r>
             <a:r>
               <a:rPr lang="en-US" dirty="0"/>
-              <a:t> with standard poly features (all poly features, not just interaction)</a:t>
-            </a:r>
-          </a:p>
-          <a:p>
+              <a:t> with standard polynomial features (all poly features, not just interaction)</a:t>
+            </a:r>
+          </a:p>
+          <a:p>
+            <a:pPr lvl="1"/>
+            <a:r>
+              <a:rPr lang="en-US" dirty="0" err="1"/>
+              <a:t>ƛ</a:t>
+            </a:r>
             <a:r>
               <a:rPr lang="en-US" dirty="0"/>
-              <a:t>Alpha = 4e-4</a:t>
-            </a:r>
-          </a:p>
-          <a:p>
-            <a:r>
-              <a:rPr lang="en-US" dirty="0"/>
-              <a:t>Coefficients not included here because there are many of them</a:t>
-            </a:r>
-          </a:p>
-          <a:p>
+              <a:t> = 4e-4</a:t>
+            </a:r>
+          </a:p>
+          <a:p>
+            <a:pPr lvl="1"/>
             <a:endParaRPr lang="en-US" dirty="0"/>
-          </a:p>
-          <a:p>
-            <a:r>
-              <a:rPr lang="en-US" dirty="0"/>
-              <a:t>R2 = 32%</a:t>
-            </a:r>
-          </a:p>
-          <a:p>
-            <a:r>
-              <a:rPr lang="en-US" dirty="0"/>
-              <a:t>MAE = 182.1 Deaths per 100k</a:t>
-            </a:r>
-          </a:p>
-          <a:p>
-            <a:r>
-              <a:rPr lang="en-US" dirty="0"/>
-              <a:t>RMSE = 205.5 Deaths per 100k </a:t>
-            </a:r>
           </a:p>
         </p:txBody>
       </p:sp>
     </p:spTree>
     <p:extLst>
       <p:ext uri="{BB962C8B-B14F-4D97-AF65-F5344CB8AC3E}">
-        <p14:creationId xmlns:p14="http://schemas.microsoft.com/office/powerpoint/2010/main" val="325592695"/>
+        <p14:creationId xmlns:p14="http://schemas.microsoft.com/office/powerpoint/2010/main" val="655216211"/>
       </p:ext>
     </p:extLst>
   </p:cSld>
@@ -5759,40 +6450,116 @@
           <a:chExt cx="0" cy="0"/>
         </a:xfrm>
       </p:grpSpPr>
-      <p:pic>
-        <p:nvPicPr>
-          <p:cNvPr id="34" name="Picture 33">
-            <a:extLst>
-              <a:ext uri="{FF2B5EF4-FFF2-40B4-BE49-F238E27FC236}">
-                <a16:creationId xmlns:a16="http://schemas.microsoft.com/office/drawing/2014/main" id="{82A06525-FFD1-2242-A2D0-6343B61E2716}"/>
-              </a:ext>
-            </a:extLst>
-          </p:cNvPr>
-          <p:cNvPicPr>
-            <a:picLocks noChangeAspect="1"/>
-          </p:cNvPicPr>
-          <p:nvPr/>
-        </p:nvPicPr>
-        <p:blipFill>
-          <a:blip r:embed="rId2"/>
-          <a:stretch>
-            <a:fillRect/>
-          </a:stretch>
-        </p:blipFill>
-        <p:spPr>
-          <a:xfrm>
-            <a:off x="1524000" y="1143000"/>
-            <a:ext cx="9144000" cy="4572000"/>
-          </a:xfrm>
-          <a:prstGeom prst="rect">
-            <a:avLst/>
-          </a:prstGeom>
-        </p:spPr>
-      </p:pic>
+      <p:sp>
+        <p:nvSpPr>
+          <p:cNvPr id="2" name="Title 1">
+            <a:extLst>
+              <a:ext uri="{FF2B5EF4-FFF2-40B4-BE49-F238E27FC236}">
+                <a16:creationId xmlns:a16="http://schemas.microsoft.com/office/drawing/2014/main" id="{30855D2E-FA3D-BA40-97C1-9DDD4BC8969F}"/>
+              </a:ext>
+            </a:extLst>
+          </p:cNvPr>
+          <p:cNvSpPr>
+            <a:spLocks noGrp="1"/>
+          </p:cNvSpPr>
+          <p:nvPr>
+            <p:ph type="title"/>
+          </p:nvPr>
+        </p:nvSpPr>
+        <p:spPr/>
+        <p:txBody>
+          <a:bodyPr/>
+          <a:lstStyle/>
+          <a:p>
+            <a:r>
+              <a:rPr lang="en-US" dirty="0"/>
+              <a:t>Final Model Results</a:t>
+            </a:r>
+          </a:p>
+        </p:txBody>
+      </p:sp>
+      <p:sp>
+        <p:nvSpPr>
+          <p:cNvPr id="3" name="Content Placeholder 2">
+            <a:extLst>
+              <a:ext uri="{FF2B5EF4-FFF2-40B4-BE49-F238E27FC236}">
+                <a16:creationId xmlns:a16="http://schemas.microsoft.com/office/drawing/2014/main" id="{77DB341F-6332-384C-971A-AAC12A4425D3}"/>
+              </a:ext>
+            </a:extLst>
+          </p:cNvPr>
+          <p:cNvSpPr>
+            <a:spLocks noGrp="1"/>
+          </p:cNvSpPr>
+          <p:nvPr>
+            <p:ph idx="1"/>
+          </p:nvPr>
+        </p:nvSpPr>
+        <p:spPr/>
+        <p:txBody>
+          <a:bodyPr/>
+          <a:lstStyle/>
+          <a:p>
+            <a:r>
+              <a:rPr lang="en-US" dirty="0"/>
+              <a:t>Coefficients not included here because there are many of them</a:t>
+            </a:r>
+          </a:p>
+          <a:p>
+            <a:endParaRPr lang="en-US" dirty="0"/>
+          </a:p>
+          <a:p>
+            <a:r>
+              <a:rPr lang="en-US" dirty="0"/>
+              <a:t>r</a:t>
+            </a:r>
+            <a:r>
+              <a:rPr lang="en-US" baseline="30000" dirty="0"/>
+              <a:t>2</a:t>
+            </a:r>
+            <a:r>
+              <a:rPr lang="en-US" dirty="0"/>
+              <a:t> = 32%</a:t>
+            </a:r>
+          </a:p>
+          <a:p>
+            <a:pPr lvl="1"/>
+            <a:r>
+              <a:rPr lang="en-US" dirty="0"/>
+              <a:t>The unexplained variance is high</a:t>
+            </a:r>
+          </a:p>
+          <a:p>
+            <a:pPr lvl="1"/>
+            <a:r>
+              <a:rPr lang="en-US" dirty="0"/>
+              <a:t>I’m not surprised by this considering the complexity of the problem</a:t>
+            </a:r>
+          </a:p>
+          <a:p>
+            <a:pPr lvl="1"/>
+            <a:r>
+              <a:rPr lang="en-US" dirty="0"/>
+              <a:t>It took some effort to even get to this point</a:t>
+            </a:r>
+          </a:p>
+          <a:p>
+            <a:r>
+              <a:rPr lang="en-US" dirty="0"/>
+              <a:t>MAE = 182.1 Deaths per 100k</a:t>
+            </a:r>
+          </a:p>
+          <a:p>
+            <a:r>
+              <a:rPr lang="en-US" dirty="0"/>
+              <a:t>RMSE = 205.5 Deaths per 100k </a:t>
+            </a:r>
+          </a:p>
+        </p:txBody>
+      </p:sp>
     </p:spTree>
     <p:extLst>
       <p:ext uri="{BB962C8B-B14F-4D97-AF65-F5344CB8AC3E}">
-        <p14:creationId xmlns:p14="http://schemas.microsoft.com/office/powerpoint/2010/main" val="1775091389"/>
+        <p14:creationId xmlns:p14="http://schemas.microsoft.com/office/powerpoint/2010/main" val="325592695"/>
       </p:ext>
     </p:extLst>
   </p:cSld>

</xml_diff>

<commit_message>
Final work on presentation before Friday, small updates to coefficient plots.
</commit_message>
<xml_diff>
--- a/Presentation/CovidProjectPresentation.pptx
+++ b/Presentation/CovidProjectPresentation.pptx
@@ -4,6 +4,9 @@
   <p:sldMasterIdLst>
     <p:sldMasterId id="2147483648" r:id="rId1"/>
   </p:sldMasterIdLst>
+  <p:notesMasterIdLst>
+    <p:notesMasterId r:id="rId22"/>
+  </p:notesMasterIdLst>
   <p:sldIdLst>
     <p:sldId id="256" r:id="rId2"/>
     <p:sldId id="257" r:id="rId3"/>
@@ -13,17 +16,18 @@
     <p:sldId id="258" r:id="rId7"/>
     <p:sldId id="261" r:id="rId8"/>
     <p:sldId id="268" r:id="rId9"/>
-    <p:sldId id="267" r:id="rId10"/>
-    <p:sldId id="274" r:id="rId11"/>
-    <p:sldId id="260" r:id="rId12"/>
+    <p:sldId id="260" r:id="rId10"/>
+    <p:sldId id="275" r:id="rId11"/>
+    <p:sldId id="267" r:id="rId12"/>
     <p:sldId id="273" r:id="rId13"/>
     <p:sldId id="264" r:id="rId14"/>
-    <p:sldId id="271" r:id="rId15"/>
+    <p:sldId id="266" r:id="rId15"/>
     <p:sldId id="269" r:id="rId16"/>
     <p:sldId id="262" r:id="rId17"/>
     <p:sldId id="263" r:id="rId18"/>
-    <p:sldId id="266" r:id="rId19"/>
-    <p:sldId id="270" r:id="rId20"/>
+    <p:sldId id="277" r:id="rId19"/>
+    <p:sldId id="276" r:id="rId20"/>
+    <p:sldId id="270" r:id="rId21"/>
   </p:sldIdLst>
   <p:sldSz cx="12192000" cy="6858000"/>
   <p:notesSz cx="6858000" cy="9144000"/>
@@ -125,6 +129,737 @@
 </p:presentation>
 </file>
 
+<file path=ppt/notesMasters/notesMaster1.xml><?xml version="1.0" encoding="utf-8"?>
+<p:notesMaster xmlns:a="http://schemas.openxmlformats.org/drawingml/2006/main" xmlns:r="http://schemas.openxmlformats.org/officeDocument/2006/relationships" xmlns:p="http://schemas.openxmlformats.org/presentationml/2006/main">
+  <p:cSld>
+    <p:bg>
+      <p:bgRef idx="1001">
+        <a:schemeClr val="bg1"/>
+      </p:bgRef>
+    </p:bg>
+    <p:spTree>
+      <p:nvGrpSpPr>
+        <p:cNvPr id="1" name=""/>
+        <p:cNvGrpSpPr/>
+        <p:nvPr/>
+      </p:nvGrpSpPr>
+      <p:grpSpPr>
+        <a:xfrm>
+          <a:off x="0" y="0"/>
+          <a:ext cx="0" cy="0"/>
+          <a:chOff x="0" y="0"/>
+          <a:chExt cx="0" cy="0"/>
+        </a:xfrm>
+      </p:grpSpPr>
+      <p:sp>
+        <p:nvSpPr>
+          <p:cNvPr id="2" name="Header Placeholder 1"/>
+          <p:cNvSpPr>
+            <a:spLocks noGrp="1"/>
+          </p:cNvSpPr>
+          <p:nvPr>
+            <p:ph type="hdr" sz="quarter"/>
+          </p:nvPr>
+        </p:nvSpPr>
+        <p:spPr>
+          <a:xfrm>
+            <a:off x="0" y="0"/>
+            <a:ext cx="2971800" cy="458788"/>
+          </a:xfrm>
+          <a:prstGeom prst="rect">
+            <a:avLst/>
+          </a:prstGeom>
+        </p:spPr>
+        <p:txBody>
+          <a:bodyPr vert="horz" lIns="91440" tIns="45720" rIns="91440" bIns="45720" rtlCol="0"/>
+          <a:lstStyle>
+            <a:lvl1pPr algn="l">
+              <a:defRPr sz="1200"/>
+            </a:lvl1pPr>
+          </a:lstStyle>
+          <a:p>
+            <a:endParaRPr lang="en-US"/>
+          </a:p>
+        </p:txBody>
+      </p:sp>
+      <p:sp>
+        <p:nvSpPr>
+          <p:cNvPr id="3" name="Date Placeholder 2"/>
+          <p:cNvSpPr>
+            <a:spLocks noGrp="1"/>
+          </p:cNvSpPr>
+          <p:nvPr>
+            <p:ph type="dt" idx="1"/>
+          </p:nvPr>
+        </p:nvSpPr>
+        <p:spPr>
+          <a:xfrm>
+            <a:off x="3884613" y="0"/>
+            <a:ext cx="2971800" cy="458788"/>
+          </a:xfrm>
+          <a:prstGeom prst="rect">
+            <a:avLst/>
+          </a:prstGeom>
+        </p:spPr>
+        <p:txBody>
+          <a:bodyPr vert="horz" lIns="91440" tIns="45720" rIns="91440" bIns="45720" rtlCol="0"/>
+          <a:lstStyle>
+            <a:lvl1pPr algn="r">
+              <a:defRPr sz="1200"/>
+            </a:lvl1pPr>
+          </a:lstStyle>
+          <a:p>
+            <a:fld id="{BB4130D4-9E38-F249-8C93-63150D1F1BF8}" type="datetimeFigureOut">
+              <a:rPr lang="en-US" smtClean="0"/>
+              <a:t>1/21/21</a:t>
+            </a:fld>
+            <a:endParaRPr lang="en-US"/>
+          </a:p>
+        </p:txBody>
+      </p:sp>
+      <p:sp>
+        <p:nvSpPr>
+          <p:cNvPr id="4" name="Slide Image Placeholder 3"/>
+          <p:cNvSpPr>
+            <a:spLocks noGrp="1" noRot="1" noChangeAspect="1"/>
+          </p:cNvSpPr>
+          <p:nvPr>
+            <p:ph type="sldImg" idx="2"/>
+          </p:nvPr>
+        </p:nvSpPr>
+        <p:spPr>
+          <a:xfrm>
+            <a:off x="685800" y="1143000"/>
+            <a:ext cx="5486400" cy="3086100"/>
+          </a:xfrm>
+          <a:prstGeom prst="rect">
+            <a:avLst/>
+          </a:prstGeom>
+          <a:noFill/>
+          <a:ln w="12700">
+            <a:solidFill>
+              <a:prstClr val="black"/>
+            </a:solidFill>
+          </a:ln>
+        </p:spPr>
+        <p:txBody>
+          <a:bodyPr vert="horz" lIns="91440" tIns="45720" rIns="91440" bIns="45720" rtlCol="0" anchor="ctr"/>
+          <a:lstStyle/>
+          <a:p>
+            <a:endParaRPr lang="en-US"/>
+          </a:p>
+        </p:txBody>
+      </p:sp>
+      <p:sp>
+        <p:nvSpPr>
+          <p:cNvPr id="5" name="Notes Placeholder 4"/>
+          <p:cNvSpPr>
+            <a:spLocks noGrp="1"/>
+          </p:cNvSpPr>
+          <p:nvPr>
+            <p:ph type="body" sz="quarter" idx="3"/>
+          </p:nvPr>
+        </p:nvSpPr>
+        <p:spPr>
+          <a:xfrm>
+            <a:off x="685800" y="4400550"/>
+            <a:ext cx="5486400" cy="3600450"/>
+          </a:xfrm>
+          <a:prstGeom prst="rect">
+            <a:avLst/>
+          </a:prstGeom>
+        </p:spPr>
+        <p:txBody>
+          <a:bodyPr vert="horz" lIns="91440" tIns="45720" rIns="91440" bIns="45720" rtlCol="0"/>
+          <a:lstStyle/>
+          <a:p>
+            <a:pPr lvl="0"/>
+            <a:r>
+              <a:rPr lang="en-US"/>
+              <a:t>Edit Master text styles</a:t>
+            </a:r>
+          </a:p>
+          <a:p>
+            <a:pPr lvl="1"/>
+            <a:r>
+              <a:rPr lang="en-US"/>
+              <a:t>Second level</a:t>
+            </a:r>
+          </a:p>
+          <a:p>
+            <a:pPr lvl="2"/>
+            <a:r>
+              <a:rPr lang="en-US"/>
+              <a:t>Third level</a:t>
+            </a:r>
+          </a:p>
+          <a:p>
+            <a:pPr lvl="3"/>
+            <a:r>
+              <a:rPr lang="en-US"/>
+              <a:t>Fourth level</a:t>
+            </a:r>
+          </a:p>
+          <a:p>
+            <a:pPr lvl="4"/>
+            <a:r>
+              <a:rPr lang="en-US"/>
+              <a:t>Fifth level</a:t>
+            </a:r>
+          </a:p>
+        </p:txBody>
+      </p:sp>
+      <p:sp>
+        <p:nvSpPr>
+          <p:cNvPr id="6" name="Footer Placeholder 5"/>
+          <p:cNvSpPr>
+            <a:spLocks noGrp="1"/>
+          </p:cNvSpPr>
+          <p:nvPr>
+            <p:ph type="ftr" sz="quarter" idx="4"/>
+          </p:nvPr>
+        </p:nvSpPr>
+        <p:spPr>
+          <a:xfrm>
+            <a:off x="0" y="8685213"/>
+            <a:ext cx="2971800" cy="458787"/>
+          </a:xfrm>
+          <a:prstGeom prst="rect">
+            <a:avLst/>
+          </a:prstGeom>
+        </p:spPr>
+        <p:txBody>
+          <a:bodyPr vert="horz" lIns="91440" tIns="45720" rIns="91440" bIns="45720" rtlCol="0" anchor="b"/>
+          <a:lstStyle>
+            <a:lvl1pPr algn="l">
+              <a:defRPr sz="1200"/>
+            </a:lvl1pPr>
+          </a:lstStyle>
+          <a:p>
+            <a:endParaRPr lang="en-US"/>
+          </a:p>
+        </p:txBody>
+      </p:sp>
+      <p:sp>
+        <p:nvSpPr>
+          <p:cNvPr id="7" name="Slide Number Placeholder 6"/>
+          <p:cNvSpPr>
+            <a:spLocks noGrp="1"/>
+          </p:cNvSpPr>
+          <p:nvPr>
+            <p:ph type="sldNum" sz="quarter" idx="5"/>
+          </p:nvPr>
+        </p:nvSpPr>
+        <p:spPr>
+          <a:xfrm>
+            <a:off x="3884613" y="8685213"/>
+            <a:ext cx="2971800" cy="458787"/>
+          </a:xfrm>
+          <a:prstGeom prst="rect">
+            <a:avLst/>
+          </a:prstGeom>
+        </p:spPr>
+        <p:txBody>
+          <a:bodyPr vert="horz" lIns="91440" tIns="45720" rIns="91440" bIns="45720" rtlCol="0" anchor="b"/>
+          <a:lstStyle>
+            <a:lvl1pPr algn="r">
+              <a:defRPr sz="1200"/>
+            </a:lvl1pPr>
+          </a:lstStyle>
+          <a:p>
+            <a:fld id="{E72535D6-AF72-F146-A52C-46A094F6F60F}" type="slidenum">
+              <a:rPr lang="en-US" smtClean="0"/>
+              <a:t>‹#›</a:t>
+            </a:fld>
+            <a:endParaRPr lang="en-US"/>
+          </a:p>
+        </p:txBody>
+      </p:sp>
+    </p:spTree>
+    <p:extLst>
+      <p:ext uri="{BB962C8B-B14F-4D97-AF65-F5344CB8AC3E}">
+        <p14:creationId xmlns:p14="http://schemas.microsoft.com/office/powerpoint/2010/main" val="2967257558"/>
+      </p:ext>
+    </p:extLst>
+  </p:cSld>
+  <p:clrMap bg1="lt1" tx1="dk1" bg2="lt2" tx2="dk2" accent1="accent1" accent2="accent2" accent3="accent3" accent4="accent4" accent5="accent5" accent6="accent6" hlink="hlink" folHlink="folHlink"/>
+  <p:notesStyle>
+    <a:lvl1pPr marL="0" algn="l" defTabSz="914400" rtl="0" eaLnBrk="1" latinLnBrk="0" hangingPunct="1">
+      <a:defRPr sz="1200" kern="1200">
+        <a:solidFill>
+          <a:schemeClr val="tx1"/>
+        </a:solidFill>
+        <a:latin typeface="+mn-lt"/>
+        <a:ea typeface="+mn-ea"/>
+        <a:cs typeface="+mn-cs"/>
+      </a:defRPr>
+    </a:lvl1pPr>
+    <a:lvl2pPr marL="457200" algn="l" defTabSz="914400" rtl="0" eaLnBrk="1" latinLnBrk="0" hangingPunct="1">
+      <a:defRPr sz="1200" kern="1200">
+        <a:solidFill>
+          <a:schemeClr val="tx1"/>
+        </a:solidFill>
+        <a:latin typeface="+mn-lt"/>
+        <a:ea typeface="+mn-ea"/>
+        <a:cs typeface="+mn-cs"/>
+      </a:defRPr>
+    </a:lvl2pPr>
+    <a:lvl3pPr marL="914400" algn="l" defTabSz="914400" rtl="0" eaLnBrk="1" latinLnBrk="0" hangingPunct="1">
+      <a:defRPr sz="1200" kern="1200">
+        <a:solidFill>
+          <a:schemeClr val="tx1"/>
+        </a:solidFill>
+        <a:latin typeface="+mn-lt"/>
+        <a:ea typeface="+mn-ea"/>
+        <a:cs typeface="+mn-cs"/>
+      </a:defRPr>
+    </a:lvl3pPr>
+    <a:lvl4pPr marL="1371600" algn="l" defTabSz="914400" rtl="0" eaLnBrk="1" latinLnBrk="0" hangingPunct="1">
+      <a:defRPr sz="1200" kern="1200">
+        <a:solidFill>
+          <a:schemeClr val="tx1"/>
+        </a:solidFill>
+        <a:latin typeface="+mn-lt"/>
+        <a:ea typeface="+mn-ea"/>
+        <a:cs typeface="+mn-cs"/>
+      </a:defRPr>
+    </a:lvl4pPr>
+    <a:lvl5pPr marL="1828800" algn="l" defTabSz="914400" rtl="0" eaLnBrk="1" latinLnBrk="0" hangingPunct="1">
+      <a:defRPr sz="1200" kern="1200">
+        <a:solidFill>
+          <a:schemeClr val="tx1"/>
+        </a:solidFill>
+        <a:latin typeface="+mn-lt"/>
+        <a:ea typeface="+mn-ea"/>
+        <a:cs typeface="+mn-cs"/>
+      </a:defRPr>
+    </a:lvl5pPr>
+    <a:lvl6pPr marL="2286000" algn="l" defTabSz="914400" rtl="0" eaLnBrk="1" latinLnBrk="0" hangingPunct="1">
+      <a:defRPr sz="1200" kern="1200">
+        <a:solidFill>
+          <a:schemeClr val="tx1"/>
+        </a:solidFill>
+        <a:latin typeface="+mn-lt"/>
+        <a:ea typeface="+mn-ea"/>
+        <a:cs typeface="+mn-cs"/>
+      </a:defRPr>
+    </a:lvl6pPr>
+    <a:lvl7pPr marL="2743200" algn="l" defTabSz="914400" rtl="0" eaLnBrk="1" latinLnBrk="0" hangingPunct="1">
+      <a:defRPr sz="1200" kern="1200">
+        <a:solidFill>
+          <a:schemeClr val="tx1"/>
+        </a:solidFill>
+        <a:latin typeface="+mn-lt"/>
+        <a:ea typeface="+mn-ea"/>
+        <a:cs typeface="+mn-cs"/>
+      </a:defRPr>
+    </a:lvl7pPr>
+    <a:lvl8pPr marL="3200400" algn="l" defTabSz="914400" rtl="0" eaLnBrk="1" latinLnBrk="0" hangingPunct="1">
+      <a:defRPr sz="1200" kern="1200">
+        <a:solidFill>
+          <a:schemeClr val="tx1"/>
+        </a:solidFill>
+        <a:latin typeface="+mn-lt"/>
+        <a:ea typeface="+mn-ea"/>
+        <a:cs typeface="+mn-cs"/>
+      </a:defRPr>
+    </a:lvl8pPr>
+    <a:lvl9pPr marL="3657600" algn="l" defTabSz="914400" rtl="0" eaLnBrk="1" latinLnBrk="0" hangingPunct="1">
+      <a:defRPr sz="1200" kern="1200">
+        <a:solidFill>
+          <a:schemeClr val="tx1"/>
+        </a:solidFill>
+        <a:latin typeface="+mn-lt"/>
+        <a:ea typeface="+mn-ea"/>
+        <a:cs typeface="+mn-cs"/>
+      </a:defRPr>
+    </a:lvl9pPr>
+  </p:notesStyle>
+</p:notesMaster>
+</file>
+
+<file path=ppt/notesSlides/notesSlide1.xml><?xml version="1.0" encoding="utf-8"?>
+<p:notes xmlns:a="http://schemas.openxmlformats.org/drawingml/2006/main" xmlns:r="http://schemas.openxmlformats.org/officeDocument/2006/relationships" xmlns:p="http://schemas.openxmlformats.org/presentationml/2006/main">
+  <p:cSld>
+    <p:spTree>
+      <p:nvGrpSpPr>
+        <p:cNvPr id="1" name=""/>
+        <p:cNvGrpSpPr/>
+        <p:nvPr/>
+      </p:nvGrpSpPr>
+      <p:grpSpPr>
+        <a:xfrm>
+          <a:off x="0" y="0"/>
+          <a:ext cx="0" cy="0"/>
+          <a:chOff x="0" y="0"/>
+          <a:chExt cx="0" cy="0"/>
+        </a:xfrm>
+      </p:grpSpPr>
+      <p:sp>
+        <p:nvSpPr>
+          <p:cNvPr id="2" name="Slide Image Placeholder 1"/>
+          <p:cNvSpPr>
+            <a:spLocks noGrp="1" noRot="1" noChangeAspect="1"/>
+          </p:cNvSpPr>
+          <p:nvPr>
+            <p:ph type="sldImg"/>
+          </p:nvPr>
+        </p:nvSpPr>
+        <p:spPr/>
+      </p:sp>
+      <p:sp>
+        <p:nvSpPr>
+          <p:cNvPr id="3" name="Notes Placeholder 2"/>
+          <p:cNvSpPr>
+            <a:spLocks noGrp="1"/>
+          </p:cNvSpPr>
+          <p:nvPr>
+            <p:ph type="body" idx="1"/>
+          </p:nvPr>
+        </p:nvSpPr>
+        <p:spPr/>
+        <p:txBody>
+          <a:bodyPr/>
+          <a:lstStyle/>
+          <a:p>
+            <a:pPr marL="0" marR="0" lvl="0" indent="0" algn="l" defTabSz="914400" rtl="0" eaLnBrk="1" fontAlgn="auto" latinLnBrk="0" hangingPunct="1">
+              <a:lnSpc>
+                <a:spcPct val="100000"/>
+              </a:lnSpc>
+              <a:spcBef>
+                <a:spcPts val="0"/>
+              </a:spcBef>
+              <a:spcAft>
+                <a:spcPts val="0"/>
+              </a:spcAft>
+              <a:buClrTx/>
+              <a:buSzTx/>
+              <a:buFontTx/>
+              <a:buNone/>
+              <a:tabLst/>
+              <a:defRPr/>
+            </a:pPr>
+            <a:r>
+              <a:rPr lang="en-US" dirty="0"/>
+              <a:t>Originally I scraped the CDC website directly, aiming to predict weekly deaths or some other measure, however that was too fine of a granularity to model.</a:t>
+            </a:r>
+          </a:p>
+          <a:p>
+            <a:endParaRPr lang="en-US" dirty="0"/>
+          </a:p>
+        </p:txBody>
+      </p:sp>
+      <p:sp>
+        <p:nvSpPr>
+          <p:cNvPr id="4" name="Slide Number Placeholder 3"/>
+          <p:cNvSpPr>
+            <a:spLocks noGrp="1"/>
+          </p:cNvSpPr>
+          <p:nvPr>
+            <p:ph type="sldNum" sz="quarter" idx="5"/>
+          </p:nvPr>
+        </p:nvSpPr>
+        <p:spPr/>
+        <p:txBody>
+          <a:bodyPr/>
+          <a:lstStyle/>
+          <a:p>
+            <a:fld id="{E72535D6-AF72-F146-A52C-46A094F6F60F}" type="slidenum">
+              <a:rPr lang="en-US" smtClean="0"/>
+              <a:t>2</a:t>
+            </a:fld>
+            <a:endParaRPr lang="en-US"/>
+          </a:p>
+        </p:txBody>
+      </p:sp>
+    </p:spTree>
+    <p:extLst>
+      <p:ext uri="{BB962C8B-B14F-4D97-AF65-F5344CB8AC3E}">
+        <p14:creationId xmlns:p14="http://schemas.microsoft.com/office/powerpoint/2010/main" val="3081413770"/>
+      </p:ext>
+    </p:extLst>
+  </p:cSld>
+  <p:clrMapOvr>
+    <a:masterClrMapping/>
+  </p:clrMapOvr>
+</p:notes>
+</file>
+
+<file path=ppt/notesSlides/notesSlide2.xml><?xml version="1.0" encoding="utf-8"?>
+<p:notes xmlns:a="http://schemas.openxmlformats.org/drawingml/2006/main" xmlns:r="http://schemas.openxmlformats.org/officeDocument/2006/relationships" xmlns:p="http://schemas.openxmlformats.org/presentationml/2006/main">
+  <p:cSld>
+    <p:spTree>
+      <p:nvGrpSpPr>
+        <p:cNvPr id="1" name=""/>
+        <p:cNvGrpSpPr/>
+        <p:nvPr/>
+      </p:nvGrpSpPr>
+      <p:grpSpPr>
+        <a:xfrm>
+          <a:off x="0" y="0"/>
+          <a:ext cx="0" cy="0"/>
+          <a:chOff x="0" y="0"/>
+          <a:chExt cx="0" cy="0"/>
+        </a:xfrm>
+      </p:grpSpPr>
+      <p:sp>
+        <p:nvSpPr>
+          <p:cNvPr id="2" name="Slide Image Placeholder 1"/>
+          <p:cNvSpPr>
+            <a:spLocks noGrp="1" noRot="1" noChangeAspect="1"/>
+          </p:cNvSpPr>
+          <p:nvPr>
+            <p:ph type="sldImg"/>
+          </p:nvPr>
+        </p:nvSpPr>
+        <p:spPr/>
+      </p:sp>
+      <p:sp>
+        <p:nvSpPr>
+          <p:cNvPr id="3" name="Notes Placeholder 2"/>
+          <p:cNvSpPr>
+            <a:spLocks noGrp="1"/>
+          </p:cNvSpPr>
+          <p:nvPr>
+            <p:ph type="body" idx="1"/>
+          </p:nvPr>
+        </p:nvSpPr>
+        <p:spPr/>
+        <p:txBody>
+          <a:bodyPr/>
+          <a:lstStyle/>
+          <a:p>
+            <a:r>
+              <a:rPr lang="en-US" dirty="0"/>
+              <a:t>Model Tests:</a:t>
+            </a:r>
+          </a:p>
+          <a:p>
+            <a:pPr lvl="1"/>
+            <a:r>
+              <a:rPr lang="en-US" dirty="0"/>
+              <a:t>Linear regression with and without polynomial features</a:t>
+            </a:r>
+          </a:p>
+          <a:p>
+            <a:pPr lvl="1"/>
+            <a:r>
+              <a:rPr lang="en-US" dirty="0"/>
+              <a:t>Lasso and ridge regression with scaled features, with and without polynomial features</a:t>
+            </a:r>
+          </a:p>
+          <a:p>
+            <a:endParaRPr lang="en-US" dirty="0"/>
+          </a:p>
+        </p:txBody>
+      </p:sp>
+      <p:sp>
+        <p:nvSpPr>
+          <p:cNvPr id="4" name="Slide Number Placeholder 3"/>
+          <p:cNvSpPr>
+            <a:spLocks noGrp="1"/>
+          </p:cNvSpPr>
+          <p:nvPr>
+            <p:ph type="sldNum" sz="quarter" idx="5"/>
+          </p:nvPr>
+        </p:nvSpPr>
+        <p:spPr/>
+        <p:txBody>
+          <a:bodyPr/>
+          <a:lstStyle/>
+          <a:p>
+            <a:fld id="{E72535D6-AF72-F146-A52C-46A094F6F60F}" type="slidenum">
+              <a:rPr lang="en-US" smtClean="0"/>
+              <a:t>8</a:t>
+            </a:fld>
+            <a:endParaRPr lang="en-US"/>
+          </a:p>
+        </p:txBody>
+      </p:sp>
+    </p:spTree>
+    <p:extLst>
+      <p:ext uri="{BB962C8B-B14F-4D97-AF65-F5344CB8AC3E}">
+        <p14:creationId xmlns:p14="http://schemas.microsoft.com/office/powerpoint/2010/main" val="3594136320"/>
+      </p:ext>
+    </p:extLst>
+  </p:cSld>
+  <p:clrMapOvr>
+    <a:masterClrMapping/>
+  </p:clrMapOvr>
+</p:notes>
+</file>
+
+<file path=ppt/notesSlides/notesSlide3.xml><?xml version="1.0" encoding="utf-8"?>
+<p:notes xmlns:a="http://schemas.openxmlformats.org/drawingml/2006/main" xmlns:r="http://schemas.openxmlformats.org/officeDocument/2006/relationships" xmlns:p="http://schemas.openxmlformats.org/presentationml/2006/main">
+  <p:cSld>
+    <p:spTree>
+      <p:nvGrpSpPr>
+        <p:cNvPr id="1" name=""/>
+        <p:cNvGrpSpPr/>
+        <p:nvPr/>
+      </p:nvGrpSpPr>
+      <p:grpSpPr>
+        <a:xfrm>
+          <a:off x="0" y="0"/>
+          <a:ext cx="0" cy="0"/>
+          <a:chOff x="0" y="0"/>
+          <a:chExt cx="0" cy="0"/>
+        </a:xfrm>
+      </p:grpSpPr>
+      <p:sp>
+        <p:nvSpPr>
+          <p:cNvPr id="2" name="Slide Image Placeholder 1"/>
+          <p:cNvSpPr>
+            <a:spLocks noGrp="1" noRot="1" noChangeAspect="1"/>
+          </p:cNvSpPr>
+          <p:nvPr>
+            <p:ph type="sldImg"/>
+          </p:nvPr>
+        </p:nvSpPr>
+        <p:spPr/>
+      </p:sp>
+      <p:sp>
+        <p:nvSpPr>
+          <p:cNvPr id="3" name="Notes Placeholder 2"/>
+          <p:cNvSpPr>
+            <a:spLocks noGrp="1"/>
+          </p:cNvSpPr>
+          <p:nvPr>
+            <p:ph type="body" idx="1"/>
+          </p:nvPr>
+        </p:nvSpPr>
+        <p:spPr/>
+        <p:txBody>
+          <a:bodyPr/>
+          <a:lstStyle/>
+          <a:p>
+            <a:r>
+              <a:rPr lang="en-US" dirty="0"/>
+              <a:t>It took my a while even to get to this r2 so I’m happy with it.</a:t>
+            </a:r>
+          </a:p>
+        </p:txBody>
+      </p:sp>
+      <p:sp>
+        <p:nvSpPr>
+          <p:cNvPr id="4" name="Slide Number Placeholder 3"/>
+          <p:cNvSpPr>
+            <a:spLocks noGrp="1"/>
+          </p:cNvSpPr>
+          <p:nvPr>
+            <p:ph type="sldNum" sz="quarter" idx="5"/>
+          </p:nvPr>
+        </p:nvSpPr>
+        <p:spPr/>
+        <p:txBody>
+          <a:bodyPr/>
+          <a:lstStyle/>
+          <a:p>
+            <a:fld id="{E72535D6-AF72-F146-A52C-46A094F6F60F}" type="slidenum">
+              <a:rPr lang="en-US" smtClean="0"/>
+              <a:t>11</a:t>
+            </a:fld>
+            <a:endParaRPr lang="en-US"/>
+          </a:p>
+        </p:txBody>
+      </p:sp>
+    </p:spTree>
+    <p:extLst>
+      <p:ext uri="{BB962C8B-B14F-4D97-AF65-F5344CB8AC3E}">
+        <p14:creationId xmlns:p14="http://schemas.microsoft.com/office/powerpoint/2010/main" val="1019573638"/>
+      </p:ext>
+    </p:extLst>
+  </p:cSld>
+  <p:clrMapOvr>
+    <a:masterClrMapping/>
+  </p:clrMapOvr>
+</p:notes>
+</file>
+
+<file path=ppt/notesSlides/notesSlide4.xml><?xml version="1.0" encoding="utf-8"?>
+<p:notes xmlns:a="http://schemas.openxmlformats.org/drawingml/2006/main" xmlns:r="http://schemas.openxmlformats.org/officeDocument/2006/relationships" xmlns:p="http://schemas.openxmlformats.org/presentationml/2006/main">
+  <p:cSld>
+    <p:spTree>
+      <p:nvGrpSpPr>
+        <p:cNvPr id="1" name=""/>
+        <p:cNvGrpSpPr/>
+        <p:nvPr/>
+      </p:nvGrpSpPr>
+      <p:grpSpPr>
+        <a:xfrm>
+          <a:off x="0" y="0"/>
+          <a:ext cx="0" cy="0"/>
+          <a:chOff x="0" y="0"/>
+          <a:chExt cx="0" cy="0"/>
+        </a:xfrm>
+      </p:grpSpPr>
+      <p:sp>
+        <p:nvSpPr>
+          <p:cNvPr id="2" name="Slide Image Placeholder 1"/>
+          <p:cNvSpPr>
+            <a:spLocks noGrp="1" noRot="1" noChangeAspect="1"/>
+          </p:cNvSpPr>
+          <p:nvPr>
+            <p:ph type="sldImg"/>
+          </p:nvPr>
+        </p:nvSpPr>
+        <p:spPr/>
+      </p:sp>
+      <p:sp>
+        <p:nvSpPr>
+          <p:cNvPr id="3" name="Notes Placeholder 2"/>
+          <p:cNvSpPr>
+            <a:spLocks noGrp="1"/>
+          </p:cNvSpPr>
+          <p:nvPr>
+            <p:ph type="body" idx="1"/>
+          </p:nvPr>
+        </p:nvSpPr>
+        <p:spPr/>
+        <p:txBody>
+          <a:bodyPr/>
+          <a:lstStyle/>
+          <a:p>
+            <a:endParaRPr lang="en-US" dirty="0"/>
+          </a:p>
+        </p:txBody>
+      </p:sp>
+      <p:sp>
+        <p:nvSpPr>
+          <p:cNvPr id="4" name="Slide Number Placeholder 3"/>
+          <p:cNvSpPr>
+            <a:spLocks noGrp="1"/>
+          </p:cNvSpPr>
+          <p:nvPr>
+            <p:ph type="sldNum" sz="quarter" idx="5"/>
+          </p:nvPr>
+        </p:nvSpPr>
+        <p:spPr/>
+        <p:txBody>
+          <a:bodyPr/>
+          <a:lstStyle/>
+          <a:p>
+            <a:fld id="{E72535D6-AF72-F146-A52C-46A094F6F60F}" type="slidenum">
+              <a:rPr lang="en-US" smtClean="0"/>
+              <a:t>12</a:t>
+            </a:fld>
+            <a:endParaRPr lang="en-US"/>
+          </a:p>
+        </p:txBody>
+      </p:sp>
+    </p:spTree>
+    <p:extLst>
+      <p:ext uri="{BB962C8B-B14F-4D97-AF65-F5344CB8AC3E}">
+        <p14:creationId xmlns:p14="http://schemas.microsoft.com/office/powerpoint/2010/main" val="4010903038"/>
+      </p:ext>
+    </p:extLst>
+  </p:cSld>
+  <p:clrMapOvr>
+    <a:masterClrMapping/>
+  </p:clrMapOvr>
+</p:notes>
+</file>
+
 <file path=ppt/slideLayouts/slideLayout1.xml><?xml version="1.0" encoding="utf-8"?>
 <p:sldLayout xmlns:a="http://schemas.openxmlformats.org/drawingml/2006/main" xmlns:r="http://schemas.openxmlformats.org/officeDocument/2006/relationships" xmlns:p="http://schemas.openxmlformats.org/presentationml/2006/main" type="title" preserve="1">
   <p:cSld name="Title Slide">
@@ -270,7 +1005,7 @@
           <a:bodyPr/>
           <a:lstStyle/>
           <a:p>
-            <a:fld id="{399C1540-7636-4540-BFF0-808BE39D942D}" type="datetimeFigureOut">
+            <a:fld id="{CC87DCAD-A4CC-7249-9776-2190E5FEBA6E}" type="datetime1">
               <a:rPr lang="en-US" smtClean="0"/>
               <a:t>1/21/21</a:t>
             </a:fld>
@@ -468,7 +1203,7 @@
           <a:bodyPr/>
           <a:lstStyle/>
           <a:p>
-            <a:fld id="{399C1540-7636-4540-BFF0-808BE39D942D}" type="datetimeFigureOut">
+            <a:fld id="{470D71E7-E1C0-3948-973E-603E3753D03F}" type="datetime1">
               <a:rPr lang="en-US" smtClean="0"/>
               <a:t>1/21/21</a:t>
             </a:fld>
@@ -676,7 +1411,7 @@
           <a:bodyPr/>
           <a:lstStyle/>
           <a:p>
-            <a:fld id="{399C1540-7636-4540-BFF0-808BE39D942D}" type="datetimeFigureOut">
+            <a:fld id="{2C073078-D276-2F43-97C8-5669C3EBFE2B}" type="datetime1">
               <a:rPr lang="en-US" smtClean="0"/>
               <a:t>1/21/21</a:t>
             </a:fld>
@@ -874,7 +1609,7 @@
           <a:bodyPr/>
           <a:lstStyle/>
           <a:p>
-            <a:fld id="{399C1540-7636-4540-BFF0-808BE39D942D}" type="datetimeFigureOut">
+            <a:fld id="{CA82F58D-4D79-2A46-BF35-7CB471325BBC}" type="datetime1">
               <a:rPr lang="en-US" smtClean="0"/>
               <a:t>1/21/21</a:t>
             </a:fld>
@@ -1149,7 +1884,7 @@
           <a:bodyPr/>
           <a:lstStyle/>
           <a:p>
-            <a:fld id="{399C1540-7636-4540-BFF0-808BE39D942D}" type="datetimeFigureOut">
+            <a:fld id="{37460737-122E-2842-AF76-C8CC41C962D0}" type="datetime1">
               <a:rPr lang="en-US" smtClean="0"/>
               <a:t>1/21/21</a:t>
             </a:fld>
@@ -1414,7 +2149,7 @@
           <a:bodyPr/>
           <a:lstStyle/>
           <a:p>
-            <a:fld id="{399C1540-7636-4540-BFF0-808BE39D942D}" type="datetimeFigureOut">
+            <a:fld id="{2A597AC1-FB57-AF4E-9559-80B25BDDF272}" type="datetime1">
               <a:rPr lang="en-US" smtClean="0"/>
               <a:t>1/21/21</a:t>
             </a:fld>
@@ -1826,7 +2561,7 @@
           <a:bodyPr/>
           <a:lstStyle/>
           <a:p>
-            <a:fld id="{399C1540-7636-4540-BFF0-808BE39D942D}" type="datetimeFigureOut">
+            <a:fld id="{22A70501-658E-FD4B-8D23-7158E7533E7A}" type="datetime1">
               <a:rPr lang="en-US" smtClean="0"/>
               <a:t>1/21/21</a:t>
             </a:fld>
@@ -1967,7 +2702,7 @@
           <a:bodyPr/>
           <a:lstStyle/>
           <a:p>
-            <a:fld id="{399C1540-7636-4540-BFF0-808BE39D942D}" type="datetimeFigureOut">
+            <a:fld id="{CF9D02AC-B8E3-9142-B448-C8EE4B2DAEC1}" type="datetime1">
               <a:rPr lang="en-US" smtClean="0"/>
               <a:t>1/21/21</a:t>
             </a:fld>
@@ -2080,7 +2815,7 @@
           <a:bodyPr/>
           <a:lstStyle/>
           <a:p>
-            <a:fld id="{399C1540-7636-4540-BFF0-808BE39D942D}" type="datetimeFigureOut">
+            <a:fld id="{1A7A7770-7BF5-7F4C-8CE2-A551CA6037B2}" type="datetime1">
               <a:rPr lang="en-US" smtClean="0"/>
               <a:t>1/21/21</a:t>
             </a:fld>
@@ -2391,7 +3126,7 @@
           <a:bodyPr/>
           <a:lstStyle/>
           <a:p>
-            <a:fld id="{399C1540-7636-4540-BFF0-808BE39D942D}" type="datetimeFigureOut">
+            <a:fld id="{411D084F-0914-E24A-97C8-3BC3B076711C}" type="datetime1">
               <a:rPr lang="en-US" smtClean="0"/>
               <a:t>1/21/21</a:t>
             </a:fld>
@@ -2679,7 +3414,7 @@
           <a:bodyPr/>
           <a:lstStyle/>
           <a:p>
-            <a:fld id="{399C1540-7636-4540-BFF0-808BE39D942D}" type="datetimeFigureOut">
+            <a:fld id="{17B0F6BF-2D9C-4C42-8B79-7EECDED4AC9D}" type="datetime1">
               <a:rPr lang="en-US" smtClean="0"/>
               <a:t>1/21/21</a:t>
             </a:fld>
@@ -2920,7 +3655,7 @@
             </a:lvl1pPr>
           </a:lstStyle>
           <a:p>
-            <a:fld id="{399C1540-7636-4540-BFF0-808BE39D942D}" type="datetimeFigureOut">
+            <a:fld id="{9FA5DF35-96B5-264C-BC56-EF555528F450}" type="datetime1">
               <a:rPr lang="en-US" smtClean="0"/>
               <a:t>1/21/21</a:t>
             </a:fld>
@@ -3039,6 +3774,7 @@
     <p:sldLayoutId id="2147483658" r:id="rId10"/>
     <p:sldLayoutId id="2147483659" r:id="rId11"/>
   </p:sldLayoutIdLst>
+  <p:hf hdr="0" ftr="0" dt="0"/>
   <p:txStyles>
     <p:titleStyle>
       <a:lvl1pPr algn="l" defTabSz="914400" rtl="0" eaLnBrk="1" latinLnBrk="0" hangingPunct="1">
@@ -3395,7 +4131,7 @@
         </p:spPr>
         <p:txBody>
           <a:bodyPr>
-            <a:normAutofit/>
+            <a:normAutofit fontScale="90000"/>
           </a:bodyPr>
           <a:lstStyle/>
           <a:p>
@@ -3409,6 +4145,13 @@
             <a:r>
               <a:rPr lang="en-US" dirty="0"/>
               <a:t>at the US County Level</a:t>
+            </a:r>
+            <a:br>
+              <a:rPr lang="en-US" dirty="0"/>
+            </a:br>
+            <a:r>
+              <a:rPr lang="en-US" dirty="0"/>
+              <a:t>Using Census Data</a:t>
             </a:r>
           </a:p>
         </p:txBody>
@@ -3449,6 +4192,35 @@
               <a:rPr lang="en-US" dirty="0"/>
               <a:t>1/22/2021</a:t>
             </a:r>
+          </a:p>
+        </p:txBody>
+      </p:sp>
+      <p:sp>
+        <p:nvSpPr>
+          <p:cNvPr id="6" name="Slide Number Placeholder 5">
+            <a:extLst>
+              <a:ext uri="{FF2B5EF4-FFF2-40B4-BE49-F238E27FC236}">
+                <a16:creationId xmlns:a16="http://schemas.microsoft.com/office/drawing/2014/main" id="{929DD015-86B6-9840-B334-60B5EB8CF1E5}"/>
+              </a:ext>
+            </a:extLst>
+          </p:cNvPr>
+          <p:cNvSpPr>
+            <a:spLocks noGrp="1"/>
+          </p:cNvSpPr>
+          <p:nvPr>
+            <p:ph type="sldNum" sz="quarter" idx="12"/>
+          </p:nvPr>
+        </p:nvSpPr>
+        <p:spPr/>
+        <p:txBody>
+          <a:bodyPr/>
+          <a:lstStyle/>
+          <a:p>
+            <a:fld id="{609275CF-5549-3C4A-B9B9-4367A562B0FC}" type="slidenum">
+              <a:rPr lang="en-US" smtClean="0"/>
+              <a:t>1</a:t>
+            </a:fld>
+            <a:endParaRPr lang="en-US"/>
           </a:p>
         </p:txBody>
       </p:sp>
@@ -3484,10 +4256,10 @@
       </p:grpSpPr>
       <p:pic>
         <p:nvPicPr>
-          <p:cNvPr id="5" name="Picture 4">
-            <a:extLst>
-              <a:ext uri="{FF2B5EF4-FFF2-40B4-BE49-F238E27FC236}">
-                <a16:creationId xmlns:a16="http://schemas.microsoft.com/office/drawing/2014/main" id="{F501AEC5-2765-0A4C-B1F4-91170928E95B}"/>
+          <p:cNvPr id="9" name="Picture 8">
+            <a:extLst>
+              <a:ext uri="{FF2B5EF4-FFF2-40B4-BE49-F238E27FC236}">
+                <a16:creationId xmlns:a16="http://schemas.microsoft.com/office/drawing/2014/main" id="{1B2E061C-0C26-7146-AB71-54D8B257618A}"/>
               </a:ext>
             </a:extLst>
           </p:cNvPr>
@@ -3504,8 +4276,8 @@
         </p:blipFill>
         <p:spPr>
           <a:xfrm>
-            <a:off x="1524000" y="2514600"/>
-            <a:ext cx="9144000" cy="1828800"/>
+            <a:off x="6315076" y="1700511"/>
+            <a:ext cx="5703578" cy="5157489"/>
           </a:xfrm>
           <a:prstGeom prst="rect">
             <a:avLst/>
@@ -3514,10 +4286,10 @@
       </p:pic>
       <p:pic>
         <p:nvPicPr>
-          <p:cNvPr id="7" name="Picture 6">
-            <a:extLst>
-              <a:ext uri="{FF2B5EF4-FFF2-40B4-BE49-F238E27FC236}">
-                <a16:creationId xmlns:a16="http://schemas.microsoft.com/office/drawing/2014/main" id="{5E821FEE-68EC-AC4E-B379-8A6E8F3E0A9F}"/>
+          <p:cNvPr id="12" name="Picture 11">
+            <a:extLst>
+              <a:ext uri="{FF2B5EF4-FFF2-40B4-BE49-F238E27FC236}">
+                <a16:creationId xmlns:a16="http://schemas.microsoft.com/office/drawing/2014/main" id="{66F71642-DA34-0941-8A52-2EA048EA07F9}"/>
               </a:ext>
             </a:extLst>
           </p:cNvPr>
@@ -3534,78 +4306,595 @@
         </p:blipFill>
         <p:spPr>
           <a:xfrm>
-            <a:off x="1674000" y="2664600"/>
-            <a:ext cx="9144000" cy="1828800"/>
+            <a:off x="6803937" y="28818"/>
+            <a:ext cx="5186141" cy="1709612"/>
           </a:xfrm>
           <a:prstGeom prst="rect">
             <a:avLst/>
           </a:prstGeom>
         </p:spPr>
       </p:pic>
-      <p:pic>
-        <p:nvPicPr>
-          <p:cNvPr id="9" name="Picture 8">
-            <a:extLst>
-              <a:ext uri="{FF2B5EF4-FFF2-40B4-BE49-F238E27FC236}">
-                <a16:creationId xmlns:a16="http://schemas.microsoft.com/office/drawing/2014/main" id="{CE47551E-DC50-0E4A-A2E8-CCF3A2AF0F7B}"/>
-              </a:ext>
-            </a:extLst>
-          </p:cNvPr>
-          <p:cNvPicPr>
-            <a:picLocks noChangeAspect="1"/>
-          </p:cNvPicPr>
-          <p:nvPr/>
-        </p:nvPicPr>
-        <p:blipFill>
-          <a:blip r:embed="rId4"/>
-          <a:stretch>
-            <a:fillRect/>
-          </a:stretch>
-        </p:blipFill>
+      <p:sp>
+        <p:nvSpPr>
+          <p:cNvPr id="13" name="Title 1">
+            <a:extLst>
+              <a:ext uri="{FF2B5EF4-FFF2-40B4-BE49-F238E27FC236}">
+                <a16:creationId xmlns:a16="http://schemas.microsoft.com/office/drawing/2014/main" id="{9D57C83D-7577-B84C-8879-7C38E126301B}"/>
+              </a:ext>
+            </a:extLst>
+          </p:cNvPr>
+          <p:cNvSpPr>
+            <a:spLocks noGrp="1"/>
+          </p:cNvSpPr>
+          <p:nvPr>
+            <p:ph type="title"/>
+          </p:nvPr>
+        </p:nvSpPr>
         <p:spPr>
           <a:xfrm>
-            <a:off x="2586000" y="300000"/>
-            <a:ext cx="7620000" cy="6858000"/>
+            <a:off x="0" y="-147493"/>
+            <a:ext cx="10515600" cy="1325563"/>
+          </a:xfrm>
+        </p:spPr>
+        <p:txBody>
+          <a:bodyPr/>
+          <a:lstStyle/>
+          <a:p>
+            <a:r>
+              <a:rPr lang="en-US" dirty="0"/>
+              <a:t>Polynomial Coefficients</a:t>
+            </a:r>
+          </a:p>
+        </p:txBody>
+      </p:sp>
+      <p:graphicFrame>
+        <p:nvGraphicFramePr>
+          <p:cNvPr id="14" name="Content Placeholder 3">
+            <a:extLst>
+              <a:ext uri="{FF2B5EF4-FFF2-40B4-BE49-F238E27FC236}">
+                <a16:creationId xmlns:a16="http://schemas.microsoft.com/office/drawing/2014/main" id="{829CCE6B-7EFC-994A-AAAE-0753B920910C}"/>
+              </a:ext>
+            </a:extLst>
+          </p:cNvPr>
+          <p:cNvGraphicFramePr>
+            <a:graphicFrameLocks noGrp="1"/>
+          </p:cNvGraphicFramePr>
+          <p:nvPr>
+            <p:ph idx="1"/>
+            <p:extLst>
+              <p:ext uri="{D42A27DB-BD31-4B8C-83A1-F6EECF244321}">
+                <p14:modId xmlns:p14="http://schemas.microsoft.com/office/powerpoint/2010/main" val="405982057"/>
+              </p:ext>
+            </p:extLst>
+          </p:nvPr>
+        </p:nvGraphicFramePr>
+        <p:xfrm>
+          <a:off x="198785" y="1067233"/>
+          <a:ext cx="5744815" cy="5466496"/>
+        </p:xfrm>
+        <a:graphic>
+          <a:graphicData uri="http://schemas.openxmlformats.org/drawingml/2006/table">
+            <a:tbl>
+              <a:tblPr firstRow="1" bandRow="1">
+                <a:tableStyleId>{5C22544A-7EE6-4342-B048-85BDC9FD1C3A}</a:tableStyleId>
+              </a:tblPr>
+              <a:tblGrid>
+                <a:gridCol w="671084">
+                  <a:extLst>
+                    <a:ext uri="{9D8B030D-6E8A-4147-A177-3AD203B41FA5}">
+                      <a16:colId xmlns:a16="http://schemas.microsoft.com/office/drawing/2014/main" val="1199048234"/>
+                    </a:ext>
+                  </a:extLst>
+                </a:gridCol>
+                <a:gridCol w="5073731">
+                  <a:extLst>
+                    <a:ext uri="{9D8B030D-6E8A-4147-A177-3AD203B41FA5}">
+                      <a16:colId xmlns:a16="http://schemas.microsoft.com/office/drawing/2014/main" val="2624638580"/>
+                    </a:ext>
+                  </a:extLst>
+                </a:gridCol>
+              </a:tblGrid>
+              <a:tr h="369776">
+                <a:tc>
+                  <a:txBody>
+                    <a:bodyPr/>
+                    <a:lstStyle/>
+                    <a:p>
+                      <a:r>
+                        <a:rPr lang="en-US" sz="1500" dirty="0"/>
+                        <a:t>#</a:t>
+                      </a:r>
+                    </a:p>
+                  </a:txBody>
+                  <a:tcPr marL="77428" marR="77428" marT="38714" marB="38714"/>
+                </a:tc>
+                <a:tc>
+                  <a:txBody>
+                    <a:bodyPr/>
+                    <a:lstStyle/>
+                    <a:p>
+                      <a:r>
+                        <a:rPr lang="en-US" sz="1500" dirty="0"/>
+                        <a:t>Feature</a:t>
+                      </a:r>
+                    </a:p>
+                  </a:txBody>
+                  <a:tcPr marL="77428" marR="77428" marT="38714" marB="38714"/>
+                </a:tc>
+                <a:extLst>
+                  <a:ext uri="{0D108BD9-81ED-4DB2-BD59-A6C34878D82A}">
+                    <a16:rowId xmlns:a16="http://schemas.microsoft.com/office/drawing/2014/main" val="1178283472"/>
+                  </a:ext>
+                </a:extLst>
+              </a:tr>
+              <a:tr h="369776">
+                <a:tc>
+                  <a:txBody>
+                    <a:bodyPr/>
+                    <a:lstStyle/>
+                    <a:p>
+                      <a:r>
+                        <a:rPr lang="en-US" sz="1500" dirty="0"/>
+                        <a:t>0</a:t>
+                      </a:r>
+                    </a:p>
+                  </a:txBody>
+                  <a:tcPr marL="77428" marR="77428" marT="38714" marB="38714"/>
+                </a:tc>
+                <a:tc>
+                  <a:txBody>
+                    <a:bodyPr/>
+                    <a:lstStyle/>
+                    <a:p>
+                      <a:r>
+                        <a:rPr lang="en-US" sz="1500" dirty="0"/>
+                        <a:t>Persons 65 years and over, percent</a:t>
+                      </a:r>
+                    </a:p>
+                  </a:txBody>
+                  <a:tcPr marL="77428" marR="77428" marT="38714" marB="38714"/>
+                </a:tc>
+                <a:extLst>
+                  <a:ext uri="{0D108BD9-81ED-4DB2-BD59-A6C34878D82A}">
+                    <a16:rowId xmlns:a16="http://schemas.microsoft.com/office/drawing/2014/main" val="2078290512"/>
+                  </a:ext>
+                </a:extLst>
+              </a:tr>
+              <a:tr h="369776">
+                <a:tc>
+                  <a:txBody>
+                    <a:bodyPr/>
+                    <a:lstStyle/>
+                    <a:p>
+                      <a:r>
+                        <a:rPr lang="en-US" sz="1500" dirty="0"/>
+                        <a:t>1</a:t>
+                      </a:r>
+                    </a:p>
+                  </a:txBody>
+                  <a:tcPr marL="77428" marR="77428" marT="38714" marB="38714"/>
+                </a:tc>
+                <a:tc>
+                  <a:txBody>
+                    <a:bodyPr/>
+                    <a:lstStyle/>
+                    <a:p>
+                      <a:r>
+                        <a:rPr lang="en-US" sz="1500" dirty="0"/>
+                        <a:t>Black or African American alone, percent</a:t>
+                      </a:r>
+                    </a:p>
+                  </a:txBody>
+                  <a:tcPr marL="77428" marR="77428" marT="38714" marB="38714"/>
+                </a:tc>
+                <a:extLst>
+                  <a:ext uri="{0D108BD9-81ED-4DB2-BD59-A6C34878D82A}">
+                    <a16:rowId xmlns:a16="http://schemas.microsoft.com/office/drawing/2014/main" val="1436940839"/>
+                  </a:ext>
+                </a:extLst>
+              </a:tr>
+              <a:tr h="369776">
+                <a:tc>
+                  <a:txBody>
+                    <a:bodyPr/>
+                    <a:lstStyle/>
+                    <a:p>
+                      <a:r>
+                        <a:rPr lang="en-US" sz="1500" dirty="0"/>
+                        <a:t>2</a:t>
+                      </a:r>
+                    </a:p>
+                  </a:txBody>
+                  <a:tcPr marL="77428" marR="77428" marT="38714" marB="38714"/>
+                </a:tc>
+                <a:tc>
+                  <a:txBody>
+                    <a:bodyPr/>
+                    <a:lstStyle/>
+                    <a:p>
+                      <a:r>
+                        <a:rPr lang="en-US" sz="1500" dirty="0"/>
+                        <a:t>Two or More Races, percent</a:t>
+                      </a:r>
+                    </a:p>
+                  </a:txBody>
+                  <a:tcPr marL="77428" marR="77428" marT="38714" marB="38714"/>
+                </a:tc>
+                <a:extLst>
+                  <a:ext uri="{0D108BD9-81ED-4DB2-BD59-A6C34878D82A}">
+                    <a16:rowId xmlns:a16="http://schemas.microsoft.com/office/drawing/2014/main" val="3570573743"/>
+                  </a:ext>
+                </a:extLst>
+              </a:tr>
+              <a:tr h="369776">
+                <a:tc>
+                  <a:txBody>
+                    <a:bodyPr/>
+                    <a:lstStyle/>
+                    <a:p>
+                      <a:r>
+                        <a:rPr lang="en-US" sz="1500" dirty="0"/>
+                        <a:t>3</a:t>
+                      </a:r>
+                    </a:p>
+                  </a:txBody>
+                  <a:tcPr marL="77428" marR="77428" marT="38714" marB="38714"/>
+                </a:tc>
+                <a:tc>
+                  <a:txBody>
+                    <a:bodyPr/>
+                    <a:lstStyle/>
+                    <a:p>
+                      <a:r>
+                        <a:rPr lang="en-US" sz="1500" dirty="0"/>
+                        <a:t>White alone, not Hispanic or Latino, percent</a:t>
+                      </a:r>
+                    </a:p>
+                  </a:txBody>
+                  <a:tcPr marL="77428" marR="77428" marT="38714" marB="38714"/>
+                </a:tc>
+                <a:extLst>
+                  <a:ext uri="{0D108BD9-81ED-4DB2-BD59-A6C34878D82A}">
+                    <a16:rowId xmlns:a16="http://schemas.microsoft.com/office/drawing/2014/main" val="2896382475"/>
+                  </a:ext>
+                </a:extLst>
+              </a:tr>
+              <a:tr h="369776">
+                <a:tc>
+                  <a:txBody>
+                    <a:bodyPr/>
+                    <a:lstStyle/>
+                    <a:p>
+                      <a:r>
+                        <a:rPr lang="en-US" sz="1500" dirty="0"/>
+                        <a:t>4</a:t>
+                      </a:r>
+                    </a:p>
+                  </a:txBody>
+                  <a:tcPr marL="77428" marR="77428" marT="38714" marB="38714"/>
+                </a:tc>
+                <a:tc>
+                  <a:txBody>
+                    <a:bodyPr/>
+                    <a:lstStyle/>
+                    <a:p>
+                      <a:r>
+                        <a:rPr lang="en-US" sz="1500" dirty="0"/>
+                        <a:t>Median value of owner-occupied housing units, 2015-2019 </a:t>
+                      </a:r>
+                    </a:p>
+                  </a:txBody>
+                  <a:tcPr marL="77428" marR="77428" marT="38714" marB="38714"/>
+                </a:tc>
+                <a:extLst>
+                  <a:ext uri="{0D108BD9-81ED-4DB2-BD59-A6C34878D82A}">
+                    <a16:rowId xmlns:a16="http://schemas.microsoft.com/office/drawing/2014/main" val="4235064515"/>
+                  </a:ext>
+                </a:extLst>
+              </a:tr>
+              <a:tr h="369776">
+                <a:tc>
+                  <a:txBody>
+                    <a:bodyPr/>
+                    <a:lstStyle/>
+                    <a:p>
+                      <a:r>
+                        <a:rPr lang="en-US" sz="1500" dirty="0"/>
+                        <a:t>5</a:t>
+                      </a:r>
+                    </a:p>
+                  </a:txBody>
+                  <a:tcPr marL="77428" marR="77428" marT="38714" marB="38714"/>
+                </a:tc>
+                <a:tc>
+                  <a:txBody>
+                    <a:bodyPr/>
+                    <a:lstStyle/>
+                    <a:p>
+                      <a:r>
+                        <a:rPr lang="en-US" sz="1500" dirty="0"/>
+                        <a:t>Living in same house 1 year ago, percent of persons age 1 year+, 2015-2019</a:t>
+                      </a:r>
+                    </a:p>
+                  </a:txBody>
+                  <a:tcPr marL="77428" marR="77428" marT="38714" marB="38714"/>
+                </a:tc>
+                <a:extLst>
+                  <a:ext uri="{0D108BD9-81ED-4DB2-BD59-A6C34878D82A}">
+                    <a16:rowId xmlns:a16="http://schemas.microsoft.com/office/drawing/2014/main" val="3165814813"/>
+                  </a:ext>
+                </a:extLst>
+              </a:tr>
+              <a:tr h="369776">
+                <a:tc>
+                  <a:txBody>
+                    <a:bodyPr/>
+                    <a:lstStyle/>
+                    <a:p>
+                      <a:r>
+                        <a:rPr lang="en-US" sz="1500" dirty="0"/>
+                        <a:t>6</a:t>
+                      </a:r>
+                    </a:p>
+                  </a:txBody>
+                  <a:tcPr marL="77428" marR="77428" marT="38714" marB="38714"/>
+                </a:tc>
+                <a:tc>
+                  <a:txBody>
+                    <a:bodyPr/>
+                    <a:lstStyle/>
+                    <a:p>
+                      <a:r>
+                        <a:rPr lang="en-US" sz="1500" dirty="0"/>
+                        <a:t>Households with a computer, percent, 2015-2019</a:t>
+                      </a:r>
+                    </a:p>
+                  </a:txBody>
+                  <a:tcPr marL="77428" marR="77428" marT="38714" marB="38714"/>
+                </a:tc>
+                <a:extLst>
+                  <a:ext uri="{0D108BD9-81ED-4DB2-BD59-A6C34878D82A}">
+                    <a16:rowId xmlns:a16="http://schemas.microsoft.com/office/drawing/2014/main" val="2165247043"/>
+                  </a:ext>
+                </a:extLst>
+              </a:tr>
+              <a:tr h="369776">
+                <a:tc>
+                  <a:txBody>
+                    <a:bodyPr/>
+                    <a:lstStyle/>
+                    <a:p>
+                      <a:r>
+                        <a:rPr lang="en-US" sz="1500" dirty="0"/>
+                        <a:t>7</a:t>
+                      </a:r>
+                    </a:p>
+                  </a:txBody>
+                  <a:tcPr marL="77428" marR="77428" marT="38714" marB="38714"/>
+                </a:tc>
+                <a:tc>
+                  <a:txBody>
+                    <a:bodyPr/>
+                    <a:lstStyle/>
+                    <a:p>
+                      <a:r>
+                        <a:rPr lang="en-US" sz="1500" dirty="0"/>
+                        <a:t>Households with a broadband Internet subscription, percent, 2015-2019</a:t>
+                      </a:r>
+                    </a:p>
+                  </a:txBody>
+                  <a:tcPr marL="77428" marR="77428" marT="38714" marB="38714"/>
+                </a:tc>
+                <a:extLst>
+                  <a:ext uri="{0D108BD9-81ED-4DB2-BD59-A6C34878D82A}">
+                    <a16:rowId xmlns:a16="http://schemas.microsoft.com/office/drawing/2014/main" val="760539201"/>
+                  </a:ext>
+                </a:extLst>
+              </a:tr>
+              <a:tr h="369776">
+                <a:tc>
+                  <a:txBody>
+                    <a:bodyPr/>
+                    <a:lstStyle/>
+                    <a:p>
+                      <a:r>
+                        <a:rPr lang="en-US" sz="1500" dirty="0"/>
+                        <a:t>8</a:t>
+                      </a:r>
+                    </a:p>
+                  </a:txBody>
+                  <a:tcPr marL="77428" marR="77428" marT="38714" marB="38714"/>
+                </a:tc>
+                <a:tc>
+                  <a:txBody>
+                    <a:bodyPr/>
+                    <a:lstStyle/>
+                    <a:p>
+                      <a:r>
+                        <a:rPr lang="en-US" sz="1500" dirty="0"/>
+                        <a:t>High school graduate or higher, percent of persons age 25 years+, 2015-2019</a:t>
+                      </a:r>
+                    </a:p>
+                  </a:txBody>
+                  <a:tcPr marL="77428" marR="77428" marT="38714" marB="38714"/>
+                </a:tc>
+                <a:extLst>
+                  <a:ext uri="{0D108BD9-81ED-4DB2-BD59-A6C34878D82A}">
+                    <a16:rowId xmlns:a16="http://schemas.microsoft.com/office/drawing/2014/main" val="2249850362"/>
+                  </a:ext>
+                </a:extLst>
+              </a:tr>
+              <a:tr h="369776">
+                <a:tc>
+                  <a:txBody>
+                    <a:bodyPr/>
+                    <a:lstStyle/>
+                    <a:p>
+                      <a:r>
+                        <a:rPr lang="en-US" sz="1500" dirty="0"/>
+                        <a:t>9</a:t>
+                      </a:r>
+                    </a:p>
+                  </a:txBody>
+                  <a:tcPr marL="77428" marR="77428" marT="38714" marB="38714"/>
+                </a:tc>
+                <a:tc>
+                  <a:txBody>
+                    <a:bodyPr/>
+                    <a:lstStyle/>
+                    <a:p>
+                      <a:r>
+                        <a:rPr lang="en-US" sz="1500" dirty="0"/>
+                        <a:t>Bachelor's degree or higher, percent of persons age 25 years+, 2015-2019</a:t>
+                      </a:r>
+                    </a:p>
+                  </a:txBody>
+                  <a:tcPr marL="77428" marR="77428" marT="38714" marB="38714"/>
+                </a:tc>
+                <a:extLst>
+                  <a:ext uri="{0D108BD9-81ED-4DB2-BD59-A6C34878D82A}">
+                    <a16:rowId xmlns:a16="http://schemas.microsoft.com/office/drawing/2014/main" val="337149661"/>
+                  </a:ext>
+                </a:extLst>
+              </a:tr>
+              <a:tr h="369776">
+                <a:tc>
+                  <a:txBody>
+                    <a:bodyPr/>
+                    <a:lstStyle/>
+                    <a:p>
+                      <a:r>
+                        <a:rPr lang="en-US" sz="1500" dirty="0"/>
+                        <a:t>10</a:t>
+                      </a:r>
+                    </a:p>
+                  </a:txBody>
+                  <a:tcPr marL="77428" marR="77428" marT="38714" marB="38714"/>
+                </a:tc>
+                <a:tc>
+                  <a:txBody>
+                    <a:bodyPr/>
+                    <a:lstStyle/>
+                    <a:p>
+                      <a:r>
+                        <a:rPr lang="en-US" sz="1500" dirty="0"/>
+                        <a:t>Median household income (in 2019 dollars), 2015-2019</a:t>
+                      </a:r>
+                    </a:p>
+                  </a:txBody>
+                  <a:tcPr marL="77428" marR="77428" marT="38714" marB="38714"/>
+                </a:tc>
+                <a:extLst>
+                  <a:ext uri="{0D108BD9-81ED-4DB2-BD59-A6C34878D82A}">
+                    <a16:rowId xmlns:a16="http://schemas.microsoft.com/office/drawing/2014/main" val="3484026797"/>
+                  </a:ext>
+                </a:extLst>
+              </a:tr>
+              <a:tr h="369776">
+                <a:tc>
+                  <a:txBody>
+                    <a:bodyPr/>
+                    <a:lstStyle/>
+                    <a:p>
+                      <a:r>
+                        <a:rPr lang="en-US" sz="1500" dirty="0"/>
+                        <a:t>11</a:t>
+                      </a:r>
+                    </a:p>
+                  </a:txBody>
+                  <a:tcPr marL="77428" marR="77428" marT="38714" marB="38714"/>
+                </a:tc>
+                <a:tc>
+                  <a:txBody>
+                    <a:bodyPr/>
+                    <a:lstStyle/>
+                    <a:p>
+                      <a:r>
+                        <a:rPr lang="en-US" sz="1500" dirty="0"/>
+                        <a:t>Persons without health insurance, under age 65 years, percent</a:t>
+                      </a:r>
+                    </a:p>
+                  </a:txBody>
+                  <a:tcPr marL="77428" marR="77428" marT="38714" marB="38714"/>
+                </a:tc>
+                <a:extLst>
+                  <a:ext uri="{0D108BD9-81ED-4DB2-BD59-A6C34878D82A}">
+                    <a16:rowId xmlns:a16="http://schemas.microsoft.com/office/drawing/2014/main" val="817399837"/>
+                  </a:ext>
+                </a:extLst>
+              </a:tr>
+            </a:tbl>
+          </a:graphicData>
+        </a:graphic>
+      </p:graphicFrame>
+      <p:sp>
+        <p:nvSpPr>
+          <p:cNvPr id="15" name="TextBox 14">
+            <a:extLst>
+              <a:ext uri="{FF2B5EF4-FFF2-40B4-BE49-F238E27FC236}">
+                <a16:creationId xmlns:a16="http://schemas.microsoft.com/office/drawing/2014/main" id="{36671CB2-E7C6-8E45-A39D-8AA4988AB4E0}"/>
+              </a:ext>
+            </a:extLst>
+          </p:cNvPr>
+          <p:cNvSpPr txBox="1"/>
+          <p:nvPr/>
+        </p:nvSpPr>
+        <p:spPr>
+          <a:xfrm>
+            <a:off x="6990750" y="5306291"/>
+            <a:ext cx="2156873" cy="369332"/>
           </a:xfrm>
           <a:prstGeom prst="rect">
             <a:avLst/>
           </a:prstGeom>
+          <a:noFill/>
         </p:spPr>
-      </p:pic>
-      <p:pic>
-        <p:nvPicPr>
-          <p:cNvPr id="11" name="Picture 10">
-            <a:extLst>
-              <a:ext uri="{FF2B5EF4-FFF2-40B4-BE49-F238E27FC236}">
-                <a16:creationId xmlns:a16="http://schemas.microsoft.com/office/drawing/2014/main" id="{0098160C-A7E8-8A48-ACB5-AA4786E78C59}"/>
-              </a:ext>
-            </a:extLst>
-          </p:cNvPr>
-          <p:cNvPicPr>
-            <a:picLocks noChangeAspect="1"/>
-          </p:cNvPicPr>
-          <p:nvPr/>
-        </p:nvPicPr>
-        <p:blipFill>
-          <a:blip r:embed="rId5"/>
-          <a:stretch>
-            <a:fillRect/>
-          </a:stretch>
-        </p:blipFill>
-        <p:spPr>
-          <a:xfrm>
-            <a:off x="2736000" y="450000"/>
-            <a:ext cx="7620000" cy="6858000"/>
-          </a:xfrm>
-          <a:prstGeom prst="rect">
-            <a:avLst/>
-          </a:prstGeom>
-        </p:spPr>
-      </p:pic>
+        <p:txBody>
+          <a:bodyPr wrap="none" rtlCol="0">
+            <a:spAutoFit/>
+          </a:bodyPr>
+          <a:lstStyle/>
+          <a:p>
+            <a:r>
+              <a:rPr lang="en-US" dirty="0"/>
+              <a:t>(matrix is symmetric)</a:t>
+            </a:r>
+          </a:p>
+        </p:txBody>
+      </p:sp>
+      <p:sp>
+        <p:nvSpPr>
+          <p:cNvPr id="16" name="Slide Number Placeholder 15">
+            <a:extLst>
+              <a:ext uri="{FF2B5EF4-FFF2-40B4-BE49-F238E27FC236}">
+                <a16:creationId xmlns:a16="http://schemas.microsoft.com/office/drawing/2014/main" id="{FDF28F73-313B-1149-9E27-EA241F86D552}"/>
+              </a:ext>
+            </a:extLst>
+          </p:cNvPr>
+          <p:cNvSpPr>
+            <a:spLocks noGrp="1"/>
+          </p:cNvSpPr>
+          <p:nvPr>
+            <p:ph type="sldNum" sz="quarter" idx="12"/>
+          </p:nvPr>
+        </p:nvSpPr>
+        <p:spPr/>
+        <p:txBody>
+          <a:bodyPr/>
+          <a:lstStyle/>
+          <a:p>
+            <a:fld id="{609275CF-5549-3C4A-B9B9-4367A562B0FC}" type="slidenum">
+              <a:rPr lang="en-US" smtClean="0"/>
+              <a:t>10</a:t>
+            </a:fld>
+            <a:endParaRPr lang="en-US"/>
+          </a:p>
+        </p:txBody>
+      </p:sp>
     </p:spTree>
     <p:extLst>
       <p:ext uri="{BB962C8B-B14F-4D97-AF65-F5344CB8AC3E}">
-        <p14:creationId xmlns:p14="http://schemas.microsoft.com/office/powerpoint/2010/main" val="2365396721"/>
+        <p14:creationId xmlns:p14="http://schemas.microsoft.com/office/powerpoint/2010/main" val="1173688015"/>
       </p:ext>
     </p:extLst>
   </p:cSld>
@@ -3632,129 +4921,135 @@
           <a:chExt cx="0" cy="0"/>
         </a:xfrm>
       </p:grpSpPr>
-      <p:pic>
-        <p:nvPicPr>
-          <p:cNvPr id="34" name="Picture 33">
-            <a:extLst>
-              <a:ext uri="{FF2B5EF4-FFF2-40B4-BE49-F238E27FC236}">
-                <a16:creationId xmlns:a16="http://schemas.microsoft.com/office/drawing/2014/main" id="{82A06525-FFD1-2242-A2D0-6343B61E2716}"/>
-              </a:ext>
-            </a:extLst>
-          </p:cNvPr>
-          <p:cNvPicPr>
-            <a:picLocks noChangeAspect="1"/>
-          </p:cNvPicPr>
-          <p:nvPr/>
-        </p:nvPicPr>
-        <p:blipFill>
-          <a:blip r:embed="rId2"/>
-          <a:stretch>
-            <a:fillRect/>
-          </a:stretch>
-        </p:blipFill>
-        <p:spPr>
-          <a:xfrm>
-            <a:off x="6109854" y="623454"/>
-            <a:ext cx="6248400" cy="3124200"/>
-          </a:xfrm>
-          <a:prstGeom prst="rect">
-            <a:avLst/>
-          </a:prstGeom>
-        </p:spPr>
-      </p:pic>
-      <p:pic>
-        <p:nvPicPr>
-          <p:cNvPr id="35" name="Picture 34">
-            <a:extLst>
-              <a:ext uri="{FF2B5EF4-FFF2-40B4-BE49-F238E27FC236}">
-                <a16:creationId xmlns:a16="http://schemas.microsoft.com/office/drawing/2014/main" id="{DF29A3C1-D6C5-B94C-8FF5-43D7BF9D2107}"/>
-              </a:ext>
-            </a:extLst>
-          </p:cNvPr>
-          <p:cNvPicPr>
-            <a:picLocks noChangeAspect="1"/>
-          </p:cNvPicPr>
-          <p:nvPr/>
-        </p:nvPicPr>
-        <p:blipFill>
-          <a:blip r:embed="rId3"/>
-          <a:stretch>
-            <a:fillRect/>
-          </a:stretch>
-        </p:blipFill>
-        <p:spPr>
-          <a:xfrm>
-            <a:off x="277091" y="256309"/>
-            <a:ext cx="6400800" cy="6400800"/>
-          </a:xfrm>
-          <a:prstGeom prst="rect">
-            <a:avLst/>
-          </a:prstGeom>
-        </p:spPr>
-      </p:pic>
-      <p:sp>
-        <p:nvSpPr>
-          <p:cNvPr id="36" name="TextBox 35">
-            <a:extLst>
-              <a:ext uri="{FF2B5EF4-FFF2-40B4-BE49-F238E27FC236}">
-                <a16:creationId xmlns:a16="http://schemas.microsoft.com/office/drawing/2014/main" id="{E6C0960E-09E1-8A4E-80A8-C8F6B9365351}"/>
-              </a:ext>
-            </a:extLst>
-          </p:cNvPr>
-          <p:cNvSpPr txBox="1"/>
-          <p:nvPr/>
-        </p:nvSpPr>
-        <p:spPr>
-          <a:xfrm>
-            <a:off x="6677891" y="4114799"/>
-            <a:ext cx="5112327" cy="2462213"/>
-          </a:xfrm>
-          <a:prstGeom prst="rect">
-            <a:avLst/>
-          </a:prstGeom>
-          <a:noFill/>
-        </p:spPr>
-        <p:txBody>
-          <a:bodyPr wrap="square" rtlCol="0">
-            <a:spAutoFit/>
-          </a:bodyPr>
-          <a:lstStyle/>
-          <a:p>
-            <a:pPr marL="285750" indent="-285750">
-              <a:buFont typeface="Arial" panose="020B0604020202020204" pitchFamily="34" charset="0"/>
-              <a:buChar char="•"/>
+      <p:sp>
+        <p:nvSpPr>
+          <p:cNvPr id="2" name="Title 1">
+            <a:extLst>
+              <a:ext uri="{FF2B5EF4-FFF2-40B4-BE49-F238E27FC236}">
+                <a16:creationId xmlns:a16="http://schemas.microsoft.com/office/drawing/2014/main" id="{30855D2E-FA3D-BA40-97C1-9DDD4BC8969F}"/>
+              </a:ext>
+            </a:extLst>
+          </p:cNvPr>
+          <p:cNvSpPr>
+            <a:spLocks noGrp="1"/>
+          </p:cNvSpPr>
+          <p:nvPr>
+            <p:ph type="title"/>
+          </p:nvPr>
+        </p:nvSpPr>
+        <p:spPr/>
+        <p:txBody>
+          <a:bodyPr/>
+          <a:lstStyle/>
+          <a:p>
+            <a:r>
+              <a:rPr lang="en-US" dirty="0"/>
+              <a:t>Final Model Results</a:t>
+            </a:r>
+          </a:p>
+        </p:txBody>
+      </p:sp>
+      <p:sp>
+        <p:nvSpPr>
+          <p:cNvPr id="3" name="Content Placeholder 2">
+            <a:extLst>
+              <a:ext uri="{FF2B5EF4-FFF2-40B4-BE49-F238E27FC236}">
+                <a16:creationId xmlns:a16="http://schemas.microsoft.com/office/drawing/2014/main" id="{77DB341F-6332-384C-971A-AAC12A4425D3}"/>
+              </a:ext>
+            </a:extLst>
+          </p:cNvPr>
+          <p:cNvSpPr>
+            <a:spLocks noGrp="1"/>
+          </p:cNvSpPr>
+          <p:nvPr>
+            <p:ph idx="1"/>
+          </p:nvPr>
+        </p:nvSpPr>
+        <p:spPr/>
+        <p:txBody>
+          <a:bodyPr/>
+          <a:lstStyle/>
+          <a:p>
+            <a:pPr marL="0" indent="0">
+              <a:buNone/>
             </a:pPr>
-            <a:r>
-              <a:rPr lang="en-US" sz="2200" dirty="0"/>
-              <a:t>Residuals are relatively happy</a:t>
-            </a:r>
-          </a:p>
-          <a:p>
-            <a:pPr marL="285750" indent="-285750">
-              <a:buFont typeface="Arial" panose="020B0604020202020204" pitchFamily="34" charset="0"/>
-              <a:buChar char="•"/>
-            </a:pPr>
-            <a:r>
-              <a:rPr lang="en-US" sz="2200" dirty="0"/>
-              <a:t>The predicted vs actual plot shows that my model tends to overestimate the number of deaths</a:t>
-            </a:r>
-          </a:p>
-          <a:p>
-            <a:pPr marL="285750" indent="-285750">
-              <a:buFont typeface="Arial" panose="020B0604020202020204" pitchFamily="34" charset="0"/>
-              <a:buChar char="•"/>
-            </a:pPr>
-            <a:r>
-              <a:rPr lang="en-US" sz="2200" dirty="0"/>
-              <a:t>Ultimately, the explained variance would need to be improved for the model to be of any real use</a:t>
-            </a:r>
+            <a:endParaRPr lang="en-US" dirty="0"/>
+          </a:p>
+          <a:p>
+            <a:r>
+              <a:rPr lang="en-US" dirty="0"/>
+              <a:t>r</a:t>
+            </a:r>
+            <a:r>
+              <a:rPr lang="en-US" baseline="30000" dirty="0"/>
+              <a:t>2</a:t>
+            </a:r>
+            <a:r>
+              <a:rPr lang="en-US" dirty="0"/>
+              <a:t> = 32%</a:t>
+            </a:r>
+          </a:p>
+          <a:p>
+            <a:pPr lvl="1"/>
+            <a:r>
+              <a:rPr lang="en-US" dirty="0"/>
+              <a:t>The unexplained variance is high</a:t>
+            </a:r>
+          </a:p>
+          <a:p>
+            <a:pPr lvl="1"/>
+            <a:r>
+              <a:rPr lang="en-US" dirty="0"/>
+              <a:t>I’m not surprised by this considering the complexity of the problem</a:t>
+            </a:r>
+          </a:p>
+          <a:p>
+            <a:r>
+              <a:rPr lang="en-US" dirty="0"/>
+              <a:t>MAE = 182.1 Deaths per 100k</a:t>
+            </a:r>
+          </a:p>
+          <a:p>
+            <a:r>
+              <a:rPr lang="en-US" dirty="0"/>
+              <a:t>RMSE = 205.5 Deaths per 100k </a:t>
+            </a:r>
+          </a:p>
+        </p:txBody>
+      </p:sp>
+      <p:sp>
+        <p:nvSpPr>
+          <p:cNvPr id="4" name="Slide Number Placeholder 3">
+            <a:extLst>
+              <a:ext uri="{FF2B5EF4-FFF2-40B4-BE49-F238E27FC236}">
+                <a16:creationId xmlns:a16="http://schemas.microsoft.com/office/drawing/2014/main" id="{21BA1488-2EA6-9048-9406-71CF2F123C1D}"/>
+              </a:ext>
+            </a:extLst>
+          </p:cNvPr>
+          <p:cNvSpPr>
+            <a:spLocks noGrp="1"/>
+          </p:cNvSpPr>
+          <p:nvPr>
+            <p:ph type="sldNum" sz="quarter" idx="12"/>
+          </p:nvPr>
+        </p:nvSpPr>
+        <p:spPr/>
+        <p:txBody>
+          <a:bodyPr/>
+          <a:lstStyle/>
+          <a:p>
+            <a:fld id="{609275CF-5549-3C4A-B9B9-4367A562B0FC}" type="slidenum">
+              <a:rPr lang="en-US" smtClean="0"/>
+              <a:t>11</a:t>
+            </a:fld>
+            <a:endParaRPr lang="en-US"/>
           </a:p>
         </p:txBody>
       </p:sp>
     </p:spTree>
     <p:extLst>
       <p:ext uri="{BB962C8B-B14F-4D97-AF65-F5344CB8AC3E}">
-        <p14:creationId xmlns:p14="http://schemas.microsoft.com/office/powerpoint/2010/main" val="1775091389"/>
+        <p14:creationId xmlns:p14="http://schemas.microsoft.com/office/powerpoint/2010/main" val="325592695"/>
       </p:ext>
     </p:extLst>
   </p:cSld>
@@ -3832,6 +5127,12 @@
           <a:p>
             <a:r>
               <a:rPr lang="en-US" dirty="0"/>
+              <a:t>Ultimately the model would need to be improved significantly for it to be of any real use</a:t>
+            </a:r>
+          </a:p>
+          <a:p>
+            <a:r>
+              <a:rPr lang="en-US" dirty="0"/>
               <a:t>Other features could be included to improve the model</a:t>
             </a:r>
           </a:p>
@@ -3843,7 +5144,47 @@
             </a:r>
           </a:p>
           <a:p>
-            <a:endParaRPr lang="en-US" dirty="0"/>
+            <a:pPr lvl="1"/>
+            <a:r>
+              <a:rPr lang="en-US" dirty="0"/>
+              <a:t>Time features, other data</a:t>
+            </a:r>
+          </a:p>
+          <a:p>
+            <a:pPr lvl="1"/>
+            <a:r>
+              <a:rPr lang="en-US" dirty="0"/>
+              <a:t>More sophisticated calculations on those features</a:t>
+            </a:r>
+          </a:p>
+        </p:txBody>
+      </p:sp>
+      <p:sp>
+        <p:nvSpPr>
+          <p:cNvPr id="4" name="Slide Number Placeholder 3">
+            <a:extLst>
+              <a:ext uri="{FF2B5EF4-FFF2-40B4-BE49-F238E27FC236}">
+                <a16:creationId xmlns:a16="http://schemas.microsoft.com/office/drawing/2014/main" id="{3FB634D8-10DD-584B-B144-AE7D6FC8D4F1}"/>
+              </a:ext>
+            </a:extLst>
+          </p:cNvPr>
+          <p:cNvSpPr>
+            <a:spLocks noGrp="1"/>
+          </p:cNvSpPr>
+          <p:nvPr>
+            <p:ph type="sldNum" sz="quarter" idx="12"/>
+          </p:nvPr>
+        </p:nvSpPr>
+        <p:spPr/>
+        <p:txBody>
+          <a:bodyPr/>
+          <a:lstStyle/>
+          <a:p>
+            <a:fld id="{609275CF-5549-3C4A-B9B9-4367A562B0FC}" type="slidenum">
+              <a:rPr lang="en-US" smtClean="0"/>
+              <a:t>12</a:t>
+            </a:fld>
+            <a:endParaRPr lang="en-US"/>
           </a:p>
         </p:txBody>
       </p:sp>
@@ -3930,6 +5271,35 @@
           </a:p>
         </p:txBody>
       </p:sp>
+      <p:sp>
+        <p:nvSpPr>
+          <p:cNvPr id="4" name="Slide Number Placeholder 3">
+            <a:extLst>
+              <a:ext uri="{FF2B5EF4-FFF2-40B4-BE49-F238E27FC236}">
+                <a16:creationId xmlns:a16="http://schemas.microsoft.com/office/drawing/2014/main" id="{6A35F1E4-3CB2-674C-8B81-53927E352770}"/>
+              </a:ext>
+            </a:extLst>
+          </p:cNvPr>
+          <p:cNvSpPr>
+            <a:spLocks noGrp="1"/>
+          </p:cNvSpPr>
+          <p:nvPr>
+            <p:ph type="sldNum" sz="quarter" idx="12"/>
+          </p:nvPr>
+        </p:nvSpPr>
+        <p:spPr/>
+        <p:txBody>
+          <a:bodyPr/>
+          <a:lstStyle/>
+          <a:p>
+            <a:fld id="{609275CF-5549-3C4A-B9B9-4367A562B0FC}" type="slidenum">
+              <a:rPr lang="en-US" smtClean="0"/>
+              <a:t>13</a:t>
+            </a:fld>
+            <a:endParaRPr lang="en-US"/>
+          </a:p>
+        </p:txBody>
+      </p:sp>
     </p:spTree>
     <p:extLst>
       <p:ext uri="{BB962C8B-B14F-4D97-AF65-F5344CB8AC3E}">
@@ -3960,10 +5330,269 @@
           <a:chExt cx="0" cy="0"/>
         </a:xfrm>
       </p:grpSpPr>
+      <p:sp>
+        <p:nvSpPr>
+          <p:cNvPr id="2" name="Title 1">
+            <a:extLst>
+              <a:ext uri="{FF2B5EF4-FFF2-40B4-BE49-F238E27FC236}">
+                <a16:creationId xmlns:a16="http://schemas.microsoft.com/office/drawing/2014/main" id="{D5973464-1E70-744D-8128-0187268F5B06}"/>
+              </a:ext>
+            </a:extLst>
+          </p:cNvPr>
+          <p:cNvSpPr>
+            <a:spLocks noGrp="1"/>
+          </p:cNvSpPr>
+          <p:nvPr>
+            <p:ph type="title"/>
+          </p:nvPr>
+        </p:nvSpPr>
+        <p:spPr/>
+        <p:txBody>
+          <a:bodyPr/>
+          <a:lstStyle/>
+          <a:p>
+            <a:r>
+              <a:rPr lang="en-US" dirty="0"/>
+              <a:t>Simpler Model – </a:t>
+            </a:r>
+            <a:r>
+              <a:rPr lang="en-US" dirty="0" err="1"/>
+              <a:t>LassoCV</a:t>
+            </a:r>
+            <a:r>
+              <a:rPr lang="en-US" dirty="0"/>
+              <a:t> with standard features</a:t>
+            </a:r>
+          </a:p>
+        </p:txBody>
+      </p:sp>
+      <p:sp>
+        <p:nvSpPr>
+          <p:cNvPr id="6" name="TextBox 5">
+            <a:extLst>
+              <a:ext uri="{FF2B5EF4-FFF2-40B4-BE49-F238E27FC236}">
+                <a16:creationId xmlns:a16="http://schemas.microsoft.com/office/drawing/2014/main" id="{2CD780C9-E933-AF46-9BBC-FE8B796DC98D}"/>
+              </a:ext>
+            </a:extLst>
+          </p:cNvPr>
+          <p:cNvSpPr txBox="1"/>
+          <p:nvPr/>
+        </p:nvSpPr>
+        <p:spPr>
+          <a:xfrm>
+            <a:off x="1302326" y="2104519"/>
+            <a:ext cx="8612935" cy="3416320"/>
+          </a:xfrm>
+          <a:prstGeom prst="rect">
+            <a:avLst/>
+          </a:prstGeom>
+          <a:noFill/>
+        </p:spPr>
+        <p:txBody>
+          <a:bodyPr wrap="none" rtlCol="0">
+            <a:spAutoFit/>
+          </a:bodyPr>
+          <a:lstStyle/>
+          <a:p>
+            <a:r>
+              <a:rPr lang="en-US" dirty="0"/>
+              <a:t>('Persons 65 years and over, percent', 0.074) </a:t>
+            </a:r>
+          </a:p>
+          <a:p>
+            <a:r>
+              <a:rPr lang="en-US" dirty="0"/>
+              <a:t>('Black or African American alone, percent(a)', -0.047) </a:t>
+            </a:r>
+          </a:p>
+          <a:p>
+            <a:r>
+              <a:rPr lang="en-US" dirty="0"/>
+              <a:t>('Two or More Races, percent', -0.228) </a:t>
+            </a:r>
+          </a:p>
+          <a:p>
+            <a:r>
+              <a:rPr lang="en-US" dirty="0"/>
+              <a:t>('White alone, not Hispanic or Latino, percent', -0.327) </a:t>
+            </a:r>
+          </a:p>
+          <a:p>
+            <a:r>
+              <a:rPr lang="en-US" dirty="0"/>
+              <a:t>('Median value of owner-occupied housing units, 2015-2019', -0.322) </a:t>
+            </a:r>
+          </a:p>
+          <a:p>
+            <a:r>
+              <a:rPr lang="en-US" dirty="0"/>
+              <a:t>('Living in same house 1 year ago, percent of persons age 1 year+, 2015-2019', 0.002) </a:t>
+            </a:r>
+          </a:p>
+          <a:p>
+            <a:r>
+              <a:rPr lang="en-US" dirty="0"/>
+              <a:t>('Households with a computer, percent, 2015-2019', -0.193) </a:t>
+            </a:r>
+          </a:p>
+          <a:p>
+            <a:r>
+              <a:rPr lang="en-US" dirty="0"/>
+              <a:t>('Households with a broadband Internet subscription, percent, 2015-2019', 0.019)</a:t>
+            </a:r>
+          </a:p>
+          <a:p>
+            <a:r>
+              <a:rPr lang="en-US" dirty="0"/>
+              <a:t>('High school graduate or higher, percent of persons age 25 years+, 2015-2019', 0.084) </a:t>
+            </a:r>
+          </a:p>
+          <a:p>
+            <a:r>
+              <a:rPr lang="en-US" dirty="0"/>
+              <a:t>("Bachelor's degree or higher, percent of persons age 25 years+, 2015-2019", -0.057) </a:t>
+            </a:r>
+          </a:p>
+          <a:p>
+            <a:r>
+              <a:rPr lang="en-US" dirty="0"/>
+              <a:t>('Persons without health insurance, under age 65 years, percent', 0.045) </a:t>
+            </a:r>
+          </a:p>
+          <a:p>
+            <a:r>
+              <a:rPr lang="en-US" dirty="0"/>
+              <a:t>('Median household income (in 2019 dollars), 2015-2019', 0.162)</a:t>
+            </a:r>
+          </a:p>
+        </p:txBody>
+      </p:sp>
+      <p:sp>
+        <p:nvSpPr>
+          <p:cNvPr id="7" name="TextBox 6">
+            <a:extLst>
+              <a:ext uri="{FF2B5EF4-FFF2-40B4-BE49-F238E27FC236}">
+                <a16:creationId xmlns:a16="http://schemas.microsoft.com/office/drawing/2014/main" id="{423E990E-D0FC-AA41-854F-58B80FF20DC4}"/>
+              </a:ext>
+            </a:extLst>
+          </p:cNvPr>
+          <p:cNvSpPr txBox="1"/>
+          <p:nvPr/>
+        </p:nvSpPr>
+        <p:spPr>
+          <a:xfrm>
+            <a:off x="3463635" y="5888733"/>
+            <a:ext cx="1156086" cy="369332"/>
+          </a:xfrm>
+          <a:prstGeom prst="rect">
+            <a:avLst/>
+          </a:prstGeom>
+          <a:noFill/>
+        </p:spPr>
+        <p:txBody>
+          <a:bodyPr wrap="none" rtlCol="0">
+            <a:spAutoFit/>
+          </a:bodyPr>
+          <a:lstStyle/>
+          <a:p>
+            <a:r>
+              <a:rPr lang="en-US" dirty="0" err="1"/>
+              <a:t>ƛ</a:t>
+            </a:r>
+            <a:r>
+              <a:rPr lang="en-US" dirty="0"/>
+              <a:t> = 0.0014</a:t>
+            </a:r>
+          </a:p>
+        </p:txBody>
+      </p:sp>
+      <p:sp>
+        <p:nvSpPr>
+          <p:cNvPr id="8" name="Rectangle 7">
+            <a:extLst>
+              <a:ext uri="{FF2B5EF4-FFF2-40B4-BE49-F238E27FC236}">
+                <a16:creationId xmlns:a16="http://schemas.microsoft.com/office/drawing/2014/main" id="{1CB14B0D-2399-624D-92F9-9A713288EC9D}"/>
+              </a:ext>
+            </a:extLst>
+          </p:cNvPr>
+          <p:cNvSpPr/>
+          <p:nvPr/>
+        </p:nvSpPr>
+        <p:spPr>
+          <a:xfrm>
+            <a:off x="5705775" y="5657671"/>
+            <a:ext cx="6096000" cy="923330"/>
+          </a:xfrm>
+          <a:prstGeom prst="rect">
+            <a:avLst/>
+          </a:prstGeom>
+        </p:spPr>
+        <p:txBody>
+          <a:bodyPr>
+            <a:spAutoFit/>
+          </a:bodyPr>
+          <a:lstStyle/>
+          <a:p>
+            <a:r>
+              <a:rPr lang="en-US" dirty="0"/>
+              <a:t>r</a:t>
+            </a:r>
+            <a:r>
+              <a:rPr lang="en-US" baseline="30000" dirty="0"/>
+              <a:t>2</a:t>
+            </a:r>
+            <a:r>
+              <a:rPr lang="en-US" dirty="0"/>
+              <a:t> = 27%</a:t>
+            </a:r>
+          </a:p>
+          <a:p>
+            <a:r>
+              <a:rPr lang="en-US" dirty="0"/>
+              <a:t>MAE = 188.2 Deaths per 100k</a:t>
+            </a:r>
+          </a:p>
+          <a:p>
+            <a:r>
+              <a:rPr lang="en-US" dirty="0"/>
+              <a:t>RMSE = 211.8 Deaths per 100k </a:t>
+            </a:r>
+          </a:p>
+        </p:txBody>
+      </p:sp>
+      <p:sp>
+        <p:nvSpPr>
+          <p:cNvPr id="9" name="Slide Number Placeholder 8">
+            <a:extLst>
+              <a:ext uri="{FF2B5EF4-FFF2-40B4-BE49-F238E27FC236}">
+                <a16:creationId xmlns:a16="http://schemas.microsoft.com/office/drawing/2014/main" id="{DB4E04A6-2476-E242-B085-E4C79ACF5131}"/>
+              </a:ext>
+            </a:extLst>
+          </p:cNvPr>
+          <p:cNvSpPr>
+            <a:spLocks noGrp="1"/>
+          </p:cNvSpPr>
+          <p:nvPr>
+            <p:ph type="sldNum" sz="quarter" idx="12"/>
+          </p:nvPr>
+        </p:nvSpPr>
+        <p:spPr/>
+        <p:txBody>
+          <a:bodyPr/>
+          <a:lstStyle/>
+          <a:p>
+            <a:fld id="{609275CF-5549-3C4A-B9B9-4367A562B0FC}" type="slidenum">
+              <a:rPr lang="en-US" smtClean="0"/>
+              <a:t>14</a:t>
+            </a:fld>
+            <a:endParaRPr lang="en-US"/>
+          </a:p>
+        </p:txBody>
+      </p:sp>
     </p:spTree>
     <p:extLst>
       <p:ext uri="{BB962C8B-B14F-4D97-AF65-F5344CB8AC3E}">
-        <p14:creationId xmlns:p14="http://schemas.microsoft.com/office/powerpoint/2010/main" val="193698195"/>
+        <p14:creationId xmlns:p14="http://schemas.microsoft.com/office/powerpoint/2010/main" val="4227386819"/>
       </p:ext>
     </p:extLst>
   </p:cSld>
@@ -4087,6 +5716,35 @@
           </a:p>
           <a:p>
             <a:endParaRPr lang="en-US" dirty="0"/>
+          </a:p>
+        </p:txBody>
+      </p:sp>
+      <p:sp>
+        <p:nvSpPr>
+          <p:cNvPr id="4" name="Slide Number Placeholder 3">
+            <a:extLst>
+              <a:ext uri="{FF2B5EF4-FFF2-40B4-BE49-F238E27FC236}">
+                <a16:creationId xmlns:a16="http://schemas.microsoft.com/office/drawing/2014/main" id="{08D5CBD8-55DC-2C4A-B95D-0DAE3CF0F4FC}"/>
+              </a:ext>
+            </a:extLst>
+          </p:cNvPr>
+          <p:cNvSpPr>
+            <a:spLocks noGrp="1"/>
+          </p:cNvSpPr>
+          <p:nvPr>
+            <p:ph type="sldNum" sz="quarter" idx="12"/>
+          </p:nvPr>
+        </p:nvSpPr>
+        <p:spPr/>
+        <p:txBody>
+          <a:bodyPr/>
+          <a:lstStyle/>
+          <a:p>
+            <a:fld id="{609275CF-5549-3C4A-B9B9-4367A562B0FC}" type="slidenum">
+              <a:rPr lang="en-US" smtClean="0"/>
+              <a:t>15</a:t>
+            </a:fld>
+            <a:endParaRPr lang="en-US"/>
           </a:p>
         </p:txBody>
       </p:sp>
@@ -4142,8 +5800,8 @@
         </p:blipFill>
         <p:spPr>
           <a:xfrm>
-            <a:off x="689154" y="419631"/>
-            <a:ext cx="4927906" cy="2378988"/>
+            <a:off x="689153" y="419630"/>
+            <a:ext cx="5628519" cy="2717215"/>
           </a:xfrm>
           <a:prstGeom prst="rect">
             <a:avLst/>
@@ -4240,6 +5898,35 @@
           </a:prstGeom>
         </p:spPr>
       </p:pic>
+      <p:sp>
+        <p:nvSpPr>
+          <p:cNvPr id="7" name="Slide Number Placeholder 6">
+            <a:extLst>
+              <a:ext uri="{FF2B5EF4-FFF2-40B4-BE49-F238E27FC236}">
+                <a16:creationId xmlns:a16="http://schemas.microsoft.com/office/drawing/2014/main" id="{63AF4396-BB09-2C40-8119-758B5C89192B}"/>
+              </a:ext>
+            </a:extLst>
+          </p:cNvPr>
+          <p:cNvSpPr>
+            <a:spLocks noGrp="1"/>
+          </p:cNvSpPr>
+          <p:nvPr>
+            <p:ph type="sldNum" sz="quarter" idx="12"/>
+          </p:nvPr>
+        </p:nvSpPr>
+        <p:spPr/>
+        <p:txBody>
+          <a:bodyPr/>
+          <a:lstStyle/>
+          <a:p>
+            <a:fld id="{609275CF-5549-3C4A-B9B9-4367A562B0FC}" type="slidenum">
+              <a:rPr lang="en-US" smtClean="0"/>
+              <a:t>16</a:t>
+            </a:fld>
+            <a:endParaRPr lang="en-US"/>
+          </a:p>
+        </p:txBody>
+      </p:sp>
     </p:spTree>
     <p:extLst>
       <p:ext uri="{BB962C8B-B14F-4D97-AF65-F5344CB8AC3E}">
@@ -4330,6 +6017,35 @@
           </a:prstGeom>
         </p:spPr>
       </p:pic>
+      <p:sp>
+        <p:nvSpPr>
+          <p:cNvPr id="4" name="Slide Number Placeholder 3">
+            <a:extLst>
+              <a:ext uri="{FF2B5EF4-FFF2-40B4-BE49-F238E27FC236}">
+                <a16:creationId xmlns:a16="http://schemas.microsoft.com/office/drawing/2014/main" id="{C8A3CCA7-095D-0F4A-AF2E-A41DF9B31796}"/>
+              </a:ext>
+            </a:extLst>
+          </p:cNvPr>
+          <p:cNvSpPr>
+            <a:spLocks noGrp="1"/>
+          </p:cNvSpPr>
+          <p:nvPr>
+            <p:ph type="sldNum" sz="quarter" idx="12"/>
+          </p:nvPr>
+        </p:nvSpPr>
+        <p:spPr/>
+        <p:txBody>
+          <a:bodyPr/>
+          <a:lstStyle/>
+          <a:p>
+            <a:fld id="{609275CF-5549-3C4A-B9B9-4367A562B0FC}" type="slidenum">
+              <a:rPr lang="en-US" smtClean="0"/>
+              <a:t>17</a:t>
+            </a:fld>
+            <a:endParaRPr lang="en-US"/>
+          </a:p>
+        </p:txBody>
+      </p:sp>
     </p:spTree>
     <p:extLst>
       <p:ext uri="{BB962C8B-B14F-4D97-AF65-F5344CB8AC3E}">
@@ -4360,228 +6076,69 @@
           <a:chExt cx="0" cy="0"/>
         </a:xfrm>
       </p:grpSpPr>
-      <p:sp>
-        <p:nvSpPr>
-          <p:cNvPr id="2" name="Title 1">
-            <a:extLst>
-              <a:ext uri="{FF2B5EF4-FFF2-40B4-BE49-F238E27FC236}">
-                <a16:creationId xmlns:a16="http://schemas.microsoft.com/office/drawing/2014/main" id="{D5973464-1E70-744D-8128-0187268F5B06}"/>
-              </a:ext>
-            </a:extLst>
-          </p:cNvPr>
-          <p:cNvSpPr>
-            <a:spLocks noGrp="1"/>
-          </p:cNvSpPr>
-          <p:nvPr>
-            <p:ph type="title"/>
-          </p:nvPr>
-        </p:nvSpPr>
-        <p:spPr/>
-        <p:txBody>
-          <a:bodyPr/>
-          <a:lstStyle/>
-          <a:p>
-            <a:r>
-              <a:rPr lang="en-US" dirty="0"/>
-              <a:t>Simpler Model – </a:t>
-            </a:r>
-            <a:r>
-              <a:rPr lang="en-US" dirty="0" err="1"/>
-              <a:t>LassoCV</a:t>
-            </a:r>
-            <a:r>
-              <a:rPr lang="en-US" dirty="0"/>
-              <a:t> with standard features</a:t>
-            </a:r>
-          </a:p>
-        </p:txBody>
-      </p:sp>
-      <p:sp>
-        <p:nvSpPr>
-          <p:cNvPr id="6" name="TextBox 5">
-            <a:extLst>
-              <a:ext uri="{FF2B5EF4-FFF2-40B4-BE49-F238E27FC236}">
-                <a16:creationId xmlns:a16="http://schemas.microsoft.com/office/drawing/2014/main" id="{2CD780C9-E933-AF46-9BBC-FE8B796DC98D}"/>
-              </a:ext>
-            </a:extLst>
-          </p:cNvPr>
-          <p:cNvSpPr txBox="1"/>
+      <p:pic>
+        <p:nvPicPr>
+          <p:cNvPr id="4" name="Picture 3">
+            <a:extLst>
+              <a:ext uri="{FF2B5EF4-FFF2-40B4-BE49-F238E27FC236}">
+                <a16:creationId xmlns:a16="http://schemas.microsoft.com/office/drawing/2014/main" id="{4714B567-E754-1347-91AD-9CB41C191AA7}"/>
+              </a:ext>
+            </a:extLst>
+          </p:cNvPr>
+          <p:cNvPicPr>
+            <a:picLocks noChangeAspect="1"/>
+          </p:cNvPicPr>
           <p:nvPr/>
-        </p:nvSpPr>
+        </p:nvPicPr>
+        <p:blipFill>
+          <a:blip r:embed="rId2"/>
+          <a:stretch>
+            <a:fillRect/>
+          </a:stretch>
+        </p:blipFill>
         <p:spPr>
           <a:xfrm>
-            <a:off x="1302327" y="2327564"/>
-            <a:ext cx="8612935" cy="3416320"/>
-          </a:xfrm>
-          <a:prstGeom prst="rect">
-            <a:avLst/>
-          </a:prstGeom>
-          <a:noFill/>
-        </p:spPr>
-        <p:txBody>
-          <a:bodyPr wrap="none" rtlCol="0">
-            <a:spAutoFit/>
-          </a:bodyPr>
-          <a:lstStyle/>
-          <a:p>
-            <a:r>
-              <a:rPr lang="en-US" dirty="0"/>
-              <a:t>('Persons 65 years and over, percent', 0.074) </a:t>
-            </a:r>
-          </a:p>
-          <a:p>
-            <a:r>
-              <a:rPr lang="en-US" dirty="0"/>
-              <a:t>('Black or African American alone, percent(a)', -0.047) </a:t>
-            </a:r>
-          </a:p>
-          <a:p>
-            <a:r>
-              <a:rPr lang="en-US" dirty="0"/>
-              <a:t>('Two or More Races, percent', -0.228) </a:t>
-            </a:r>
-          </a:p>
-          <a:p>
-            <a:r>
-              <a:rPr lang="en-US" dirty="0"/>
-              <a:t>('White alone, not Hispanic or Latino, percent', -0.327) </a:t>
-            </a:r>
-          </a:p>
-          <a:p>
-            <a:r>
-              <a:rPr lang="en-US" dirty="0"/>
-              <a:t>('Median value of owner-occupied housing units, 2015-2019', -0.322) </a:t>
-            </a:r>
-          </a:p>
-          <a:p>
-            <a:r>
-              <a:rPr lang="en-US" dirty="0"/>
-              <a:t>('Living in same house 1 year ago, percent of persons age 1 year+, 2015-2019', 0.002) </a:t>
-            </a:r>
-          </a:p>
-          <a:p>
-            <a:r>
-              <a:rPr lang="en-US" dirty="0"/>
-              <a:t>('Households with a computer, percent, 2015-2019', -0.193) </a:t>
-            </a:r>
-          </a:p>
-          <a:p>
-            <a:r>
-              <a:rPr lang="en-US" dirty="0"/>
-              <a:t>('Households with a broadband Internet subscription, percent, 2015-2019', 0.019)</a:t>
-            </a:r>
-          </a:p>
-          <a:p>
-            <a:r>
-              <a:rPr lang="en-US" dirty="0"/>
-              <a:t>('High school graduate or higher, percent of persons age 25 years+, 2015-2019', 0.084) </a:t>
-            </a:r>
-          </a:p>
-          <a:p>
-            <a:r>
-              <a:rPr lang="en-US" dirty="0"/>
-              <a:t>("Bachelor's degree or higher, percent of persons age 25 years+, 2015-2019", -0.057) </a:t>
-            </a:r>
-          </a:p>
-          <a:p>
-            <a:r>
-              <a:rPr lang="en-US" dirty="0"/>
-              <a:t>('Persons without health insurance, under age 65 years, percent', 0.045) </a:t>
-            </a:r>
-          </a:p>
-          <a:p>
-            <a:r>
-              <a:rPr lang="en-US" dirty="0"/>
-              <a:t>('Median household income (in 2019 dollars), 2015-2019', 0.162)</a:t>
-            </a:r>
-          </a:p>
-        </p:txBody>
-      </p:sp>
-      <p:sp>
-        <p:nvSpPr>
-          <p:cNvPr id="7" name="TextBox 6">
-            <a:extLst>
-              <a:ext uri="{FF2B5EF4-FFF2-40B4-BE49-F238E27FC236}">
-                <a16:creationId xmlns:a16="http://schemas.microsoft.com/office/drawing/2014/main" id="{423E990E-D0FC-AA41-854F-58B80FF20DC4}"/>
-              </a:ext>
-            </a:extLst>
-          </p:cNvPr>
-          <p:cNvSpPr txBox="1"/>
-          <p:nvPr/>
-        </p:nvSpPr>
-        <p:spPr>
-          <a:xfrm>
-            <a:off x="6816436" y="2064327"/>
-            <a:ext cx="1588897" cy="369332"/>
-          </a:xfrm>
-          <a:prstGeom prst="rect">
-            <a:avLst/>
-          </a:prstGeom>
-          <a:noFill/>
-        </p:spPr>
-        <p:txBody>
-          <a:bodyPr wrap="none" rtlCol="0">
-            <a:spAutoFit/>
-          </a:bodyPr>
-          <a:lstStyle/>
-          <a:p>
-            <a:r>
-              <a:rPr lang="en-US" dirty="0"/>
-              <a:t>Alpha = 0.0014</a:t>
-            </a:r>
-          </a:p>
-        </p:txBody>
-      </p:sp>
-      <p:sp>
-        <p:nvSpPr>
-          <p:cNvPr id="8" name="Rectangle 7">
-            <a:extLst>
-              <a:ext uri="{FF2B5EF4-FFF2-40B4-BE49-F238E27FC236}">
-                <a16:creationId xmlns:a16="http://schemas.microsoft.com/office/drawing/2014/main" id="{1CB14B0D-2399-624D-92F9-9A713288EC9D}"/>
-              </a:ext>
-            </a:extLst>
-          </p:cNvPr>
-          <p:cNvSpPr/>
-          <p:nvPr/>
-        </p:nvSpPr>
-        <p:spPr>
-          <a:xfrm>
-            <a:off x="5608794" y="5934670"/>
-            <a:ext cx="6096000" cy="923330"/>
+            <a:off x="3304800" y="0"/>
+            <a:ext cx="5101225" cy="6858000"/>
           </a:xfrm>
           <a:prstGeom prst="rect">
             <a:avLst/>
           </a:prstGeom>
         </p:spPr>
-        <p:txBody>
-          <a:bodyPr>
-            <a:spAutoFit/>
-          </a:bodyPr>
-          <a:lstStyle/>
-          <a:p>
-            <a:r>
-              <a:rPr lang="en-US" dirty="0"/>
-              <a:t>R2 = 27%</a:t>
-            </a:r>
-          </a:p>
-          <a:p>
-            <a:r>
-              <a:rPr lang="en-US" dirty="0"/>
-              <a:t>MAE = 188.2 Deaths per 100k</a:t>
-            </a:r>
-          </a:p>
-          <a:p>
-            <a:r>
-              <a:rPr lang="en-US" dirty="0"/>
-              <a:t>RMSE = 211.8 Deaths per 100k </a:t>
-            </a:r>
+      </p:pic>
+      <p:sp>
+        <p:nvSpPr>
+          <p:cNvPr id="5" name="Slide Number Placeholder 4">
+            <a:extLst>
+              <a:ext uri="{FF2B5EF4-FFF2-40B4-BE49-F238E27FC236}">
+                <a16:creationId xmlns:a16="http://schemas.microsoft.com/office/drawing/2014/main" id="{E642C78A-1DEE-EF4E-8D68-79600ACDE975}"/>
+              </a:ext>
+            </a:extLst>
+          </p:cNvPr>
+          <p:cNvSpPr>
+            <a:spLocks noGrp="1"/>
+          </p:cNvSpPr>
+          <p:nvPr>
+            <p:ph type="sldNum" sz="quarter" idx="12"/>
+          </p:nvPr>
+        </p:nvSpPr>
+        <p:spPr/>
+        <p:txBody>
+          <a:bodyPr/>
+          <a:lstStyle/>
+          <a:p>
+            <a:fld id="{609275CF-5549-3C4A-B9B9-4367A562B0FC}" type="slidenum">
+              <a:rPr lang="en-US" smtClean="0"/>
+              <a:t>18</a:t>
+            </a:fld>
+            <a:endParaRPr lang="en-US"/>
           </a:p>
         </p:txBody>
       </p:sp>
     </p:spTree>
     <p:extLst>
       <p:ext uri="{BB962C8B-B14F-4D97-AF65-F5344CB8AC3E}">
-        <p14:creationId xmlns:p14="http://schemas.microsoft.com/office/powerpoint/2010/main" val="4227386819"/>
+        <p14:creationId xmlns:p14="http://schemas.microsoft.com/office/powerpoint/2010/main" val="2917722473"/>
       </p:ext>
     </p:extLst>
   </p:cSld>
@@ -4610,10 +6167,10 @@
       </p:grpSpPr>
       <p:pic>
         <p:nvPicPr>
-          <p:cNvPr id="5" name="Picture 4">
-            <a:extLst>
-              <a:ext uri="{FF2B5EF4-FFF2-40B4-BE49-F238E27FC236}">
-                <a16:creationId xmlns:a16="http://schemas.microsoft.com/office/drawing/2014/main" id="{9B42FA15-5C30-0B43-B224-B8B36096DEC6}"/>
+          <p:cNvPr id="4" name="Picture 3">
+            <a:extLst>
+              <a:ext uri="{FF2B5EF4-FFF2-40B4-BE49-F238E27FC236}">
+                <a16:creationId xmlns:a16="http://schemas.microsoft.com/office/drawing/2014/main" id="{6A68E8BB-01C5-274B-96EF-2C6210A90403}"/>
               </a:ext>
             </a:extLst>
           </p:cNvPr>
@@ -4630,18 +6187,47 @@
         </p:blipFill>
         <p:spPr>
           <a:xfrm>
-            <a:off x="3940635" y="2175163"/>
-            <a:ext cx="3905078" cy="1593272"/>
+            <a:off x="1712708" y="0"/>
+            <a:ext cx="7123431" cy="6858000"/>
           </a:xfrm>
           <a:prstGeom prst="rect">
             <a:avLst/>
           </a:prstGeom>
         </p:spPr>
       </p:pic>
+      <p:sp>
+        <p:nvSpPr>
+          <p:cNvPr id="5" name="Slide Number Placeholder 4">
+            <a:extLst>
+              <a:ext uri="{FF2B5EF4-FFF2-40B4-BE49-F238E27FC236}">
+                <a16:creationId xmlns:a16="http://schemas.microsoft.com/office/drawing/2014/main" id="{536E3E86-48D0-0E4A-89A6-DD5CAC8357C1}"/>
+              </a:ext>
+            </a:extLst>
+          </p:cNvPr>
+          <p:cNvSpPr>
+            <a:spLocks noGrp="1"/>
+          </p:cNvSpPr>
+          <p:nvPr>
+            <p:ph type="sldNum" sz="quarter" idx="12"/>
+          </p:nvPr>
+        </p:nvSpPr>
+        <p:spPr/>
+        <p:txBody>
+          <a:bodyPr/>
+          <a:lstStyle/>
+          <a:p>
+            <a:fld id="{609275CF-5549-3C4A-B9B9-4367A562B0FC}" type="slidenum">
+              <a:rPr lang="en-US" smtClean="0"/>
+              <a:t>19</a:t>
+            </a:fld>
+            <a:endParaRPr lang="en-US"/>
+          </a:p>
+        </p:txBody>
+      </p:sp>
     </p:spTree>
     <p:extLst>
       <p:ext uri="{BB962C8B-B14F-4D97-AF65-F5344CB8AC3E}">
-        <p14:creationId xmlns:p14="http://schemas.microsoft.com/office/powerpoint/2010/main" val="1762990579"/>
+        <p14:creationId xmlns:p14="http://schemas.microsoft.com/office/powerpoint/2010/main" val="2753849097"/>
       </p:ext>
     </p:extLst>
   </p:cSld>
@@ -4693,7 +6279,7 @@
           <a:p>
             <a:r>
               <a:rPr lang="en-US" dirty="0"/>
-              <a:t>Knowing which counties are more at risk means resources can be deployed more efficiently.</a:t>
+              <a:t>Idea: Knowing which counties are more at risk means resources can be deployed more efficiently.</a:t>
             </a:r>
           </a:p>
         </p:txBody>
@@ -4729,7 +6315,7 @@
             </a:pPr>
             <a:r>
               <a:rPr lang="en-US" dirty="0"/>
-              <a:t>Target:  </a:t>
+              <a:t>Target variable:  </a:t>
             </a:r>
             <a:r>
               <a:rPr lang="en-US" dirty="0">
@@ -4753,9 +6339,10 @@
             </a:r>
           </a:p>
           <a:p>
+            <a:pPr lvl="1"/>
             <a:r>
               <a:rPr lang="en-US" dirty="0"/>
-              <a:t>Data acquired from from the NYT Covid-19 </a:t>
+              <a:t>Data acquired from the NYT Covid-19 </a:t>
             </a:r>
             <a:r>
               <a:rPr lang="en-US" dirty="0" err="1"/>
@@ -4764,12 +6351,6 @@
             <a:r>
               <a:rPr lang="en-US" dirty="0"/>
               <a:t> repository</a:t>
-            </a:r>
-          </a:p>
-          <a:p>
-            <a:r>
-              <a:rPr lang="en-US" dirty="0"/>
-              <a:t>(Originally I scraped the CDC website directly, aiming to predict weekly deaths or some other measure, however that was too fine of a granularity to model.)</a:t>
             </a:r>
           </a:p>
           <a:p>
@@ -4802,10 +6383,163 @@
           </a:p>
         </p:txBody>
       </p:sp>
+      <p:sp>
+        <p:nvSpPr>
+          <p:cNvPr id="4" name="Slide Number Placeholder 3">
+            <a:extLst>
+              <a:ext uri="{FF2B5EF4-FFF2-40B4-BE49-F238E27FC236}">
+                <a16:creationId xmlns:a16="http://schemas.microsoft.com/office/drawing/2014/main" id="{18B2CFAA-17EB-CA49-BC7E-A0E5E088C078}"/>
+              </a:ext>
+            </a:extLst>
+          </p:cNvPr>
+          <p:cNvSpPr>
+            <a:spLocks noGrp="1"/>
+          </p:cNvSpPr>
+          <p:nvPr>
+            <p:ph type="sldNum" sz="quarter" idx="12"/>
+          </p:nvPr>
+        </p:nvSpPr>
+        <p:spPr/>
+        <p:txBody>
+          <a:bodyPr/>
+          <a:lstStyle/>
+          <a:p>
+            <a:fld id="{609275CF-5549-3C4A-B9B9-4367A562B0FC}" type="slidenum">
+              <a:rPr lang="en-US" smtClean="0"/>
+              <a:t>2</a:t>
+            </a:fld>
+            <a:endParaRPr lang="en-US"/>
+          </a:p>
+        </p:txBody>
+      </p:sp>
     </p:spTree>
     <p:extLst>
       <p:ext uri="{BB962C8B-B14F-4D97-AF65-F5344CB8AC3E}">
         <p14:creationId xmlns:p14="http://schemas.microsoft.com/office/powerpoint/2010/main" val="2886340053"/>
+      </p:ext>
+    </p:extLst>
+  </p:cSld>
+  <p:clrMapOvr>
+    <a:masterClrMapping/>
+  </p:clrMapOvr>
+</p:sld>
+</file>
+
+<file path=ppt/slides/slide20.xml><?xml version="1.0" encoding="utf-8"?>
+<p:sld xmlns:a="http://schemas.openxmlformats.org/drawingml/2006/main" xmlns:r="http://schemas.openxmlformats.org/officeDocument/2006/relationships" xmlns:p="http://schemas.openxmlformats.org/presentationml/2006/main">
+  <p:cSld>
+    <p:spTree>
+      <p:nvGrpSpPr>
+        <p:cNvPr id="1" name=""/>
+        <p:cNvGrpSpPr/>
+        <p:nvPr/>
+      </p:nvGrpSpPr>
+      <p:grpSpPr>
+        <a:xfrm>
+          <a:off x="0" y="0"/>
+          <a:ext cx="0" cy="0"/>
+          <a:chOff x="0" y="0"/>
+          <a:chExt cx="0" cy="0"/>
+        </a:xfrm>
+      </p:grpSpPr>
+      <p:pic>
+        <p:nvPicPr>
+          <p:cNvPr id="5" name="Picture 4">
+            <a:extLst>
+              <a:ext uri="{FF2B5EF4-FFF2-40B4-BE49-F238E27FC236}">
+                <a16:creationId xmlns:a16="http://schemas.microsoft.com/office/drawing/2014/main" id="{9B42FA15-5C30-0B43-B224-B8B36096DEC6}"/>
+              </a:ext>
+            </a:extLst>
+          </p:cNvPr>
+          <p:cNvPicPr>
+            <a:picLocks noChangeAspect="1"/>
+          </p:cNvPicPr>
+          <p:nvPr/>
+        </p:nvPicPr>
+        <p:blipFill>
+          <a:blip r:embed="rId2"/>
+          <a:stretch>
+            <a:fillRect/>
+          </a:stretch>
+        </p:blipFill>
+        <p:spPr>
+          <a:xfrm>
+            <a:off x="3538853" y="2189018"/>
+            <a:ext cx="3905078" cy="1593272"/>
+          </a:xfrm>
+          <a:prstGeom prst="rect">
+            <a:avLst/>
+          </a:prstGeom>
+        </p:spPr>
+      </p:pic>
+      <p:sp>
+        <p:nvSpPr>
+          <p:cNvPr id="6" name="TextBox 5">
+            <a:extLst>
+              <a:ext uri="{FF2B5EF4-FFF2-40B4-BE49-F238E27FC236}">
+                <a16:creationId xmlns:a16="http://schemas.microsoft.com/office/drawing/2014/main" id="{5776C6E5-2CAB-7C45-A978-9FA00829010E}"/>
+              </a:ext>
+            </a:extLst>
+          </p:cNvPr>
+          <p:cNvSpPr txBox="1"/>
+          <p:nvPr/>
+        </p:nvSpPr>
+        <p:spPr>
+          <a:xfrm>
+            <a:off x="4308764" y="1191491"/>
+            <a:ext cx="1990930" cy="369332"/>
+          </a:xfrm>
+          <a:prstGeom prst="rect">
+            <a:avLst/>
+          </a:prstGeom>
+          <a:noFill/>
+        </p:spPr>
+        <p:txBody>
+          <a:bodyPr wrap="none" rtlCol="0">
+            <a:spAutoFit/>
+          </a:bodyPr>
+          <a:lstStyle/>
+          <a:p>
+            <a:r>
+              <a:rPr lang="en-US" dirty="0"/>
+              <a:t>Box-Cox Transform:</a:t>
+            </a:r>
+          </a:p>
+        </p:txBody>
+      </p:sp>
+      <p:sp>
+        <p:nvSpPr>
+          <p:cNvPr id="7" name="Slide Number Placeholder 6">
+            <a:extLst>
+              <a:ext uri="{FF2B5EF4-FFF2-40B4-BE49-F238E27FC236}">
+                <a16:creationId xmlns:a16="http://schemas.microsoft.com/office/drawing/2014/main" id="{D109B99C-ACAF-494F-A6DF-A231F818FD9A}"/>
+              </a:ext>
+            </a:extLst>
+          </p:cNvPr>
+          <p:cNvSpPr>
+            <a:spLocks noGrp="1"/>
+          </p:cNvSpPr>
+          <p:nvPr>
+            <p:ph type="sldNum" sz="quarter" idx="12"/>
+          </p:nvPr>
+        </p:nvSpPr>
+        <p:spPr/>
+        <p:txBody>
+          <a:bodyPr/>
+          <a:lstStyle/>
+          <a:p>
+            <a:fld id="{609275CF-5549-3C4A-B9B9-4367A562B0FC}" type="slidenum">
+              <a:rPr lang="en-US" smtClean="0"/>
+              <a:t>20</a:t>
+            </a:fld>
+            <a:endParaRPr lang="en-US"/>
+          </a:p>
+        </p:txBody>
+      </p:sp>
+    </p:spTree>
+    <p:extLst>
+      <p:ext uri="{BB962C8B-B14F-4D97-AF65-F5344CB8AC3E}">
+        <p14:creationId xmlns:p14="http://schemas.microsoft.com/office/powerpoint/2010/main" val="1762990579"/>
       </p:ext>
     </p:extLst>
   </p:cSld>
@@ -4939,6 +6673,35 @@
               <a:rPr lang="en-US" sz="1400" dirty="0"/>
               <a:t> Choropleth Map. Blank counties are places where either my web-scraping failed, or I dropped outliers/entries with issues.</a:t>
             </a:r>
+          </a:p>
+        </p:txBody>
+      </p:sp>
+      <p:sp>
+        <p:nvSpPr>
+          <p:cNvPr id="8" name="Slide Number Placeholder 7">
+            <a:extLst>
+              <a:ext uri="{FF2B5EF4-FFF2-40B4-BE49-F238E27FC236}">
+                <a16:creationId xmlns:a16="http://schemas.microsoft.com/office/drawing/2014/main" id="{D51656D5-FE74-E541-B041-B5D022480387}"/>
+              </a:ext>
+            </a:extLst>
+          </p:cNvPr>
+          <p:cNvSpPr>
+            <a:spLocks noGrp="1"/>
+          </p:cNvSpPr>
+          <p:nvPr>
+            <p:ph type="sldNum" sz="quarter" idx="12"/>
+          </p:nvPr>
+        </p:nvSpPr>
+        <p:spPr/>
+        <p:txBody>
+          <a:bodyPr/>
+          <a:lstStyle/>
+          <a:p>
+            <a:fld id="{609275CF-5549-3C4A-B9B9-4367A562B0FC}" type="slidenum">
+              <a:rPr lang="en-US" smtClean="0"/>
+              <a:t>3</a:t>
+            </a:fld>
+            <a:endParaRPr lang="en-US"/>
           </a:p>
         </p:txBody>
       </p:sp>
@@ -5078,6 +6841,35 @@
           </a:p>
         </p:txBody>
       </p:sp>
+      <p:sp>
+        <p:nvSpPr>
+          <p:cNvPr id="8" name="Slide Number Placeholder 7">
+            <a:extLst>
+              <a:ext uri="{FF2B5EF4-FFF2-40B4-BE49-F238E27FC236}">
+                <a16:creationId xmlns:a16="http://schemas.microsoft.com/office/drawing/2014/main" id="{36EF2FF3-75B8-484C-87FF-15634C8E712D}"/>
+              </a:ext>
+            </a:extLst>
+          </p:cNvPr>
+          <p:cNvSpPr>
+            <a:spLocks noGrp="1"/>
+          </p:cNvSpPr>
+          <p:nvPr>
+            <p:ph type="sldNum" sz="quarter" idx="12"/>
+          </p:nvPr>
+        </p:nvSpPr>
+        <p:spPr/>
+        <p:txBody>
+          <a:bodyPr/>
+          <a:lstStyle/>
+          <a:p>
+            <a:fld id="{609275CF-5549-3C4A-B9B9-4367A562B0FC}" type="slidenum">
+              <a:rPr lang="en-US" smtClean="0"/>
+              <a:t>4</a:t>
+            </a:fld>
+            <a:endParaRPr lang="en-US"/>
+          </a:p>
+        </p:txBody>
+      </p:sp>
     </p:spTree>
     <p:extLst>
       <p:ext uri="{BB962C8B-B14F-4D97-AF65-F5344CB8AC3E}">
@@ -5200,7 +6992,7 @@
           <a:p>
             <a:r>
               <a:rPr lang="en-US" dirty="0"/>
-              <a:t>A lot of these are somewhat to significantly correlated</a:t>
+              <a:t>A lot of these are significantly correlated to each other</a:t>
             </a:r>
           </a:p>
           <a:p>
@@ -5208,6 +7000,35 @@
               <a:rPr lang="en-US" dirty="0"/>
               <a:t>By trial and error I selected 12 features for my model</a:t>
             </a:r>
+          </a:p>
+        </p:txBody>
+      </p:sp>
+      <p:sp>
+        <p:nvSpPr>
+          <p:cNvPr id="4" name="Slide Number Placeholder 3">
+            <a:extLst>
+              <a:ext uri="{FF2B5EF4-FFF2-40B4-BE49-F238E27FC236}">
+                <a16:creationId xmlns:a16="http://schemas.microsoft.com/office/drawing/2014/main" id="{10009F4E-01C1-8446-B792-B59D732CE309}"/>
+              </a:ext>
+            </a:extLst>
+          </p:cNvPr>
+          <p:cNvSpPr>
+            <a:spLocks noGrp="1"/>
+          </p:cNvSpPr>
+          <p:nvPr>
+            <p:ph type="sldNum" sz="quarter" idx="12"/>
+          </p:nvPr>
+        </p:nvSpPr>
+        <p:spPr/>
+        <p:txBody>
+          <a:bodyPr/>
+          <a:lstStyle/>
+          <a:p>
+            <a:fld id="{609275CF-5549-3C4A-B9B9-4367A562B0FC}" type="slidenum">
+              <a:rPr lang="en-US" smtClean="0"/>
+              <a:t>5</a:t>
+            </a:fld>
+            <a:endParaRPr lang="en-US"/>
           </a:p>
         </p:txBody>
       </p:sp>
@@ -5285,14 +7106,14 @@
             <p:ph idx="1"/>
             <p:extLst>
               <p:ext uri="{D42A27DB-BD31-4B8C-83A1-F6EECF244321}">
-                <p14:modId xmlns:p14="http://schemas.microsoft.com/office/powerpoint/2010/main" val="3831342510"/>
+                <p14:modId xmlns:p14="http://schemas.microsoft.com/office/powerpoint/2010/main" val="646126461"/>
               </p:ext>
             </p:extLst>
           </p:nvPr>
         </p:nvGraphicFramePr>
         <p:xfrm>
           <a:off x="838200" y="1465407"/>
-          <a:ext cx="9885391" cy="5090160"/>
+          <a:ext cx="10048875" cy="5090160"/>
         </p:xfrm>
         <a:graphic>
           <a:graphicData uri="http://schemas.openxmlformats.org/drawingml/2006/table">
@@ -5315,7 +7136,7 @@
                     </a:ext>
                   </a:extLst>
                 </a:gridCol>
-                <a:gridCol w="1225982">
+                <a:gridCol w="1389466">
                   <a:extLst>
                     <a:ext uri="{9D8B030D-6E8A-4147-A177-3AD203B41FA5}">
                       <a16:colId xmlns:a16="http://schemas.microsoft.com/office/drawing/2014/main" val="854641458"/>
@@ -6128,6 +7949,35 @@
           </a:p>
         </p:txBody>
       </p:sp>
+      <p:sp>
+        <p:nvSpPr>
+          <p:cNvPr id="6" name="Slide Number Placeholder 5">
+            <a:extLst>
+              <a:ext uri="{FF2B5EF4-FFF2-40B4-BE49-F238E27FC236}">
+                <a16:creationId xmlns:a16="http://schemas.microsoft.com/office/drawing/2014/main" id="{CE41245A-2896-4E4A-BFA0-5C393992C9D5}"/>
+              </a:ext>
+            </a:extLst>
+          </p:cNvPr>
+          <p:cNvSpPr>
+            <a:spLocks noGrp="1"/>
+          </p:cNvSpPr>
+          <p:nvPr>
+            <p:ph type="sldNum" sz="quarter" idx="12"/>
+          </p:nvPr>
+        </p:nvSpPr>
+        <p:spPr/>
+        <p:txBody>
+          <a:bodyPr/>
+          <a:lstStyle/>
+          <a:p>
+            <a:fld id="{609275CF-5549-3C4A-B9B9-4367A562B0FC}" type="slidenum">
+              <a:rPr lang="en-US" smtClean="0"/>
+              <a:t>6</a:t>
+            </a:fld>
+            <a:endParaRPr lang="en-US"/>
+          </a:p>
+        </p:txBody>
+      </p:sp>
     </p:spTree>
     <p:extLst>
       <p:ext uri="{BB962C8B-B14F-4D97-AF65-F5344CB8AC3E}">
@@ -6278,6 +8128,35 @@
           </a:prstGeom>
         </p:spPr>
       </p:pic>
+      <p:sp>
+        <p:nvSpPr>
+          <p:cNvPr id="10" name="Slide Number Placeholder 9">
+            <a:extLst>
+              <a:ext uri="{FF2B5EF4-FFF2-40B4-BE49-F238E27FC236}">
+                <a16:creationId xmlns:a16="http://schemas.microsoft.com/office/drawing/2014/main" id="{2491E023-76E7-444B-B84C-32A436504EF1}"/>
+              </a:ext>
+            </a:extLst>
+          </p:cNvPr>
+          <p:cNvSpPr>
+            <a:spLocks noGrp="1"/>
+          </p:cNvSpPr>
+          <p:nvPr>
+            <p:ph type="sldNum" sz="quarter" idx="12"/>
+          </p:nvPr>
+        </p:nvSpPr>
+        <p:spPr/>
+        <p:txBody>
+          <a:bodyPr/>
+          <a:lstStyle/>
+          <a:p>
+            <a:fld id="{609275CF-5549-3C4A-B9B9-4367A562B0FC}" type="slidenum">
+              <a:rPr lang="en-US" smtClean="0"/>
+              <a:t>7</a:t>
+            </a:fld>
+            <a:endParaRPr lang="en-US"/>
+          </a:p>
+        </p:txBody>
+      </p:sp>
     </p:spTree>
     <p:extLst>
       <p:ext uri="{BB962C8B-B14F-4D97-AF65-F5344CB8AC3E}">
@@ -6331,8 +8210,17 @@
           <a:p>
             <a:r>
               <a:rPr lang="en-US" dirty="0"/>
-              <a:t>Model Choice</a:t>
-            </a:r>
+              <a:t>Model Choice: </a:t>
+            </a:r>
+            <a:r>
+              <a:rPr lang="en-US" dirty="0">
+                <a:solidFill>
+                  <a:srgbClr val="FF0000"/>
+                </a:solidFill>
+              </a:rPr>
+              <a:t>Lasso with standard polynomial features </a:t>
+            </a:r>
+            <a:endParaRPr lang="en-US" dirty="0"/>
           </a:p>
         </p:txBody>
       </p:sp>
@@ -6355,68 +8243,81 @@
         <p:spPr/>
         <p:txBody>
           <a:bodyPr>
-            <a:normAutofit lnSpcReduction="10000"/>
+            <a:normAutofit/>
           </a:bodyPr>
           <a:lstStyle/>
           <a:p>
+            <a:pPr marL="0" indent="0">
+              <a:buNone/>
+            </a:pPr>
+            <a:endParaRPr lang="en-US" dirty="0"/>
+          </a:p>
+          <a:p>
             <a:r>
               <a:rPr lang="en-US" dirty="0"/>
-              <a:t>Model Tests:</a:t>
-            </a:r>
-          </a:p>
-          <a:p>
-            <a:pPr lvl="1"/>
+              <a:t>Ultimately I selected the model which performed the best, regardless of complexity</a:t>
+            </a:r>
+          </a:p>
+          <a:p>
             <a:r>
               <a:rPr lang="en-US" dirty="0"/>
-              <a:t>Linear regression with and without polynomial features</a:t>
-            </a:r>
-          </a:p>
-          <a:p>
-            <a:pPr lvl="1"/>
+              <a:t>Including all poly features, not just interaction terms</a:t>
+            </a:r>
+          </a:p>
+          <a:p>
+            <a:r>
+              <a:rPr lang="en-US" dirty="0" err="1"/>
+              <a:t>ƛ</a:t>
+            </a:r>
             <a:r>
               <a:rPr lang="en-US" dirty="0"/>
-              <a:t>Lasso and ridge regression with scaled features, with and without polynomial features</a:t>
-            </a:r>
+              <a:t> = 4e-4</a:t>
+            </a:r>
+          </a:p>
+          <a:p>
+            <a:r>
+              <a:rPr lang="en-US" dirty="0"/>
+              <a:t>I chose this model because this was an analysis on life/death data, and every little bit matters</a:t>
+            </a:r>
+          </a:p>
+          <a:p>
+            <a:endParaRPr lang="en-US" dirty="0"/>
+          </a:p>
+          <a:p>
+            <a:endParaRPr lang="en-US" dirty="0"/>
           </a:p>
           <a:p>
             <a:pPr lvl="1"/>
             <a:endParaRPr lang="en-US" dirty="0"/>
           </a:p>
-          <a:p>
-            <a:pPr lvl="1"/>
-            <a:endParaRPr lang="en-US" dirty="0"/>
-          </a:p>
-          <a:p>
-            <a:r>
-              <a:rPr lang="en-US" dirty="0"/>
-              <a:t>Ultimately I selected the model which performed the best, regardless of complexity:</a:t>
-            </a:r>
-          </a:p>
-          <a:p>
-            <a:pPr lvl="1"/>
-            <a:r>
-              <a:rPr lang="en-US" dirty="0" err="1"/>
-              <a:t>LassoCV</a:t>
-            </a:r>
-            <a:r>
-              <a:rPr lang="en-US" dirty="0"/>
-              <a:t> with standard polynomial features (all poly features, not just interaction)</a:t>
-            </a:r>
-          </a:p>
-          <a:p>
-            <a:pPr lvl="1"/>
-            <a:r>
-              <a:rPr lang="en-US" dirty="0" err="1"/>
-              <a:t>ƛ</a:t>
-            </a:r>
-            <a:r>
-              <a:rPr lang="en-US" dirty="0"/>
-              <a:t> = 4e-4</a:t>
-            </a:r>
-          </a:p>
-          <a:p>
-            <a:pPr lvl="1"/>
-            <a:endParaRPr lang="en-US" dirty="0"/>
+        </p:txBody>
+      </p:sp>
+      <p:sp>
+        <p:nvSpPr>
+          <p:cNvPr id="4" name="Slide Number Placeholder 3">
+            <a:extLst>
+              <a:ext uri="{FF2B5EF4-FFF2-40B4-BE49-F238E27FC236}">
+                <a16:creationId xmlns:a16="http://schemas.microsoft.com/office/drawing/2014/main" id="{D101824D-F4D8-0148-B45E-A1ABD7FD8318}"/>
+              </a:ext>
+            </a:extLst>
+          </p:cNvPr>
+          <p:cNvSpPr>
+            <a:spLocks noGrp="1"/>
+          </p:cNvSpPr>
+          <p:nvPr>
+            <p:ph type="sldNum" sz="quarter" idx="12"/>
+          </p:nvPr>
+        </p:nvSpPr>
+        <p:spPr/>
+        <p:txBody>
+          <a:bodyPr/>
+          <a:lstStyle/>
+          <a:p>
+            <a:fld id="{609275CF-5549-3C4A-B9B9-4367A562B0FC}" type="slidenum">
+              <a:rPr lang="en-US" smtClean="0"/>
+              <a:t>8</a:t>
+            </a:fld>
+            <a:endParaRPr lang="en-US"/>
           </a:p>
         </p:txBody>
       </p:sp>
@@ -6450,12 +8351,121 @@
           <a:chExt cx="0" cy="0"/>
         </a:xfrm>
       </p:grpSpPr>
-      <p:sp>
-        <p:nvSpPr>
-          <p:cNvPr id="2" name="Title 1">
-            <a:extLst>
-              <a:ext uri="{FF2B5EF4-FFF2-40B4-BE49-F238E27FC236}">
-                <a16:creationId xmlns:a16="http://schemas.microsoft.com/office/drawing/2014/main" id="{30855D2E-FA3D-BA40-97C1-9DDD4BC8969F}"/>
+      <p:pic>
+        <p:nvPicPr>
+          <p:cNvPr id="34" name="Picture 33">
+            <a:extLst>
+              <a:ext uri="{FF2B5EF4-FFF2-40B4-BE49-F238E27FC236}">
+                <a16:creationId xmlns:a16="http://schemas.microsoft.com/office/drawing/2014/main" id="{82A06525-FFD1-2242-A2D0-6343B61E2716}"/>
+              </a:ext>
+            </a:extLst>
+          </p:cNvPr>
+          <p:cNvPicPr>
+            <a:picLocks noChangeAspect="1"/>
+          </p:cNvPicPr>
+          <p:nvPr/>
+        </p:nvPicPr>
+        <p:blipFill>
+          <a:blip r:embed="rId2"/>
+          <a:stretch>
+            <a:fillRect/>
+          </a:stretch>
+        </p:blipFill>
+        <p:spPr>
+          <a:xfrm>
+            <a:off x="6109854" y="789712"/>
+            <a:ext cx="6248400" cy="3124200"/>
+          </a:xfrm>
+          <a:prstGeom prst="rect">
+            <a:avLst/>
+          </a:prstGeom>
+        </p:spPr>
+      </p:pic>
+      <p:pic>
+        <p:nvPicPr>
+          <p:cNvPr id="35" name="Picture 34">
+            <a:extLst>
+              <a:ext uri="{FF2B5EF4-FFF2-40B4-BE49-F238E27FC236}">
+                <a16:creationId xmlns:a16="http://schemas.microsoft.com/office/drawing/2014/main" id="{DF29A3C1-D6C5-B94C-8FF5-43D7BF9D2107}"/>
+              </a:ext>
+            </a:extLst>
+          </p:cNvPr>
+          <p:cNvPicPr>
+            <a:picLocks noChangeAspect="1"/>
+          </p:cNvPicPr>
+          <p:nvPr/>
+        </p:nvPicPr>
+        <p:blipFill>
+          <a:blip r:embed="rId3"/>
+          <a:stretch>
+            <a:fillRect/>
+          </a:stretch>
+        </p:blipFill>
+        <p:spPr>
+          <a:xfrm>
+            <a:off x="277091" y="422567"/>
+            <a:ext cx="6400800" cy="6400800"/>
+          </a:xfrm>
+          <a:prstGeom prst="rect">
+            <a:avLst/>
+          </a:prstGeom>
+        </p:spPr>
+      </p:pic>
+      <p:sp>
+        <p:nvSpPr>
+          <p:cNvPr id="36" name="TextBox 35">
+            <a:extLst>
+              <a:ext uri="{FF2B5EF4-FFF2-40B4-BE49-F238E27FC236}">
+                <a16:creationId xmlns:a16="http://schemas.microsoft.com/office/drawing/2014/main" id="{E6C0960E-09E1-8A4E-80A8-C8F6B9365351}"/>
+              </a:ext>
+            </a:extLst>
+          </p:cNvPr>
+          <p:cNvSpPr txBox="1"/>
+          <p:nvPr/>
+        </p:nvSpPr>
+        <p:spPr>
+          <a:xfrm>
+            <a:off x="6677891" y="4114799"/>
+            <a:ext cx="5112327" cy="1446550"/>
+          </a:xfrm>
+          <a:prstGeom prst="rect">
+            <a:avLst/>
+          </a:prstGeom>
+          <a:noFill/>
+        </p:spPr>
+        <p:txBody>
+          <a:bodyPr wrap="square" rtlCol="0">
+            <a:spAutoFit/>
+          </a:bodyPr>
+          <a:lstStyle/>
+          <a:p>
+            <a:pPr marL="285750" indent="-285750">
+              <a:buFont typeface="Arial" panose="020B0604020202020204" pitchFamily="34" charset="0"/>
+              <a:buChar char="•"/>
+            </a:pPr>
+            <a:r>
+              <a:rPr lang="en-US" sz="2200" dirty="0"/>
+              <a:t>Residuals are relatively happy</a:t>
+            </a:r>
+          </a:p>
+          <a:p>
+            <a:pPr marL="285750" indent="-285750">
+              <a:buFont typeface="Arial" panose="020B0604020202020204" pitchFamily="34" charset="0"/>
+              <a:buChar char="•"/>
+            </a:pPr>
+            <a:r>
+              <a:rPr lang="en-US" sz="2200" dirty="0"/>
+              <a:t>The predicted vs actual plot shows that my model tends to overestimate the number of deaths</a:t>
+            </a:r>
+          </a:p>
+        </p:txBody>
+      </p:sp>
+      <p:sp>
+        <p:nvSpPr>
+          <p:cNvPr id="37" name="Title 1">
+            <a:extLst>
+              <a:ext uri="{FF2B5EF4-FFF2-40B4-BE49-F238E27FC236}">
+                <a16:creationId xmlns:a16="http://schemas.microsoft.com/office/drawing/2014/main" id="{AE9753E8-9E9C-C74E-A68E-CE0BC60A3F15}"/>
               </a:ext>
             </a:extLst>
           </p:cNvPr>
@@ -6466,100 +8476,56 @@
             <p:ph type="title"/>
           </p:nvPr>
         </p:nvSpPr>
+        <p:spPr>
+          <a:xfrm>
+            <a:off x="277091" y="-222900"/>
+            <a:ext cx="10515600" cy="1325563"/>
+          </a:xfrm>
+        </p:spPr>
+        <p:txBody>
+          <a:bodyPr/>
+          <a:lstStyle/>
+          <a:p>
+            <a:r>
+              <a:rPr lang="en-US" dirty="0"/>
+              <a:t>Model Performance</a:t>
+            </a:r>
+          </a:p>
+        </p:txBody>
+      </p:sp>
+      <p:sp>
+        <p:nvSpPr>
+          <p:cNvPr id="38" name="Slide Number Placeholder 37">
+            <a:extLst>
+              <a:ext uri="{FF2B5EF4-FFF2-40B4-BE49-F238E27FC236}">
+                <a16:creationId xmlns:a16="http://schemas.microsoft.com/office/drawing/2014/main" id="{DA3A2A5C-3CE0-EA47-B265-A551250C0125}"/>
+              </a:ext>
+            </a:extLst>
+          </p:cNvPr>
+          <p:cNvSpPr>
+            <a:spLocks noGrp="1"/>
+          </p:cNvSpPr>
+          <p:nvPr>
+            <p:ph type="sldNum" sz="quarter" idx="12"/>
+          </p:nvPr>
+        </p:nvSpPr>
         <p:spPr/>
         <p:txBody>
           <a:bodyPr/>
           <a:lstStyle/>
           <a:p>
-            <a:r>
-              <a:rPr lang="en-US" dirty="0"/>
-              <a:t>Final Model Results</a:t>
-            </a:r>
-          </a:p>
-        </p:txBody>
-      </p:sp>
-      <p:sp>
-        <p:nvSpPr>
-          <p:cNvPr id="3" name="Content Placeholder 2">
-            <a:extLst>
-              <a:ext uri="{FF2B5EF4-FFF2-40B4-BE49-F238E27FC236}">
-                <a16:creationId xmlns:a16="http://schemas.microsoft.com/office/drawing/2014/main" id="{77DB341F-6332-384C-971A-AAC12A4425D3}"/>
-              </a:ext>
-            </a:extLst>
-          </p:cNvPr>
-          <p:cNvSpPr>
-            <a:spLocks noGrp="1"/>
-          </p:cNvSpPr>
-          <p:nvPr>
-            <p:ph idx="1"/>
-          </p:nvPr>
-        </p:nvSpPr>
-        <p:spPr/>
-        <p:txBody>
-          <a:bodyPr/>
-          <a:lstStyle/>
-          <a:p>
-            <a:r>
-              <a:rPr lang="en-US" dirty="0"/>
-              <a:t>Coefficients not included here because there are many of them</a:t>
-            </a:r>
-          </a:p>
-          <a:p>
-            <a:endParaRPr lang="en-US" dirty="0"/>
-          </a:p>
-          <a:p>
-            <a:r>
-              <a:rPr lang="en-US" dirty="0"/>
-              <a:t>r</a:t>
-            </a:r>
-            <a:r>
-              <a:rPr lang="en-US" baseline="30000" dirty="0"/>
-              <a:t>2</a:t>
-            </a:r>
-            <a:r>
-              <a:rPr lang="en-US" dirty="0"/>
-              <a:t> = 32%</a:t>
-            </a:r>
-          </a:p>
-          <a:p>
-            <a:pPr lvl="1"/>
-            <a:r>
-              <a:rPr lang="en-US" dirty="0"/>
-              <a:t>The unexplained variance is high</a:t>
-            </a:r>
-          </a:p>
-          <a:p>
-            <a:pPr lvl="1"/>
-            <a:r>
-              <a:rPr lang="en-US" dirty="0"/>
-              <a:t>I’m not surprised by this considering the complexity of the problem</a:t>
-            </a:r>
-          </a:p>
-          <a:p>
-            <a:pPr lvl="1"/>
-            <a:r>
-              <a:rPr lang="en-US" dirty="0"/>
-              <a:t>It took some effort to even get to this point</a:t>
-            </a:r>
-          </a:p>
-          <a:p>
-            <a:r>
-              <a:rPr lang="en-US" dirty="0"/>
-              <a:t>MAE = 182.1 Deaths per 100k</a:t>
-            </a:r>
-          </a:p>
-          <a:p>
-            <a:r>
-              <a:rPr lang="en-US" dirty="0"/>
-              <a:t>RMSE = 205.5 Deaths per 100k </a:t>
-            </a:r>
+            <a:fld id="{609275CF-5549-3C4A-B9B9-4367A562B0FC}" type="slidenum">
+              <a:rPr lang="en-US" smtClean="0"/>
+              <a:t>9</a:t>
+            </a:fld>
+            <a:endParaRPr lang="en-US"/>
           </a:p>
         </p:txBody>
       </p:sp>
     </p:spTree>
     <p:extLst>
       <p:ext uri="{BB962C8B-B14F-4D97-AF65-F5344CB8AC3E}">
-        <p14:creationId xmlns:p14="http://schemas.microsoft.com/office/powerpoint/2010/main" val="325592695"/>
+        <p14:creationId xmlns:p14="http://schemas.microsoft.com/office/powerpoint/2010/main" val="1775091389"/>
       </p:ext>
     </p:extLst>
   </p:cSld>
@@ -6862,4 +8828,299 @@
     </a:ext>
   </a:extLst>
 </a:theme>
+</file>
+
+<file path=ppt/theme/theme2.xml><?xml version="1.0" encoding="utf-8"?>
+<a:theme xmlns:a="http://schemas.openxmlformats.org/drawingml/2006/main" name="Office Theme">
+  <a:themeElements>
+    <a:clrScheme name="Office">
+      <a:dk1>
+        <a:sysClr val="windowText" lastClr="000000"/>
+      </a:dk1>
+      <a:lt1>
+        <a:sysClr val="window" lastClr="FFFFFF"/>
+      </a:lt1>
+      <a:dk2>
+        <a:srgbClr val="44546A"/>
+      </a:dk2>
+      <a:lt2>
+        <a:srgbClr val="E7E6E6"/>
+      </a:lt2>
+      <a:accent1>
+        <a:srgbClr val="4472C4"/>
+      </a:accent1>
+      <a:accent2>
+        <a:srgbClr val="ED7D31"/>
+      </a:accent2>
+      <a:accent3>
+        <a:srgbClr val="A5A5A5"/>
+      </a:accent3>
+      <a:accent4>
+        <a:srgbClr val="FFC000"/>
+      </a:accent4>
+      <a:accent5>
+        <a:srgbClr val="5B9BD5"/>
+      </a:accent5>
+      <a:accent6>
+        <a:srgbClr val="70AD47"/>
+      </a:accent6>
+      <a:hlink>
+        <a:srgbClr val="0563C1"/>
+      </a:hlink>
+      <a:folHlink>
+        <a:srgbClr val="954F72"/>
+      </a:folHlink>
+    </a:clrScheme>
+    <a:fontScheme name="Office">
+      <a:majorFont>
+        <a:latin typeface="Calibri Light" panose="020F0302020204030204"/>
+        <a:ea typeface=""/>
+        <a:cs typeface=""/>
+        <a:font script="Jpan" typeface="游ゴシック Light"/>
+        <a:font script="Hang" typeface="맑은 고딕"/>
+        <a:font script="Hans" typeface="等线 Light"/>
+        <a:font script="Hant" typeface="新細明體"/>
+        <a:font script="Arab" typeface="Times New Roman"/>
+        <a:font script="Hebr" typeface="Times New Roman"/>
+        <a:font script="Thai" typeface="Angsana New"/>
+        <a:font script="Ethi" typeface="Nyala"/>
+        <a:font script="Beng" typeface="Vrinda"/>
+        <a:font script="Gujr" typeface="Shruti"/>
+        <a:font script="Khmr" typeface="MoolBoran"/>
+        <a:font script="Knda" typeface="Tunga"/>
+        <a:font script="Guru" typeface="Raavi"/>
+        <a:font script="Cans" typeface="Euphemia"/>
+        <a:font script="Cher" typeface="Plantagenet Cherokee"/>
+        <a:font script="Yiii" typeface="Microsoft Yi Baiti"/>
+        <a:font script="Tibt" typeface="Microsoft Himalaya"/>
+        <a:font script="Thaa" typeface="MV Boli"/>
+        <a:font script="Deva" typeface="Mangal"/>
+        <a:font script="Telu" typeface="Gautami"/>
+        <a:font script="Taml" typeface="Latha"/>
+        <a:font script="Syrc" typeface="Estrangelo Edessa"/>
+        <a:font script="Orya" typeface="Kalinga"/>
+        <a:font script="Mlym" typeface="Kartika"/>
+        <a:font script="Laoo" typeface="DokChampa"/>
+        <a:font script="Sinh" typeface="Iskoola Pota"/>
+        <a:font script="Mong" typeface="Mongolian Baiti"/>
+        <a:font script="Viet" typeface="Times New Roman"/>
+        <a:font script="Uigh" typeface="Microsoft Uighur"/>
+        <a:font script="Geor" typeface="Sylfaen"/>
+        <a:font script="Armn" typeface="Arial"/>
+        <a:font script="Bugi" typeface="Leelawadee UI"/>
+        <a:font script="Bopo" typeface="Microsoft JhengHei"/>
+        <a:font script="Java" typeface="Javanese Text"/>
+        <a:font script="Lisu" typeface="Segoe UI"/>
+        <a:font script="Mymr" typeface="Myanmar Text"/>
+        <a:font script="Nkoo" typeface="Ebrima"/>
+        <a:font script="Olck" typeface="Nirmala UI"/>
+        <a:font script="Osma" typeface="Ebrima"/>
+        <a:font script="Phag" typeface="Phagspa"/>
+        <a:font script="Syrn" typeface="Estrangelo Edessa"/>
+        <a:font script="Syrj" typeface="Estrangelo Edessa"/>
+        <a:font script="Syre" typeface="Estrangelo Edessa"/>
+        <a:font script="Sora" typeface="Nirmala UI"/>
+        <a:font script="Tale" typeface="Microsoft Tai Le"/>
+        <a:font script="Talu" typeface="Microsoft New Tai Lue"/>
+        <a:font script="Tfng" typeface="Ebrima"/>
+      </a:majorFont>
+      <a:minorFont>
+        <a:latin typeface="Calibri" panose="020F0502020204030204"/>
+        <a:ea typeface=""/>
+        <a:cs typeface=""/>
+        <a:font script="Jpan" typeface="游ゴシック"/>
+        <a:font script="Hang" typeface="맑은 고딕"/>
+        <a:font script="Hans" typeface="等线"/>
+        <a:font script="Hant" typeface="新細明體"/>
+        <a:font script="Arab" typeface="Arial"/>
+        <a:font script="Hebr" typeface="Arial"/>
+        <a:font script="Thai" typeface="Cordia New"/>
+        <a:font script="Ethi" typeface="Nyala"/>
+        <a:font script="Beng" typeface="Vrinda"/>
+        <a:font script="Gujr" typeface="Shruti"/>
+        <a:font script="Khmr" typeface="DaunPenh"/>
+        <a:font script="Knda" typeface="Tunga"/>
+        <a:font script="Guru" typeface="Raavi"/>
+        <a:font script="Cans" typeface="Euphemia"/>
+        <a:font script="Cher" typeface="Plantagenet Cherokee"/>
+        <a:font script="Yiii" typeface="Microsoft Yi Baiti"/>
+        <a:font script="Tibt" typeface="Microsoft Himalaya"/>
+        <a:font script="Thaa" typeface="MV Boli"/>
+        <a:font script="Deva" typeface="Mangal"/>
+        <a:font script="Telu" typeface="Gautami"/>
+        <a:font script="Taml" typeface="Latha"/>
+        <a:font script="Syrc" typeface="Estrangelo Edessa"/>
+        <a:font script="Orya" typeface="Kalinga"/>
+        <a:font script="Mlym" typeface="Kartika"/>
+        <a:font script="Laoo" typeface="DokChampa"/>
+        <a:font script="Sinh" typeface="Iskoola Pota"/>
+        <a:font script="Mong" typeface="Mongolian Baiti"/>
+        <a:font script="Viet" typeface="Arial"/>
+        <a:font script="Uigh" typeface="Microsoft Uighur"/>
+        <a:font script="Geor" typeface="Sylfaen"/>
+        <a:font script="Armn" typeface="Arial"/>
+        <a:font script="Bugi" typeface="Leelawadee UI"/>
+        <a:font script="Bopo" typeface="Microsoft JhengHei"/>
+        <a:font script="Java" typeface="Javanese Text"/>
+        <a:font script="Lisu" typeface="Segoe UI"/>
+        <a:font script="Mymr" typeface="Myanmar Text"/>
+        <a:font script="Nkoo" typeface="Ebrima"/>
+        <a:font script="Olck" typeface="Nirmala UI"/>
+        <a:font script="Osma" typeface="Ebrima"/>
+        <a:font script="Phag" typeface="Phagspa"/>
+        <a:font script="Syrn" typeface="Estrangelo Edessa"/>
+        <a:font script="Syrj" typeface="Estrangelo Edessa"/>
+        <a:font script="Syre" typeface="Estrangelo Edessa"/>
+        <a:font script="Sora" typeface="Nirmala UI"/>
+        <a:font script="Tale" typeface="Microsoft Tai Le"/>
+        <a:font script="Talu" typeface="Microsoft New Tai Lue"/>
+        <a:font script="Tfng" typeface="Ebrima"/>
+      </a:minorFont>
+    </a:fontScheme>
+    <a:fmtScheme name="Office">
+      <a:fillStyleLst>
+        <a:solidFill>
+          <a:schemeClr val="phClr"/>
+        </a:solidFill>
+        <a:gradFill rotWithShape="1">
+          <a:gsLst>
+            <a:gs pos="0">
+              <a:schemeClr val="phClr">
+                <a:lumMod val="110000"/>
+                <a:satMod val="105000"/>
+                <a:tint val="67000"/>
+              </a:schemeClr>
+            </a:gs>
+            <a:gs pos="50000">
+              <a:schemeClr val="phClr">
+                <a:lumMod val="105000"/>
+                <a:satMod val="103000"/>
+                <a:tint val="73000"/>
+              </a:schemeClr>
+            </a:gs>
+            <a:gs pos="100000">
+              <a:schemeClr val="phClr">
+                <a:lumMod val="105000"/>
+                <a:satMod val="109000"/>
+                <a:tint val="81000"/>
+              </a:schemeClr>
+            </a:gs>
+          </a:gsLst>
+          <a:lin ang="5400000" scaled="0"/>
+        </a:gradFill>
+        <a:gradFill rotWithShape="1">
+          <a:gsLst>
+            <a:gs pos="0">
+              <a:schemeClr val="phClr">
+                <a:satMod val="103000"/>
+                <a:lumMod val="102000"/>
+                <a:tint val="94000"/>
+              </a:schemeClr>
+            </a:gs>
+            <a:gs pos="50000">
+              <a:schemeClr val="phClr">
+                <a:satMod val="110000"/>
+                <a:lumMod val="100000"/>
+                <a:shade val="100000"/>
+              </a:schemeClr>
+            </a:gs>
+            <a:gs pos="100000">
+              <a:schemeClr val="phClr">
+                <a:lumMod val="99000"/>
+                <a:satMod val="120000"/>
+                <a:shade val="78000"/>
+              </a:schemeClr>
+            </a:gs>
+          </a:gsLst>
+          <a:lin ang="5400000" scaled="0"/>
+        </a:gradFill>
+      </a:fillStyleLst>
+      <a:lnStyleLst>
+        <a:ln w="6350" cap="flat" cmpd="sng" algn="ctr">
+          <a:solidFill>
+            <a:schemeClr val="phClr"/>
+          </a:solidFill>
+          <a:prstDash val="solid"/>
+          <a:miter lim="800000"/>
+        </a:ln>
+        <a:ln w="12700" cap="flat" cmpd="sng" algn="ctr">
+          <a:solidFill>
+            <a:schemeClr val="phClr"/>
+          </a:solidFill>
+          <a:prstDash val="solid"/>
+          <a:miter lim="800000"/>
+        </a:ln>
+        <a:ln w="19050" cap="flat" cmpd="sng" algn="ctr">
+          <a:solidFill>
+            <a:schemeClr val="phClr"/>
+          </a:solidFill>
+          <a:prstDash val="solid"/>
+          <a:miter lim="800000"/>
+        </a:ln>
+      </a:lnStyleLst>
+      <a:effectStyleLst>
+        <a:effectStyle>
+          <a:effectLst/>
+        </a:effectStyle>
+        <a:effectStyle>
+          <a:effectLst/>
+        </a:effectStyle>
+        <a:effectStyle>
+          <a:effectLst>
+            <a:outerShdw blurRad="57150" dist="19050" dir="5400000" algn="ctr" rotWithShape="0">
+              <a:srgbClr val="000000">
+                <a:alpha val="63000"/>
+              </a:srgbClr>
+            </a:outerShdw>
+          </a:effectLst>
+        </a:effectStyle>
+      </a:effectStyleLst>
+      <a:bgFillStyleLst>
+        <a:solidFill>
+          <a:schemeClr val="phClr"/>
+        </a:solidFill>
+        <a:solidFill>
+          <a:schemeClr val="phClr">
+            <a:tint val="95000"/>
+            <a:satMod val="170000"/>
+          </a:schemeClr>
+        </a:solidFill>
+        <a:gradFill rotWithShape="1">
+          <a:gsLst>
+            <a:gs pos="0">
+              <a:schemeClr val="phClr">
+                <a:tint val="93000"/>
+                <a:satMod val="150000"/>
+                <a:shade val="98000"/>
+                <a:lumMod val="102000"/>
+              </a:schemeClr>
+            </a:gs>
+            <a:gs pos="50000">
+              <a:schemeClr val="phClr">
+                <a:tint val="98000"/>
+                <a:satMod val="130000"/>
+                <a:shade val="90000"/>
+                <a:lumMod val="103000"/>
+              </a:schemeClr>
+            </a:gs>
+            <a:gs pos="100000">
+              <a:schemeClr val="phClr">
+                <a:shade val="63000"/>
+                <a:satMod val="120000"/>
+              </a:schemeClr>
+            </a:gs>
+          </a:gsLst>
+          <a:lin ang="5400000" scaled="0"/>
+        </a:gradFill>
+      </a:bgFillStyleLst>
+    </a:fmtScheme>
+  </a:themeElements>
+  <a:objectDefaults/>
+  <a:extraClrSchemeLst/>
+  <a:extLst>
+    <a:ext uri="{05A4C25C-085E-4340-85A3-A5531E510DB2}">
+      <thm15:themeFamily xmlns:thm15="http://schemas.microsoft.com/office/thememl/2012/main" name="Office Theme" id="{62F939B6-93AF-4DB8-9C6B-D6C7DFDC589F}" vid="{4A3C46E8-61CC-4603-A589-7422A47A8E4A}"/>
+    </a:ext>
+  </a:extLst>
+</a:theme>
 </file>
</xml_diff>

<commit_message>
Added residual deaths vs county map, updated some plots, updated presentation.
</commit_message>
<xml_diff>
--- a/Presentation/CovidProjectPresentation.pptx
+++ b/Presentation/CovidProjectPresentation.pptx
@@ -5,7 +5,7 @@
     <p:sldMasterId id="2147483648" r:id="rId1"/>
   </p:sldMasterIdLst>
   <p:notesMasterIdLst>
-    <p:notesMasterId r:id="rId22"/>
+    <p:notesMasterId r:id="rId24"/>
   </p:notesMasterIdLst>
   <p:sldIdLst>
     <p:sldId id="256" r:id="rId2"/>
@@ -20,14 +20,16 @@
     <p:sldId id="275" r:id="rId11"/>
     <p:sldId id="267" r:id="rId12"/>
     <p:sldId id="273" r:id="rId13"/>
-    <p:sldId id="264" r:id="rId14"/>
-    <p:sldId id="266" r:id="rId15"/>
-    <p:sldId id="269" r:id="rId16"/>
-    <p:sldId id="262" r:id="rId17"/>
-    <p:sldId id="263" r:id="rId18"/>
-    <p:sldId id="277" r:id="rId19"/>
-    <p:sldId id="276" r:id="rId20"/>
-    <p:sldId id="270" r:id="rId21"/>
+    <p:sldId id="278" r:id="rId14"/>
+    <p:sldId id="264" r:id="rId15"/>
+    <p:sldId id="279" r:id="rId16"/>
+    <p:sldId id="266" r:id="rId17"/>
+    <p:sldId id="269" r:id="rId18"/>
+    <p:sldId id="262" r:id="rId19"/>
+    <p:sldId id="263" r:id="rId20"/>
+    <p:sldId id="277" r:id="rId21"/>
+    <p:sldId id="276" r:id="rId22"/>
+    <p:sldId id="270" r:id="rId23"/>
   </p:sldIdLst>
   <p:sldSz cx="12192000" cy="6858000"/>
   <p:notesSz cx="6858000" cy="9144000"/>
@@ -820,7 +822,10 @@
           <a:bodyPr/>
           <a:lstStyle/>
           <a:p>
-            <a:endParaRPr lang="en-US" dirty="0"/>
+            <a:r>
+              <a:rPr lang="en-US" dirty="0"/>
+              <a:t>CDC and others do more complicated calculations on the features that they input into their models.</a:t>
+            </a:r>
           </a:p>
         </p:txBody>
       </p:sp>
@@ -4306,8 +4311,8 @@
         </p:blipFill>
         <p:spPr>
           <a:xfrm>
-            <a:off x="6803937" y="28818"/>
-            <a:ext cx="5186141" cy="1709612"/>
+            <a:off x="6257923" y="66442"/>
+            <a:ext cx="5346389" cy="1634364"/>
           </a:xfrm>
           <a:prstGeom prst="rect">
             <a:avLst/>
@@ -4986,7 +4991,7 @@
             </a:r>
             <a:r>
               <a:rPr lang="en-US" dirty="0"/>
-              <a:t> = 32%</a:t>
+              <a:t> = 32% on the test data</a:t>
             </a:r>
           </a:p>
           <a:p>
@@ -5131,23 +5136,10 @@
             </a:r>
           </a:p>
           <a:p>
+            <a:pPr lvl="1"/>
             <a:r>
               <a:rPr lang="en-US" dirty="0"/>
-              <a:t>Other features could be included to improve the model</a:t>
-            </a:r>
-          </a:p>
-          <a:p>
-            <a:pPr lvl="1"/>
-            <a:r>
-              <a:rPr lang="en-US" dirty="0"/>
-              <a:t>More healthcare related statistics</a:t>
-            </a:r>
-          </a:p>
-          <a:p>
-            <a:pPr lvl="1"/>
-            <a:r>
-              <a:rPr lang="en-US" dirty="0"/>
-              <a:t>Time features, other data</a:t>
+              <a:t>More features including health care related statistics, time-dependent features, etc. </a:t>
             </a:r>
           </a:p>
           <a:p>
@@ -5156,6 +5148,37 @@
               <a:rPr lang="en-US" dirty="0"/>
               <a:t>More sophisticated calculations on those features</a:t>
             </a:r>
+          </a:p>
+          <a:p>
+            <a:pPr lvl="1"/>
+            <a:r>
+              <a:rPr lang="en-US" dirty="0"/>
+              <a:t>Finer granularity: cities or census tracts</a:t>
+            </a:r>
+          </a:p>
+          <a:p>
+            <a:r>
+              <a:rPr lang="en-US" dirty="0"/>
+              <a:t>This analysis workflow could be applied on other target variables entirely since census data is pretty general</a:t>
+            </a:r>
+          </a:p>
+          <a:p>
+            <a:pPr lvl="1"/>
+            <a:r>
+              <a:rPr lang="en-US" dirty="0"/>
+              <a:t>Other diseases</a:t>
+            </a:r>
+          </a:p>
+          <a:p>
+            <a:pPr lvl="1"/>
+            <a:r>
+              <a:rPr lang="en-US" dirty="0"/>
+              <a:t>Business focus</a:t>
+            </a:r>
+          </a:p>
+          <a:p>
+            <a:pPr lvl="1"/>
+            <a:endParaRPr lang="en-US" dirty="0"/>
           </a:p>
         </p:txBody>
       </p:sp>
@@ -5223,7 +5246,7 @@
           <p:cNvPr id="2" name="Title 1">
             <a:extLst>
               <a:ext uri="{FF2B5EF4-FFF2-40B4-BE49-F238E27FC236}">
-                <a16:creationId xmlns:a16="http://schemas.microsoft.com/office/drawing/2014/main" id="{546FD65D-CD88-7246-B80C-84452B604F54}"/>
+                <a16:creationId xmlns:a16="http://schemas.microsoft.com/office/drawing/2014/main" id="{022083C9-772E-E84A-AA89-D71951678BFE}"/>
               </a:ext>
             </a:extLst>
           </p:cNvPr>
@@ -5241,7 +5264,7 @@
           <a:p>
             <a:r>
               <a:rPr lang="en-US" dirty="0"/>
-              <a:t>Appendix</a:t>
+              <a:t>End - Questions?</a:t>
             </a:r>
           </a:p>
         </p:txBody>
@@ -5251,7 +5274,7 @@
           <p:cNvPr id="3" name="Content Placeholder 2">
             <a:extLst>
               <a:ext uri="{FF2B5EF4-FFF2-40B4-BE49-F238E27FC236}">
-                <a16:creationId xmlns:a16="http://schemas.microsoft.com/office/drawing/2014/main" id="{F719B4F5-395D-6440-97CC-A2C4DBCB9469}"/>
+                <a16:creationId xmlns:a16="http://schemas.microsoft.com/office/drawing/2014/main" id="{41B01638-21B9-A944-921E-7888B8AF4646}"/>
               </a:ext>
             </a:extLst>
           </p:cNvPr>
@@ -5276,7 +5299,7 @@
           <p:cNvPr id="4" name="Slide Number Placeholder 3">
             <a:extLst>
               <a:ext uri="{FF2B5EF4-FFF2-40B4-BE49-F238E27FC236}">
-                <a16:creationId xmlns:a16="http://schemas.microsoft.com/office/drawing/2014/main" id="{6A35F1E4-3CB2-674C-8B81-53927E352770}"/>
+                <a16:creationId xmlns:a16="http://schemas.microsoft.com/office/drawing/2014/main" id="{39FFF1A3-787F-4F4E-8715-EC6F2C4F24B4}"/>
               </a:ext>
             </a:extLst>
           </p:cNvPr>
@@ -5303,7 +5326,7 @@
     </p:spTree>
     <p:extLst>
       <p:ext uri="{BB962C8B-B14F-4D97-AF65-F5344CB8AC3E}">
-        <p14:creationId xmlns:p14="http://schemas.microsoft.com/office/powerpoint/2010/main" val="1111206884"/>
+        <p14:creationId xmlns:p14="http://schemas.microsoft.com/office/powerpoint/2010/main" val="2772841463"/>
       </p:ext>
     </p:extLst>
   </p:cSld>
@@ -5335,7 +5358,7 @@
           <p:cNvPr id="2" name="Title 1">
             <a:extLst>
               <a:ext uri="{FF2B5EF4-FFF2-40B4-BE49-F238E27FC236}">
-                <a16:creationId xmlns:a16="http://schemas.microsoft.com/office/drawing/2014/main" id="{D5973464-1E70-744D-8128-0187268F5B06}"/>
+                <a16:creationId xmlns:a16="http://schemas.microsoft.com/office/drawing/2014/main" id="{546FD65D-CD88-7246-B80C-84452B604F54}"/>
               </a:ext>
             </a:extLst>
           </p:cNvPr>
@@ -5353,219 +5376,42 @@
           <a:p>
             <a:r>
               <a:rPr lang="en-US" dirty="0"/>
-              <a:t>Simpler Model – </a:t>
-            </a:r>
-            <a:r>
-              <a:rPr lang="en-US" dirty="0" err="1"/>
-              <a:t>LassoCV</a:t>
-            </a:r>
-            <a:r>
-              <a:rPr lang="en-US" dirty="0"/>
-              <a:t> with standard features</a:t>
-            </a:r>
-          </a:p>
-        </p:txBody>
-      </p:sp>
-      <p:sp>
-        <p:nvSpPr>
-          <p:cNvPr id="6" name="TextBox 5">
-            <a:extLst>
-              <a:ext uri="{FF2B5EF4-FFF2-40B4-BE49-F238E27FC236}">
-                <a16:creationId xmlns:a16="http://schemas.microsoft.com/office/drawing/2014/main" id="{2CD780C9-E933-AF46-9BBC-FE8B796DC98D}"/>
-              </a:ext>
-            </a:extLst>
-          </p:cNvPr>
-          <p:cNvSpPr txBox="1"/>
-          <p:nvPr/>
-        </p:nvSpPr>
-        <p:spPr>
-          <a:xfrm>
-            <a:off x="1302326" y="2104519"/>
-            <a:ext cx="8612935" cy="3416320"/>
-          </a:xfrm>
-          <a:prstGeom prst="rect">
-            <a:avLst/>
-          </a:prstGeom>
-          <a:noFill/>
-        </p:spPr>
-        <p:txBody>
-          <a:bodyPr wrap="none" rtlCol="0">
-            <a:spAutoFit/>
-          </a:bodyPr>
-          <a:lstStyle/>
-          <a:p>
-            <a:r>
-              <a:rPr lang="en-US" dirty="0"/>
-              <a:t>('Persons 65 years and over, percent', 0.074) </a:t>
-            </a:r>
-          </a:p>
-          <a:p>
-            <a:r>
-              <a:rPr lang="en-US" dirty="0"/>
-              <a:t>('Black or African American alone, percent(a)', -0.047) </a:t>
-            </a:r>
-          </a:p>
-          <a:p>
-            <a:r>
-              <a:rPr lang="en-US" dirty="0"/>
-              <a:t>('Two or More Races, percent', -0.228) </a:t>
-            </a:r>
-          </a:p>
-          <a:p>
-            <a:r>
-              <a:rPr lang="en-US" dirty="0"/>
-              <a:t>('White alone, not Hispanic or Latino, percent', -0.327) </a:t>
-            </a:r>
-          </a:p>
-          <a:p>
-            <a:r>
-              <a:rPr lang="en-US" dirty="0"/>
-              <a:t>('Median value of owner-occupied housing units, 2015-2019', -0.322) </a:t>
-            </a:r>
-          </a:p>
-          <a:p>
-            <a:r>
-              <a:rPr lang="en-US" dirty="0"/>
-              <a:t>('Living in same house 1 year ago, percent of persons age 1 year+, 2015-2019', 0.002) </a:t>
-            </a:r>
-          </a:p>
-          <a:p>
-            <a:r>
-              <a:rPr lang="en-US" dirty="0"/>
-              <a:t>('Households with a computer, percent, 2015-2019', -0.193) </a:t>
-            </a:r>
-          </a:p>
-          <a:p>
-            <a:r>
-              <a:rPr lang="en-US" dirty="0"/>
-              <a:t>('Households with a broadband Internet subscription, percent, 2015-2019', 0.019)</a:t>
-            </a:r>
-          </a:p>
-          <a:p>
-            <a:r>
-              <a:rPr lang="en-US" dirty="0"/>
-              <a:t>('High school graduate or higher, percent of persons age 25 years+, 2015-2019', 0.084) </a:t>
-            </a:r>
-          </a:p>
-          <a:p>
-            <a:r>
-              <a:rPr lang="en-US" dirty="0"/>
-              <a:t>("Bachelor's degree or higher, percent of persons age 25 years+, 2015-2019", -0.057) </a:t>
-            </a:r>
-          </a:p>
-          <a:p>
-            <a:r>
-              <a:rPr lang="en-US" dirty="0"/>
-              <a:t>('Persons without health insurance, under age 65 years, percent', 0.045) </a:t>
-            </a:r>
-          </a:p>
-          <a:p>
-            <a:r>
-              <a:rPr lang="en-US" dirty="0"/>
-              <a:t>('Median household income (in 2019 dollars), 2015-2019', 0.162)</a:t>
-            </a:r>
-          </a:p>
-        </p:txBody>
-      </p:sp>
-      <p:sp>
-        <p:nvSpPr>
-          <p:cNvPr id="7" name="TextBox 6">
-            <a:extLst>
-              <a:ext uri="{FF2B5EF4-FFF2-40B4-BE49-F238E27FC236}">
-                <a16:creationId xmlns:a16="http://schemas.microsoft.com/office/drawing/2014/main" id="{423E990E-D0FC-AA41-854F-58B80FF20DC4}"/>
-              </a:ext>
-            </a:extLst>
-          </p:cNvPr>
-          <p:cNvSpPr txBox="1"/>
-          <p:nvPr/>
-        </p:nvSpPr>
-        <p:spPr>
-          <a:xfrm>
-            <a:off x="3463635" y="5888733"/>
-            <a:ext cx="1156086" cy="369332"/>
-          </a:xfrm>
-          <a:prstGeom prst="rect">
-            <a:avLst/>
-          </a:prstGeom>
-          <a:noFill/>
-        </p:spPr>
-        <p:txBody>
-          <a:bodyPr wrap="none" rtlCol="0">
-            <a:spAutoFit/>
-          </a:bodyPr>
-          <a:lstStyle/>
-          <a:p>
-            <a:r>
-              <a:rPr lang="en-US" dirty="0" err="1"/>
-              <a:t>ƛ</a:t>
-            </a:r>
-            <a:r>
-              <a:rPr lang="en-US" dirty="0"/>
-              <a:t> = 0.0014</a:t>
-            </a:r>
-          </a:p>
-        </p:txBody>
-      </p:sp>
-      <p:sp>
-        <p:nvSpPr>
-          <p:cNvPr id="8" name="Rectangle 7">
-            <a:extLst>
-              <a:ext uri="{FF2B5EF4-FFF2-40B4-BE49-F238E27FC236}">
-                <a16:creationId xmlns:a16="http://schemas.microsoft.com/office/drawing/2014/main" id="{1CB14B0D-2399-624D-92F9-9A713288EC9D}"/>
-              </a:ext>
-            </a:extLst>
-          </p:cNvPr>
-          <p:cNvSpPr/>
-          <p:nvPr/>
-        </p:nvSpPr>
-        <p:spPr>
-          <a:xfrm>
-            <a:off x="5705775" y="5657671"/>
-            <a:ext cx="6096000" cy="923330"/>
-          </a:xfrm>
-          <a:prstGeom prst="rect">
-            <a:avLst/>
-          </a:prstGeom>
-        </p:spPr>
-        <p:txBody>
-          <a:bodyPr>
-            <a:spAutoFit/>
-          </a:bodyPr>
-          <a:lstStyle/>
-          <a:p>
-            <a:r>
-              <a:rPr lang="en-US" dirty="0"/>
-              <a:t>r</a:t>
-            </a:r>
-            <a:r>
-              <a:rPr lang="en-US" baseline="30000" dirty="0"/>
-              <a:t>2</a:t>
-            </a:r>
-            <a:r>
-              <a:rPr lang="en-US" dirty="0"/>
-              <a:t> = 27%</a:t>
-            </a:r>
-          </a:p>
-          <a:p>
-            <a:r>
-              <a:rPr lang="en-US" dirty="0"/>
-              <a:t>MAE = 188.2 Deaths per 100k</a:t>
-            </a:r>
-          </a:p>
-          <a:p>
-            <a:r>
-              <a:rPr lang="en-US" dirty="0"/>
-              <a:t>RMSE = 211.8 Deaths per 100k </a:t>
-            </a:r>
-          </a:p>
-        </p:txBody>
-      </p:sp>
-      <p:sp>
-        <p:nvSpPr>
-          <p:cNvPr id="9" name="Slide Number Placeholder 8">
-            <a:extLst>
-              <a:ext uri="{FF2B5EF4-FFF2-40B4-BE49-F238E27FC236}">
-                <a16:creationId xmlns:a16="http://schemas.microsoft.com/office/drawing/2014/main" id="{DB4E04A6-2476-E242-B085-E4C79ACF5131}"/>
+              <a:t>Appendix</a:t>
+            </a:r>
+          </a:p>
+        </p:txBody>
+      </p:sp>
+      <p:sp>
+        <p:nvSpPr>
+          <p:cNvPr id="3" name="Content Placeholder 2">
+            <a:extLst>
+              <a:ext uri="{FF2B5EF4-FFF2-40B4-BE49-F238E27FC236}">
+                <a16:creationId xmlns:a16="http://schemas.microsoft.com/office/drawing/2014/main" id="{F719B4F5-395D-6440-97CC-A2C4DBCB9469}"/>
+              </a:ext>
+            </a:extLst>
+          </p:cNvPr>
+          <p:cNvSpPr>
+            <a:spLocks noGrp="1"/>
+          </p:cNvSpPr>
+          <p:nvPr>
+            <p:ph idx="1"/>
+          </p:nvPr>
+        </p:nvSpPr>
+        <p:spPr/>
+        <p:txBody>
+          <a:bodyPr/>
+          <a:lstStyle/>
+          <a:p>
+            <a:endParaRPr lang="en-US"/>
+          </a:p>
+        </p:txBody>
+      </p:sp>
+      <p:sp>
+        <p:nvSpPr>
+          <p:cNvPr id="4" name="Slide Number Placeholder 3">
+            <a:extLst>
+              <a:ext uri="{FF2B5EF4-FFF2-40B4-BE49-F238E27FC236}">
+                <a16:creationId xmlns:a16="http://schemas.microsoft.com/office/drawing/2014/main" id="{6A35F1E4-3CB2-674C-8B81-53927E352770}"/>
               </a:ext>
             </a:extLst>
           </p:cNvPr>
@@ -5592,7 +5438,7 @@
     </p:spTree>
     <p:extLst>
       <p:ext uri="{BB962C8B-B14F-4D97-AF65-F5344CB8AC3E}">
-        <p14:creationId xmlns:p14="http://schemas.microsoft.com/office/powerpoint/2010/main" val="4227386819"/>
+        <p14:creationId xmlns:p14="http://schemas.microsoft.com/office/powerpoint/2010/main" val="1111206884"/>
       </p:ext>
     </p:extLst>
   </p:cSld>
@@ -5621,110 +5467,10 @@
       </p:grpSpPr>
       <p:sp>
         <p:nvSpPr>
-          <p:cNvPr id="2" name="Title 1">
-            <a:extLst>
-              <a:ext uri="{FF2B5EF4-FFF2-40B4-BE49-F238E27FC236}">
-                <a16:creationId xmlns:a16="http://schemas.microsoft.com/office/drawing/2014/main" id="{A9EF4D6B-D225-1947-BF09-F62D8B7A6C0A}"/>
-              </a:ext>
-            </a:extLst>
-          </p:cNvPr>
-          <p:cNvSpPr>
-            <a:spLocks noGrp="1"/>
-          </p:cNvSpPr>
-          <p:nvPr>
-            <p:ph type="title"/>
-          </p:nvPr>
-        </p:nvSpPr>
-        <p:spPr/>
-        <p:txBody>
-          <a:bodyPr/>
-          <a:lstStyle/>
-          <a:p>
-            <a:r>
-              <a:rPr lang="en-US" dirty="0"/>
-              <a:t>Model progression (on training data)</a:t>
-            </a:r>
-          </a:p>
-        </p:txBody>
-      </p:sp>
-      <p:sp>
-        <p:nvSpPr>
-          <p:cNvPr id="3" name="Content Placeholder 2">
-            <a:extLst>
-              <a:ext uri="{FF2B5EF4-FFF2-40B4-BE49-F238E27FC236}">
-                <a16:creationId xmlns:a16="http://schemas.microsoft.com/office/drawing/2014/main" id="{1ED42D3F-B8B0-8F49-96CE-9510E2F829C2}"/>
-              </a:ext>
-            </a:extLst>
-          </p:cNvPr>
-          <p:cNvSpPr>
-            <a:spLocks noGrp="1"/>
-          </p:cNvSpPr>
-          <p:nvPr>
-            <p:ph idx="1"/>
-          </p:nvPr>
-        </p:nvSpPr>
-        <p:spPr/>
-        <p:txBody>
-          <a:bodyPr>
-            <a:normAutofit lnSpcReduction="10000"/>
-          </a:bodyPr>
-          <a:lstStyle/>
-          <a:p>
-            <a:r>
-              <a:rPr lang="en-US" dirty="0"/>
-              <a:t>~0.1 with simple linear regression using most correlated features</a:t>
-            </a:r>
-          </a:p>
-          <a:p>
-            <a:r>
-              <a:rPr lang="en-US" dirty="0"/>
-              <a:t>~0.2 after reducing features manually</a:t>
-            </a:r>
-          </a:p>
-          <a:p>
-            <a:r>
-              <a:rPr lang="en-US" dirty="0"/>
-              <a:t>~0.27 after Box-Cox transform of target</a:t>
-            </a:r>
-          </a:p>
-          <a:p>
-            <a:r>
-              <a:rPr lang="en-US" dirty="0"/>
-              <a:t>~0.315 after poly transform of features</a:t>
-            </a:r>
-          </a:p>
-          <a:p>
-            <a:r>
-              <a:rPr lang="en-US" dirty="0"/>
-              <a:t>~0.36 using Lasso on poly features</a:t>
-            </a:r>
-          </a:p>
-          <a:p>
-            <a:endParaRPr lang="en-US" dirty="0"/>
-          </a:p>
-          <a:p>
-            <a:r>
-              <a:rPr lang="en-US" dirty="0"/>
-              <a:t>Ridge and Lasso were basically equivalent</a:t>
-            </a:r>
-          </a:p>
-          <a:p>
-            <a:r>
-              <a:rPr lang="en-US" dirty="0"/>
-              <a:t>I chose Lasso because it zeroed out a good amount of the polynomial features</a:t>
-            </a:r>
-          </a:p>
-          <a:p>
-            <a:endParaRPr lang="en-US" dirty="0"/>
-          </a:p>
-        </p:txBody>
-      </p:sp>
-      <p:sp>
-        <p:nvSpPr>
           <p:cNvPr id="4" name="Slide Number Placeholder 3">
             <a:extLst>
               <a:ext uri="{FF2B5EF4-FFF2-40B4-BE49-F238E27FC236}">
-                <a16:creationId xmlns:a16="http://schemas.microsoft.com/office/drawing/2014/main" id="{08D5CBD8-55DC-2C4A-B95D-0DAE3CF0F4FC}"/>
+                <a16:creationId xmlns:a16="http://schemas.microsoft.com/office/drawing/2014/main" id="{D3DFC33C-225A-1146-B46B-46CF681001E5}"/>
               </a:ext>
             </a:extLst>
           </p:cNvPr>
@@ -5748,10 +5494,77 @@
           </a:p>
         </p:txBody>
       </p:sp>
+      <p:pic>
+        <p:nvPicPr>
+          <p:cNvPr id="8" name="Picture 7">
+            <a:extLst>
+              <a:ext uri="{FF2B5EF4-FFF2-40B4-BE49-F238E27FC236}">
+                <a16:creationId xmlns:a16="http://schemas.microsoft.com/office/drawing/2014/main" id="{EAD72DB8-8262-8F48-B212-824B55B958F7}"/>
+              </a:ext>
+            </a:extLst>
+          </p:cNvPr>
+          <p:cNvPicPr>
+            <a:picLocks noChangeAspect="1"/>
+          </p:cNvPicPr>
+          <p:nvPr/>
+        </p:nvPicPr>
+        <p:blipFill>
+          <a:blip r:embed="rId2"/>
+          <a:stretch>
+            <a:fillRect/>
+          </a:stretch>
+        </p:blipFill>
+        <p:spPr>
+          <a:xfrm>
+            <a:off x="614363" y="656344"/>
+            <a:ext cx="11353800" cy="6201656"/>
+          </a:xfrm>
+          <a:prstGeom prst="rect">
+            <a:avLst/>
+          </a:prstGeom>
+        </p:spPr>
+      </p:pic>
+      <p:sp>
+        <p:nvSpPr>
+          <p:cNvPr id="9" name="TextBox 8">
+            <a:extLst>
+              <a:ext uri="{FF2B5EF4-FFF2-40B4-BE49-F238E27FC236}">
+                <a16:creationId xmlns:a16="http://schemas.microsoft.com/office/drawing/2014/main" id="{DE698DB6-8977-3D46-A16E-458C68CD3BE7}"/>
+              </a:ext>
+            </a:extLst>
+          </p:cNvPr>
+          <p:cNvSpPr txBox="1"/>
+          <p:nvPr/>
+        </p:nvSpPr>
+        <p:spPr>
+          <a:xfrm>
+            <a:off x="318655" y="124690"/>
+            <a:ext cx="9154237" cy="707886"/>
+          </a:xfrm>
+          <a:prstGeom prst="rect">
+            <a:avLst/>
+          </a:prstGeom>
+          <a:noFill/>
+        </p:spPr>
+        <p:txBody>
+          <a:bodyPr wrap="none" rtlCol="0">
+            <a:spAutoFit/>
+          </a:bodyPr>
+          <a:lstStyle/>
+          <a:p>
+            <a:r>
+              <a:rPr lang="en-US" sz="4000" dirty="0">
+                <a:latin typeface="+mj-lt"/>
+              </a:rPr>
+              <a:t>US County Residual Deaths per 100k People</a:t>
+            </a:r>
+          </a:p>
+        </p:txBody>
+      </p:sp>
     </p:spTree>
     <p:extLst>
       <p:ext uri="{BB962C8B-B14F-4D97-AF65-F5344CB8AC3E}">
-        <p14:creationId xmlns:p14="http://schemas.microsoft.com/office/powerpoint/2010/main" val="1178381554"/>
+        <p14:creationId xmlns:p14="http://schemas.microsoft.com/office/powerpoint/2010/main" val="3476944831"/>
       </p:ext>
     </p:extLst>
   </p:cSld>
@@ -5778,132 +5591,242 @@
           <a:chExt cx="0" cy="0"/>
         </a:xfrm>
       </p:grpSpPr>
-      <p:pic>
-        <p:nvPicPr>
-          <p:cNvPr id="2" name="Picture 1">
-            <a:extLst>
-              <a:ext uri="{FF2B5EF4-FFF2-40B4-BE49-F238E27FC236}">
-                <a16:creationId xmlns:a16="http://schemas.microsoft.com/office/drawing/2014/main" id="{D7E046CB-B5A6-A64B-8FFA-27B229994121}"/>
-              </a:ext>
-            </a:extLst>
-          </p:cNvPr>
-          <p:cNvPicPr>
-            <a:picLocks noChangeAspect="1"/>
-          </p:cNvPicPr>
+      <p:sp>
+        <p:nvSpPr>
+          <p:cNvPr id="2" name="Title 1">
+            <a:extLst>
+              <a:ext uri="{FF2B5EF4-FFF2-40B4-BE49-F238E27FC236}">
+                <a16:creationId xmlns:a16="http://schemas.microsoft.com/office/drawing/2014/main" id="{D5973464-1E70-744D-8128-0187268F5B06}"/>
+              </a:ext>
+            </a:extLst>
+          </p:cNvPr>
+          <p:cNvSpPr>
+            <a:spLocks noGrp="1"/>
+          </p:cNvSpPr>
+          <p:nvPr>
+            <p:ph type="title"/>
+          </p:nvPr>
+        </p:nvSpPr>
+        <p:spPr/>
+        <p:txBody>
+          <a:bodyPr/>
+          <a:lstStyle/>
+          <a:p>
+            <a:r>
+              <a:rPr lang="en-US" dirty="0"/>
+              <a:t>Simpler Model – </a:t>
+            </a:r>
+            <a:r>
+              <a:rPr lang="en-US" dirty="0" err="1"/>
+              <a:t>LassoCV</a:t>
+            </a:r>
+            <a:r>
+              <a:rPr lang="en-US" dirty="0"/>
+              <a:t> with standard features</a:t>
+            </a:r>
+          </a:p>
+        </p:txBody>
+      </p:sp>
+      <p:sp>
+        <p:nvSpPr>
+          <p:cNvPr id="6" name="TextBox 5">
+            <a:extLst>
+              <a:ext uri="{FF2B5EF4-FFF2-40B4-BE49-F238E27FC236}">
+                <a16:creationId xmlns:a16="http://schemas.microsoft.com/office/drawing/2014/main" id="{2CD780C9-E933-AF46-9BBC-FE8B796DC98D}"/>
+              </a:ext>
+            </a:extLst>
+          </p:cNvPr>
+          <p:cNvSpPr txBox="1"/>
           <p:nvPr/>
-        </p:nvPicPr>
-        <p:blipFill>
-          <a:blip r:embed="rId2"/>
-          <a:stretch>
-            <a:fillRect/>
-          </a:stretch>
-        </p:blipFill>
+        </p:nvSpPr>
         <p:spPr>
           <a:xfrm>
-            <a:off x="689153" y="419630"/>
-            <a:ext cx="5628519" cy="2717215"/>
+            <a:off x="1302326" y="2104519"/>
+            <a:ext cx="8612935" cy="3416320"/>
+          </a:xfrm>
+          <a:prstGeom prst="rect">
+            <a:avLst/>
+          </a:prstGeom>
+          <a:noFill/>
+        </p:spPr>
+        <p:txBody>
+          <a:bodyPr wrap="none" rtlCol="0">
+            <a:spAutoFit/>
+          </a:bodyPr>
+          <a:lstStyle/>
+          <a:p>
+            <a:r>
+              <a:rPr lang="en-US" dirty="0"/>
+              <a:t>('Persons 65 years and over, percent', 0.074) </a:t>
+            </a:r>
+          </a:p>
+          <a:p>
+            <a:r>
+              <a:rPr lang="en-US" dirty="0"/>
+              <a:t>('Black or African American alone, percent(a)', -0.047) </a:t>
+            </a:r>
+          </a:p>
+          <a:p>
+            <a:r>
+              <a:rPr lang="en-US" dirty="0"/>
+              <a:t>('Two or More Races, percent', -0.228) </a:t>
+            </a:r>
+          </a:p>
+          <a:p>
+            <a:r>
+              <a:rPr lang="en-US" dirty="0"/>
+              <a:t>('White alone, not Hispanic or Latino, percent', -0.327) </a:t>
+            </a:r>
+          </a:p>
+          <a:p>
+            <a:r>
+              <a:rPr lang="en-US" dirty="0"/>
+              <a:t>('Median value of owner-occupied housing units, 2015-2019', -0.322) </a:t>
+            </a:r>
+          </a:p>
+          <a:p>
+            <a:r>
+              <a:rPr lang="en-US" dirty="0"/>
+              <a:t>('Living in same house 1 year ago, percent of persons age 1 year+, 2015-2019', 0.002) </a:t>
+            </a:r>
+          </a:p>
+          <a:p>
+            <a:r>
+              <a:rPr lang="en-US" dirty="0"/>
+              <a:t>('Households with a computer, percent, 2015-2019', -0.193) </a:t>
+            </a:r>
+          </a:p>
+          <a:p>
+            <a:r>
+              <a:rPr lang="en-US" dirty="0"/>
+              <a:t>('Households with a broadband Internet subscription, percent, 2015-2019', 0.019)</a:t>
+            </a:r>
+          </a:p>
+          <a:p>
+            <a:r>
+              <a:rPr lang="en-US" dirty="0"/>
+              <a:t>('High school graduate or higher, percent of persons age 25 years+, 2015-2019', 0.084) </a:t>
+            </a:r>
+          </a:p>
+          <a:p>
+            <a:r>
+              <a:rPr lang="en-US" dirty="0"/>
+              <a:t>("Bachelor's degree or higher, percent of persons age 25 years+, 2015-2019", -0.057) </a:t>
+            </a:r>
+          </a:p>
+          <a:p>
+            <a:r>
+              <a:rPr lang="en-US" dirty="0"/>
+              <a:t>('Persons without health insurance, under age 65 years, percent', 0.045) </a:t>
+            </a:r>
+          </a:p>
+          <a:p>
+            <a:r>
+              <a:rPr lang="en-US" dirty="0"/>
+              <a:t>('Median household income (in 2019 dollars), 2015-2019', 0.162)</a:t>
+            </a:r>
+          </a:p>
+        </p:txBody>
+      </p:sp>
+      <p:sp>
+        <p:nvSpPr>
+          <p:cNvPr id="7" name="TextBox 6">
+            <a:extLst>
+              <a:ext uri="{FF2B5EF4-FFF2-40B4-BE49-F238E27FC236}">
+                <a16:creationId xmlns:a16="http://schemas.microsoft.com/office/drawing/2014/main" id="{423E990E-D0FC-AA41-854F-58B80FF20DC4}"/>
+              </a:ext>
+            </a:extLst>
+          </p:cNvPr>
+          <p:cNvSpPr txBox="1"/>
+          <p:nvPr/>
+        </p:nvSpPr>
+        <p:spPr>
+          <a:xfrm>
+            <a:off x="3463635" y="5888733"/>
+            <a:ext cx="1156086" cy="369332"/>
+          </a:xfrm>
+          <a:prstGeom prst="rect">
+            <a:avLst/>
+          </a:prstGeom>
+          <a:noFill/>
+        </p:spPr>
+        <p:txBody>
+          <a:bodyPr wrap="none" rtlCol="0">
+            <a:spAutoFit/>
+          </a:bodyPr>
+          <a:lstStyle/>
+          <a:p>
+            <a:r>
+              <a:rPr lang="en-US" dirty="0" err="1"/>
+              <a:t>ƛ</a:t>
+            </a:r>
+            <a:r>
+              <a:rPr lang="en-US" dirty="0"/>
+              <a:t> = 0.0014</a:t>
+            </a:r>
+          </a:p>
+        </p:txBody>
+      </p:sp>
+      <p:sp>
+        <p:nvSpPr>
+          <p:cNvPr id="8" name="Rectangle 7">
+            <a:extLst>
+              <a:ext uri="{FF2B5EF4-FFF2-40B4-BE49-F238E27FC236}">
+                <a16:creationId xmlns:a16="http://schemas.microsoft.com/office/drawing/2014/main" id="{1CB14B0D-2399-624D-92F9-9A713288EC9D}"/>
+              </a:ext>
+            </a:extLst>
+          </p:cNvPr>
+          <p:cNvSpPr/>
+          <p:nvPr/>
+        </p:nvSpPr>
+        <p:spPr>
+          <a:xfrm>
+            <a:off x="5705775" y="5657671"/>
+            <a:ext cx="6096000" cy="923330"/>
           </a:xfrm>
           <a:prstGeom prst="rect">
             <a:avLst/>
           </a:prstGeom>
         </p:spPr>
-      </p:pic>
-      <p:pic>
-        <p:nvPicPr>
-          <p:cNvPr id="4" name="Picture 3">
-            <a:extLst>
-              <a:ext uri="{FF2B5EF4-FFF2-40B4-BE49-F238E27FC236}">
-                <a16:creationId xmlns:a16="http://schemas.microsoft.com/office/drawing/2014/main" id="{A7C447CE-EFDB-D748-9A41-78DF9B9E2BE0}"/>
-              </a:ext>
-            </a:extLst>
-          </p:cNvPr>
-          <p:cNvPicPr>
-            <a:picLocks noChangeAspect="1"/>
-          </p:cNvPicPr>
-          <p:nvPr/>
-        </p:nvPicPr>
-        <p:blipFill>
-          <a:blip r:embed="rId3"/>
-          <a:stretch>
-            <a:fillRect/>
-          </a:stretch>
-        </p:blipFill>
-        <p:spPr>
-          <a:xfrm>
-            <a:off x="6689344" y="3419179"/>
-            <a:ext cx="4394291" cy="2929527"/>
-          </a:xfrm>
-          <a:prstGeom prst="rect">
-            <a:avLst/>
-          </a:prstGeom>
-        </p:spPr>
-      </p:pic>
-      <p:pic>
-        <p:nvPicPr>
-          <p:cNvPr id="5" name="Picture 4">
-            <a:extLst>
-              <a:ext uri="{FF2B5EF4-FFF2-40B4-BE49-F238E27FC236}">
-                <a16:creationId xmlns:a16="http://schemas.microsoft.com/office/drawing/2014/main" id="{87C18726-1E54-3A4A-A839-BF67C7572739}"/>
-              </a:ext>
-            </a:extLst>
-          </p:cNvPr>
-          <p:cNvPicPr>
-            <a:picLocks noChangeAspect="1"/>
-          </p:cNvPicPr>
-          <p:nvPr/>
-        </p:nvPicPr>
-        <p:blipFill>
-          <a:blip r:embed="rId4"/>
-          <a:stretch>
-            <a:fillRect/>
-          </a:stretch>
-        </p:blipFill>
-        <p:spPr>
-          <a:xfrm>
-            <a:off x="1222769" y="3419179"/>
-            <a:ext cx="4394291" cy="2929527"/>
-          </a:xfrm>
-          <a:prstGeom prst="rect">
-            <a:avLst/>
-          </a:prstGeom>
-        </p:spPr>
-      </p:pic>
-      <p:pic>
-        <p:nvPicPr>
-          <p:cNvPr id="6" name="Picture 5">
-            <a:extLst>
-              <a:ext uri="{FF2B5EF4-FFF2-40B4-BE49-F238E27FC236}">
-                <a16:creationId xmlns:a16="http://schemas.microsoft.com/office/drawing/2014/main" id="{3825C4EF-0D41-8142-AF40-15C5C2EE9C2A}"/>
-              </a:ext>
-            </a:extLst>
-          </p:cNvPr>
-          <p:cNvPicPr>
-            <a:picLocks noChangeAspect="1"/>
-          </p:cNvPicPr>
-          <p:nvPr/>
-        </p:nvPicPr>
-        <p:blipFill>
-          <a:blip r:embed="rId5"/>
-          <a:stretch>
-            <a:fillRect/>
-          </a:stretch>
-        </p:blipFill>
-        <p:spPr>
-          <a:xfrm>
-            <a:off x="6689345" y="274856"/>
-            <a:ext cx="4394291" cy="2929527"/>
-          </a:xfrm>
-          <a:prstGeom prst="rect">
-            <a:avLst/>
-          </a:prstGeom>
-        </p:spPr>
-      </p:pic>
-      <p:sp>
-        <p:nvSpPr>
-          <p:cNvPr id="7" name="Slide Number Placeholder 6">
-            <a:extLst>
-              <a:ext uri="{FF2B5EF4-FFF2-40B4-BE49-F238E27FC236}">
-                <a16:creationId xmlns:a16="http://schemas.microsoft.com/office/drawing/2014/main" id="{63AF4396-BB09-2C40-8119-758B5C89192B}"/>
+        <p:txBody>
+          <a:bodyPr>
+            <a:spAutoFit/>
+          </a:bodyPr>
+          <a:lstStyle/>
+          <a:p>
+            <a:r>
+              <a:rPr lang="en-US" dirty="0"/>
+              <a:t>r</a:t>
+            </a:r>
+            <a:r>
+              <a:rPr lang="en-US" baseline="30000" dirty="0"/>
+              <a:t>2</a:t>
+            </a:r>
+            <a:r>
+              <a:rPr lang="en-US" dirty="0"/>
+              <a:t> = 27%</a:t>
+            </a:r>
+          </a:p>
+          <a:p>
+            <a:r>
+              <a:rPr lang="en-US" dirty="0"/>
+              <a:t>MAE = 188.2 Deaths per 100k</a:t>
+            </a:r>
+          </a:p>
+          <a:p>
+            <a:r>
+              <a:rPr lang="en-US" dirty="0"/>
+              <a:t>RMSE = 211.8 Deaths per 100k </a:t>
+            </a:r>
+          </a:p>
+        </p:txBody>
+      </p:sp>
+      <p:sp>
+        <p:nvSpPr>
+          <p:cNvPr id="9" name="Slide Number Placeholder 8">
+            <a:extLst>
+              <a:ext uri="{FF2B5EF4-FFF2-40B4-BE49-F238E27FC236}">
+                <a16:creationId xmlns:a16="http://schemas.microsoft.com/office/drawing/2014/main" id="{DB4E04A6-2476-E242-B085-E4C79ACF5131}"/>
               </a:ext>
             </a:extLst>
           </p:cNvPr>
@@ -5930,7 +5853,7 @@
     </p:spTree>
     <p:extLst>
       <p:ext uri="{BB962C8B-B14F-4D97-AF65-F5344CB8AC3E}">
-        <p14:creationId xmlns:p14="http://schemas.microsoft.com/office/powerpoint/2010/main" val="3761961825"/>
+        <p14:creationId xmlns:p14="http://schemas.microsoft.com/office/powerpoint/2010/main" val="4227386819"/>
       </p:ext>
     </p:extLst>
   </p:cSld>
@@ -5957,72 +5880,112 @@
           <a:chExt cx="0" cy="0"/>
         </a:xfrm>
       </p:grpSpPr>
-      <p:pic>
-        <p:nvPicPr>
-          <p:cNvPr id="2" name="Picture 1">
-            <a:extLst>
-              <a:ext uri="{FF2B5EF4-FFF2-40B4-BE49-F238E27FC236}">
-                <a16:creationId xmlns:a16="http://schemas.microsoft.com/office/drawing/2014/main" id="{466CE6E6-EB1C-2348-A58E-28407FDBF295}"/>
-              </a:ext>
-            </a:extLst>
-          </p:cNvPr>
-          <p:cNvPicPr>
-            <a:picLocks noChangeAspect="1"/>
-          </p:cNvPicPr>
-          <p:nvPr/>
-        </p:nvPicPr>
-        <p:blipFill>
-          <a:blip r:embed="rId2"/>
-          <a:stretch>
-            <a:fillRect/>
-          </a:stretch>
-        </p:blipFill>
-        <p:spPr>
-          <a:xfrm>
-            <a:off x="246982" y="1716561"/>
-            <a:ext cx="5486400" cy="3657600"/>
-          </a:xfrm>
-          <a:prstGeom prst="rect">
-            <a:avLst/>
-          </a:prstGeom>
-        </p:spPr>
-      </p:pic>
-      <p:pic>
-        <p:nvPicPr>
-          <p:cNvPr id="3" name="Picture 2">
-            <a:extLst>
-              <a:ext uri="{FF2B5EF4-FFF2-40B4-BE49-F238E27FC236}">
-                <a16:creationId xmlns:a16="http://schemas.microsoft.com/office/drawing/2014/main" id="{53C632F4-70B0-FF49-AF7C-C5950C8CB650}"/>
-              </a:ext>
-            </a:extLst>
-          </p:cNvPr>
-          <p:cNvPicPr>
-            <a:picLocks noChangeAspect="1"/>
-          </p:cNvPicPr>
-          <p:nvPr/>
-        </p:nvPicPr>
-        <p:blipFill>
-          <a:blip r:embed="rId3"/>
-          <a:stretch>
-            <a:fillRect/>
-          </a:stretch>
-        </p:blipFill>
-        <p:spPr>
-          <a:xfrm>
-            <a:off x="6259854" y="1809911"/>
-            <a:ext cx="5486400" cy="3564250"/>
-          </a:xfrm>
-          <a:prstGeom prst="rect">
-            <a:avLst/>
-          </a:prstGeom>
-        </p:spPr>
-      </p:pic>
+      <p:sp>
+        <p:nvSpPr>
+          <p:cNvPr id="2" name="Title 1">
+            <a:extLst>
+              <a:ext uri="{FF2B5EF4-FFF2-40B4-BE49-F238E27FC236}">
+                <a16:creationId xmlns:a16="http://schemas.microsoft.com/office/drawing/2014/main" id="{A9EF4D6B-D225-1947-BF09-F62D8B7A6C0A}"/>
+              </a:ext>
+            </a:extLst>
+          </p:cNvPr>
+          <p:cNvSpPr>
+            <a:spLocks noGrp="1"/>
+          </p:cNvSpPr>
+          <p:nvPr>
+            <p:ph type="title"/>
+          </p:nvPr>
+        </p:nvSpPr>
+        <p:spPr/>
+        <p:txBody>
+          <a:bodyPr/>
+          <a:lstStyle/>
+          <a:p>
+            <a:r>
+              <a:rPr lang="en-US" dirty="0"/>
+              <a:t>Model progression (on training data)</a:t>
+            </a:r>
+          </a:p>
+        </p:txBody>
+      </p:sp>
+      <p:sp>
+        <p:nvSpPr>
+          <p:cNvPr id="3" name="Content Placeholder 2">
+            <a:extLst>
+              <a:ext uri="{FF2B5EF4-FFF2-40B4-BE49-F238E27FC236}">
+                <a16:creationId xmlns:a16="http://schemas.microsoft.com/office/drawing/2014/main" id="{1ED42D3F-B8B0-8F49-96CE-9510E2F829C2}"/>
+              </a:ext>
+            </a:extLst>
+          </p:cNvPr>
+          <p:cNvSpPr>
+            <a:spLocks noGrp="1"/>
+          </p:cNvSpPr>
+          <p:nvPr>
+            <p:ph idx="1"/>
+          </p:nvPr>
+        </p:nvSpPr>
+        <p:spPr/>
+        <p:txBody>
+          <a:bodyPr>
+            <a:normAutofit lnSpcReduction="10000"/>
+          </a:bodyPr>
+          <a:lstStyle/>
+          <a:p>
+            <a:r>
+              <a:rPr lang="en-US" dirty="0"/>
+              <a:t>~0.1 with simple linear regression using most correlated features</a:t>
+            </a:r>
+          </a:p>
+          <a:p>
+            <a:r>
+              <a:rPr lang="en-US" dirty="0"/>
+              <a:t>~0.2 after reducing features manually</a:t>
+            </a:r>
+          </a:p>
+          <a:p>
+            <a:r>
+              <a:rPr lang="en-US" dirty="0"/>
+              <a:t>~0.27 after Box-Cox transform of target</a:t>
+            </a:r>
+          </a:p>
+          <a:p>
+            <a:r>
+              <a:rPr lang="en-US" dirty="0"/>
+              <a:t>~0.315 after poly transform of features</a:t>
+            </a:r>
+          </a:p>
+          <a:p>
+            <a:r>
+              <a:rPr lang="en-US" dirty="0"/>
+              <a:t>~0.36 using Lasso on poly features</a:t>
+            </a:r>
+          </a:p>
+          <a:p>
+            <a:endParaRPr lang="en-US" dirty="0"/>
+          </a:p>
+          <a:p>
+            <a:r>
+              <a:rPr lang="en-US" dirty="0"/>
+              <a:t>Ridge and Lasso were basically equivalent</a:t>
+            </a:r>
+          </a:p>
+          <a:p>
+            <a:r>
+              <a:rPr lang="en-US" dirty="0"/>
+              <a:t>I chose Lasso because it zeroed out a good amount of the polynomial features</a:t>
+            </a:r>
+          </a:p>
+          <a:p>
+            <a:endParaRPr lang="en-US" dirty="0"/>
+          </a:p>
+        </p:txBody>
+      </p:sp>
       <p:sp>
         <p:nvSpPr>
           <p:cNvPr id="4" name="Slide Number Placeholder 3">
             <a:extLst>
               <a:ext uri="{FF2B5EF4-FFF2-40B4-BE49-F238E27FC236}">
-                <a16:creationId xmlns:a16="http://schemas.microsoft.com/office/drawing/2014/main" id="{C8A3CCA7-095D-0F4A-AF2E-A41DF9B31796}"/>
+                <a16:creationId xmlns:a16="http://schemas.microsoft.com/office/drawing/2014/main" id="{08D5CBD8-55DC-2C4A-B95D-0DAE3CF0F4FC}"/>
               </a:ext>
             </a:extLst>
           </p:cNvPr>
@@ -6049,7 +6012,7 @@
     </p:spTree>
     <p:extLst>
       <p:ext uri="{BB962C8B-B14F-4D97-AF65-F5344CB8AC3E}">
-        <p14:creationId xmlns:p14="http://schemas.microsoft.com/office/powerpoint/2010/main" val="2008309720"/>
+        <p14:creationId xmlns:p14="http://schemas.microsoft.com/office/powerpoint/2010/main" val="1178381554"/>
       </p:ext>
     </p:extLst>
   </p:cSld>
@@ -6078,10 +6041,10 @@
       </p:grpSpPr>
       <p:pic>
         <p:nvPicPr>
-          <p:cNvPr id="4" name="Picture 3">
-            <a:extLst>
-              <a:ext uri="{FF2B5EF4-FFF2-40B4-BE49-F238E27FC236}">
-                <a16:creationId xmlns:a16="http://schemas.microsoft.com/office/drawing/2014/main" id="{4714B567-E754-1347-91AD-9CB41C191AA7}"/>
+          <p:cNvPr id="2" name="Picture 1">
+            <a:extLst>
+              <a:ext uri="{FF2B5EF4-FFF2-40B4-BE49-F238E27FC236}">
+                <a16:creationId xmlns:a16="http://schemas.microsoft.com/office/drawing/2014/main" id="{D7E046CB-B5A6-A64B-8FFA-27B229994121}"/>
               </a:ext>
             </a:extLst>
           </p:cNvPr>
@@ -6098,20 +6061,110 @@
         </p:blipFill>
         <p:spPr>
           <a:xfrm>
-            <a:off x="3304800" y="0"/>
-            <a:ext cx="5101225" cy="6858000"/>
+            <a:off x="760212" y="453934"/>
+            <a:ext cx="5486400" cy="2648606"/>
           </a:xfrm>
           <a:prstGeom prst="rect">
             <a:avLst/>
           </a:prstGeom>
         </p:spPr>
       </p:pic>
-      <p:sp>
-        <p:nvSpPr>
-          <p:cNvPr id="5" name="Slide Number Placeholder 4">
-            <a:extLst>
-              <a:ext uri="{FF2B5EF4-FFF2-40B4-BE49-F238E27FC236}">
-                <a16:creationId xmlns:a16="http://schemas.microsoft.com/office/drawing/2014/main" id="{E642C78A-1DEE-EF4E-8D68-79600ACDE975}"/>
+      <p:pic>
+        <p:nvPicPr>
+          <p:cNvPr id="4" name="Picture 3">
+            <a:extLst>
+              <a:ext uri="{FF2B5EF4-FFF2-40B4-BE49-F238E27FC236}">
+                <a16:creationId xmlns:a16="http://schemas.microsoft.com/office/drawing/2014/main" id="{A7C447CE-EFDB-D748-9A41-78DF9B9E2BE0}"/>
+              </a:ext>
+            </a:extLst>
+          </p:cNvPr>
+          <p:cNvPicPr>
+            <a:picLocks noChangeAspect="1"/>
+          </p:cNvPicPr>
+          <p:nvPr/>
+        </p:nvPicPr>
+        <p:blipFill>
+          <a:blip r:embed="rId3"/>
+          <a:stretch>
+            <a:fillRect/>
+          </a:stretch>
+        </p:blipFill>
+        <p:spPr>
+          <a:xfrm>
+            <a:off x="6891002" y="3644987"/>
+            <a:ext cx="4386598" cy="2711363"/>
+          </a:xfrm>
+          <a:prstGeom prst="rect">
+            <a:avLst/>
+          </a:prstGeom>
+        </p:spPr>
+      </p:pic>
+      <p:pic>
+        <p:nvPicPr>
+          <p:cNvPr id="5" name="Picture 4">
+            <a:extLst>
+              <a:ext uri="{FF2B5EF4-FFF2-40B4-BE49-F238E27FC236}">
+                <a16:creationId xmlns:a16="http://schemas.microsoft.com/office/drawing/2014/main" id="{87C18726-1E54-3A4A-A839-BF67C7572739}"/>
+              </a:ext>
+            </a:extLst>
+          </p:cNvPr>
+          <p:cNvPicPr>
+            <a:picLocks noChangeAspect="1"/>
+          </p:cNvPicPr>
+          <p:nvPr/>
+        </p:nvPicPr>
+        <p:blipFill>
+          <a:blip r:embed="rId4"/>
+          <a:stretch>
+            <a:fillRect/>
+          </a:stretch>
+        </p:blipFill>
+        <p:spPr>
+          <a:xfrm>
+            <a:off x="1219640" y="3532773"/>
+            <a:ext cx="4275703" cy="2823577"/>
+          </a:xfrm>
+          <a:prstGeom prst="rect">
+            <a:avLst/>
+          </a:prstGeom>
+        </p:spPr>
+      </p:pic>
+      <p:pic>
+        <p:nvPicPr>
+          <p:cNvPr id="6" name="Picture 5">
+            <a:extLst>
+              <a:ext uri="{FF2B5EF4-FFF2-40B4-BE49-F238E27FC236}">
+                <a16:creationId xmlns:a16="http://schemas.microsoft.com/office/drawing/2014/main" id="{3825C4EF-0D41-8142-AF40-15C5C2EE9C2A}"/>
+              </a:ext>
+            </a:extLst>
+          </p:cNvPr>
+          <p:cNvPicPr>
+            <a:picLocks noChangeAspect="1"/>
+          </p:cNvPicPr>
+          <p:nvPr/>
+        </p:nvPicPr>
+        <p:blipFill>
+          <a:blip r:embed="rId5"/>
+          <a:stretch>
+            <a:fillRect/>
+          </a:stretch>
+        </p:blipFill>
+        <p:spPr>
+          <a:xfrm>
+            <a:off x="6689345" y="288674"/>
+            <a:ext cx="4394291" cy="2901890"/>
+          </a:xfrm>
+          <a:prstGeom prst="rect">
+            <a:avLst/>
+          </a:prstGeom>
+        </p:spPr>
+      </p:pic>
+      <p:sp>
+        <p:nvSpPr>
+          <p:cNvPr id="7" name="Slide Number Placeholder 6">
+            <a:extLst>
+              <a:ext uri="{FF2B5EF4-FFF2-40B4-BE49-F238E27FC236}">
+                <a16:creationId xmlns:a16="http://schemas.microsoft.com/office/drawing/2014/main" id="{63AF4396-BB09-2C40-8119-758B5C89192B}"/>
               </a:ext>
             </a:extLst>
           </p:cNvPr>
@@ -6138,7 +6191,7 @@
     </p:spTree>
     <p:extLst>
       <p:ext uri="{BB962C8B-B14F-4D97-AF65-F5344CB8AC3E}">
-        <p14:creationId xmlns:p14="http://schemas.microsoft.com/office/powerpoint/2010/main" val="2917722473"/>
+        <p14:creationId xmlns:p14="http://schemas.microsoft.com/office/powerpoint/2010/main" val="3761961825"/>
       </p:ext>
     </p:extLst>
   </p:cSld>
@@ -6167,10 +6220,10 @@
       </p:grpSpPr>
       <p:pic>
         <p:nvPicPr>
-          <p:cNvPr id="4" name="Picture 3">
-            <a:extLst>
-              <a:ext uri="{FF2B5EF4-FFF2-40B4-BE49-F238E27FC236}">
-                <a16:creationId xmlns:a16="http://schemas.microsoft.com/office/drawing/2014/main" id="{6A68E8BB-01C5-274B-96EF-2C6210A90403}"/>
+          <p:cNvPr id="2" name="Picture 1">
+            <a:extLst>
+              <a:ext uri="{FF2B5EF4-FFF2-40B4-BE49-F238E27FC236}">
+                <a16:creationId xmlns:a16="http://schemas.microsoft.com/office/drawing/2014/main" id="{466CE6E6-EB1C-2348-A58E-28407FDBF295}"/>
               </a:ext>
             </a:extLst>
           </p:cNvPr>
@@ -6187,20 +6240,50 @@
         </p:blipFill>
         <p:spPr>
           <a:xfrm>
-            <a:off x="1712708" y="0"/>
-            <a:ext cx="7123431" cy="6858000"/>
+            <a:off x="246982" y="1733814"/>
+            <a:ext cx="5486400" cy="3623094"/>
           </a:xfrm>
           <a:prstGeom prst="rect">
             <a:avLst/>
           </a:prstGeom>
         </p:spPr>
       </p:pic>
-      <p:sp>
-        <p:nvSpPr>
-          <p:cNvPr id="5" name="Slide Number Placeholder 4">
-            <a:extLst>
-              <a:ext uri="{FF2B5EF4-FFF2-40B4-BE49-F238E27FC236}">
-                <a16:creationId xmlns:a16="http://schemas.microsoft.com/office/drawing/2014/main" id="{536E3E86-48D0-0E4A-89A6-DD5CAC8357C1}"/>
+      <p:pic>
+        <p:nvPicPr>
+          <p:cNvPr id="3" name="Picture 2">
+            <a:extLst>
+              <a:ext uri="{FF2B5EF4-FFF2-40B4-BE49-F238E27FC236}">
+                <a16:creationId xmlns:a16="http://schemas.microsoft.com/office/drawing/2014/main" id="{53C632F4-70B0-FF49-AF7C-C5950C8CB650}"/>
+              </a:ext>
+            </a:extLst>
+          </p:cNvPr>
+          <p:cNvPicPr>
+            <a:picLocks noChangeAspect="1"/>
+          </p:cNvPicPr>
+          <p:nvPr/>
+        </p:nvPicPr>
+        <p:blipFill>
+          <a:blip r:embed="rId3"/>
+          <a:stretch>
+            <a:fillRect/>
+          </a:stretch>
+        </p:blipFill>
+        <p:spPr>
+          <a:xfrm>
+            <a:off x="6259854" y="1809911"/>
+            <a:ext cx="5486400" cy="3564250"/>
+          </a:xfrm>
+          <a:prstGeom prst="rect">
+            <a:avLst/>
+          </a:prstGeom>
+        </p:spPr>
+      </p:pic>
+      <p:sp>
+        <p:nvSpPr>
+          <p:cNvPr id="4" name="Slide Number Placeholder 3">
+            <a:extLst>
+              <a:ext uri="{FF2B5EF4-FFF2-40B4-BE49-F238E27FC236}">
+                <a16:creationId xmlns:a16="http://schemas.microsoft.com/office/drawing/2014/main" id="{C8A3CCA7-095D-0F4A-AF2E-A41DF9B31796}"/>
               </a:ext>
             </a:extLst>
           </p:cNvPr>
@@ -6227,7 +6310,7 @@
     </p:spTree>
     <p:extLst>
       <p:ext uri="{BB962C8B-B14F-4D97-AF65-F5344CB8AC3E}">
-        <p14:creationId xmlns:p14="http://schemas.microsoft.com/office/powerpoint/2010/main" val="2753849097"/>
+        <p14:creationId xmlns:p14="http://schemas.microsoft.com/office/powerpoint/2010/main" val="2008309720"/>
       </p:ext>
     </p:extLst>
   </p:cSld>
@@ -6352,6 +6435,26 @@
               <a:rPr lang="en-US" dirty="0"/>
               <a:t> repository</a:t>
             </a:r>
+          </a:p>
+          <a:p>
+            <a:pPr lvl="1"/>
+            <a:r>
+              <a:rPr lang="en-US" dirty="0"/>
+              <a:t>Dated 1/18/2021</a:t>
+            </a:r>
+          </a:p>
+          <a:p>
+            <a:pPr lvl="1"/>
+            <a:r>
+              <a:rPr lang="en-US" dirty="0"/>
+              <a:t>~3000 counties</a:t>
+            </a:r>
+          </a:p>
+          <a:p>
+            <a:pPr marL="457200" lvl="1" indent="0">
+              <a:buNone/>
+            </a:pPr>
+            <a:endParaRPr lang="en-US" dirty="0"/>
           </a:p>
           <a:p>
             <a:pPr marL="0" indent="0">
@@ -6444,6 +6547,184 @@
       </p:grpSpPr>
       <p:pic>
         <p:nvPicPr>
+          <p:cNvPr id="4" name="Picture 3">
+            <a:extLst>
+              <a:ext uri="{FF2B5EF4-FFF2-40B4-BE49-F238E27FC236}">
+                <a16:creationId xmlns:a16="http://schemas.microsoft.com/office/drawing/2014/main" id="{4714B567-E754-1347-91AD-9CB41C191AA7}"/>
+              </a:ext>
+            </a:extLst>
+          </p:cNvPr>
+          <p:cNvPicPr>
+            <a:picLocks noChangeAspect="1"/>
+          </p:cNvPicPr>
+          <p:nvPr/>
+        </p:nvPicPr>
+        <p:blipFill>
+          <a:blip r:embed="rId2"/>
+          <a:stretch>
+            <a:fillRect/>
+          </a:stretch>
+        </p:blipFill>
+        <p:spPr>
+          <a:xfrm>
+            <a:off x="3304800" y="0"/>
+            <a:ext cx="5101225" cy="6858000"/>
+          </a:xfrm>
+          <a:prstGeom prst="rect">
+            <a:avLst/>
+          </a:prstGeom>
+        </p:spPr>
+      </p:pic>
+      <p:sp>
+        <p:nvSpPr>
+          <p:cNvPr id="5" name="Slide Number Placeholder 4">
+            <a:extLst>
+              <a:ext uri="{FF2B5EF4-FFF2-40B4-BE49-F238E27FC236}">
+                <a16:creationId xmlns:a16="http://schemas.microsoft.com/office/drawing/2014/main" id="{E642C78A-1DEE-EF4E-8D68-79600ACDE975}"/>
+              </a:ext>
+            </a:extLst>
+          </p:cNvPr>
+          <p:cNvSpPr>
+            <a:spLocks noGrp="1"/>
+          </p:cNvSpPr>
+          <p:nvPr>
+            <p:ph type="sldNum" sz="quarter" idx="12"/>
+          </p:nvPr>
+        </p:nvSpPr>
+        <p:spPr/>
+        <p:txBody>
+          <a:bodyPr/>
+          <a:lstStyle/>
+          <a:p>
+            <a:fld id="{609275CF-5549-3C4A-B9B9-4367A562B0FC}" type="slidenum">
+              <a:rPr lang="en-US" smtClean="0"/>
+              <a:t>20</a:t>
+            </a:fld>
+            <a:endParaRPr lang="en-US"/>
+          </a:p>
+        </p:txBody>
+      </p:sp>
+    </p:spTree>
+    <p:extLst>
+      <p:ext uri="{BB962C8B-B14F-4D97-AF65-F5344CB8AC3E}">
+        <p14:creationId xmlns:p14="http://schemas.microsoft.com/office/powerpoint/2010/main" val="2917722473"/>
+      </p:ext>
+    </p:extLst>
+  </p:cSld>
+  <p:clrMapOvr>
+    <a:masterClrMapping/>
+  </p:clrMapOvr>
+</p:sld>
+</file>
+
+<file path=ppt/slides/slide21.xml><?xml version="1.0" encoding="utf-8"?>
+<p:sld xmlns:a="http://schemas.openxmlformats.org/drawingml/2006/main" xmlns:r="http://schemas.openxmlformats.org/officeDocument/2006/relationships" xmlns:p="http://schemas.openxmlformats.org/presentationml/2006/main">
+  <p:cSld>
+    <p:spTree>
+      <p:nvGrpSpPr>
+        <p:cNvPr id="1" name=""/>
+        <p:cNvGrpSpPr/>
+        <p:nvPr/>
+      </p:nvGrpSpPr>
+      <p:grpSpPr>
+        <a:xfrm>
+          <a:off x="0" y="0"/>
+          <a:ext cx="0" cy="0"/>
+          <a:chOff x="0" y="0"/>
+          <a:chExt cx="0" cy="0"/>
+        </a:xfrm>
+      </p:grpSpPr>
+      <p:pic>
+        <p:nvPicPr>
+          <p:cNvPr id="4" name="Picture 3">
+            <a:extLst>
+              <a:ext uri="{FF2B5EF4-FFF2-40B4-BE49-F238E27FC236}">
+                <a16:creationId xmlns:a16="http://schemas.microsoft.com/office/drawing/2014/main" id="{6A68E8BB-01C5-274B-96EF-2C6210A90403}"/>
+              </a:ext>
+            </a:extLst>
+          </p:cNvPr>
+          <p:cNvPicPr>
+            <a:picLocks noChangeAspect="1"/>
+          </p:cNvPicPr>
+          <p:nvPr/>
+        </p:nvPicPr>
+        <p:blipFill>
+          <a:blip r:embed="rId2"/>
+          <a:stretch>
+            <a:fillRect/>
+          </a:stretch>
+        </p:blipFill>
+        <p:spPr>
+          <a:xfrm>
+            <a:off x="1712708" y="0"/>
+            <a:ext cx="7123431" cy="6858000"/>
+          </a:xfrm>
+          <a:prstGeom prst="rect">
+            <a:avLst/>
+          </a:prstGeom>
+        </p:spPr>
+      </p:pic>
+      <p:sp>
+        <p:nvSpPr>
+          <p:cNvPr id="5" name="Slide Number Placeholder 4">
+            <a:extLst>
+              <a:ext uri="{FF2B5EF4-FFF2-40B4-BE49-F238E27FC236}">
+                <a16:creationId xmlns:a16="http://schemas.microsoft.com/office/drawing/2014/main" id="{536E3E86-48D0-0E4A-89A6-DD5CAC8357C1}"/>
+              </a:ext>
+            </a:extLst>
+          </p:cNvPr>
+          <p:cNvSpPr>
+            <a:spLocks noGrp="1"/>
+          </p:cNvSpPr>
+          <p:nvPr>
+            <p:ph type="sldNum" sz="quarter" idx="12"/>
+          </p:nvPr>
+        </p:nvSpPr>
+        <p:spPr/>
+        <p:txBody>
+          <a:bodyPr/>
+          <a:lstStyle/>
+          <a:p>
+            <a:fld id="{609275CF-5549-3C4A-B9B9-4367A562B0FC}" type="slidenum">
+              <a:rPr lang="en-US" smtClean="0"/>
+              <a:t>21</a:t>
+            </a:fld>
+            <a:endParaRPr lang="en-US"/>
+          </a:p>
+        </p:txBody>
+      </p:sp>
+    </p:spTree>
+    <p:extLst>
+      <p:ext uri="{BB962C8B-B14F-4D97-AF65-F5344CB8AC3E}">
+        <p14:creationId xmlns:p14="http://schemas.microsoft.com/office/powerpoint/2010/main" val="2753849097"/>
+      </p:ext>
+    </p:extLst>
+  </p:cSld>
+  <p:clrMapOvr>
+    <a:masterClrMapping/>
+  </p:clrMapOvr>
+</p:sld>
+</file>
+
+<file path=ppt/slides/slide22.xml><?xml version="1.0" encoding="utf-8"?>
+<p:sld xmlns:a="http://schemas.openxmlformats.org/drawingml/2006/main" xmlns:r="http://schemas.openxmlformats.org/officeDocument/2006/relationships" xmlns:p="http://schemas.openxmlformats.org/presentationml/2006/main">
+  <p:cSld>
+    <p:spTree>
+      <p:nvGrpSpPr>
+        <p:cNvPr id="1" name=""/>
+        <p:cNvGrpSpPr/>
+        <p:nvPr/>
+      </p:nvGrpSpPr>
+      <p:grpSpPr>
+        <a:xfrm>
+          <a:off x="0" y="0"/>
+          <a:ext cx="0" cy="0"/>
+          <a:chOff x="0" y="0"/>
+          <a:chExt cx="0" cy="0"/>
+        </a:xfrm>
+      </p:grpSpPr>
+      <p:pic>
+        <p:nvPicPr>
           <p:cNvPr id="5" name="Picture 4">
             <a:extLst>
               <a:ext uri="{FF2B5EF4-FFF2-40B4-BE49-F238E27FC236}">
@@ -6530,7 +6811,7 @@
           <a:p>
             <a:fld id="{609275CF-5549-3C4A-B9B9-4367A562B0FC}" type="slidenum">
               <a:rPr lang="en-US" smtClean="0"/>
-              <a:t>20</a:t>
+              <a:t>22</a:t>
             </a:fld>
             <a:endParaRPr lang="en-US"/>
           </a:p>
@@ -6977,7 +7258,7 @@
           <a:p>
             <a:r>
               <a:rPr lang="en-US" dirty="0"/>
-              <a:t>Health </a:t>
+              <a:t>Health care</a:t>
             </a:r>
           </a:p>
           <a:p>
@@ -8030,8 +8311,8 @@
         </p:blipFill>
         <p:spPr>
           <a:xfrm>
-            <a:off x="136533" y="3617383"/>
-            <a:ext cx="6093455" cy="3068646"/>
+            <a:off x="66145" y="3698798"/>
+            <a:ext cx="6163843" cy="3104093"/>
           </a:xfrm>
           <a:prstGeom prst="rect">
             <a:avLst/>
@@ -8060,8 +8341,8 @@
         </p:blipFill>
         <p:spPr>
           <a:xfrm>
-            <a:off x="6575787" y="3617382"/>
-            <a:ext cx="5172862" cy="3068647"/>
+            <a:off x="6547601" y="3683296"/>
+            <a:ext cx="5205085" cy="3087762"/>
           </a:xfrm>
           <a:prstGeom prst="rect">
             <a:avLst/>
@@ -8090,8 +8371,8 @@
         </p:blipFill>
         <p:spPr>
           <a:xfrm>
-            <a:off x="554177" y="278514"/>
-            <a:ext cx="4779704" cy="3186469"/>
+            <a:off x="472292" y="278514"/>
+            <a:ext cx="4756933" cy="3141371"/>
           </a:xfrm>
           <a:prstGeom prst="rect">
             <a:avLst/>
@@ -8120,8 +8401,8 @@
         </p:blipFill>
         <p:spPr>
           <a:xfrm>
-            <a:off x="6229988" y="278514"/>
-            <a:ext cx="5852348" cy="3068646"/>
+            <a:off x="6223970" y="278514"/>
+            <a:ext cx="5852346" cy="3068646"/>
           </a:xfrm>
           <a:prstGeom prst="rect">
             <a:avLst/>
@@ -8255,13 +8536,7 @@
           <a:p>
             <a:r>
               <a:rPr lang="en-US" dirty="0"/>
-              <a:t>Ultimately I selected the model which performed the best, regardless of complexity</a:t>
-            </a:r>
-          </a:p>
-          <a:p>
-            <a:r>
-              <a:rPr lang="en-US" dirty="0"/>
-              <a:t>Including all poly features, not just interaction terms</a:t>
+              <a:t>Polynomial degree 2, including all poly features, not just interaction terms</a:t>
             </a:r>
           </a:p>
           <a:p>
@@ -8277,7 +8552,13 @@
           <a:p>
             <a:r>
               <a:rPr lang="en-US" dirty="0"/>
-              <a:t>I chose this model because this was an analysis on life/death data, and every little bit matters</a:t>
+              <a:t>Ultimately I selected the model which performed the best, regardless of complexity</a:t>
+            </a:r>
+          </a:p>
+          <a:p>
+            <a:r>
+              <a:rPr lang="en-US" dirty="0"/>
+              <a:t>I decided this because this was an analysis on life/death data, and every little bit matters</a:t>
             </a:r>
           </a:p>
           <a:p>
@@ -8426,7 +8707,7 @@
         <p:spPr>
           <a:xfrm>
             <a:off x="6677891" y="4114799"/>
-            <a:ext cx="5112327" cy="1446550"/>
+            <a:ext cx="5112327" cy="1785104"/>
           </a:xfrm>
           <a:prstGeom prst="rect">
             <a:avLst/>
@@ -8445,7 +8726,7 @@
             </a:pPr>
             <a:r>
               <a:rPr lang="en-US" sz="2200" dirty="0"/>
-              <a:t>Residuals are relatively happy</a:t>
+              <a:t>The predicted vs actual plot shows that my model tends to overestimate the number of deaths</a:t>
             </a:r>
           </a:p>
           <a:p>
@@ -8455,7 +8736,17 @@
             </a:pPr>
             <a:r>
               <a:rPr lang="en-US" sz="2200" dirty="0"/>
-              <a:t>The predicted vs actual plot shows that my model tends to overestimate the number of deaths</a:t>
+              <a:t>Residuals are relatively happy</a:t>
+            </a:r>
+          </a:p>
+          <a:p>
+            <a:pPr marL="285750" indent="-285750">
+              <a:buFont typeface="Arial" panose="020B0604020202020204" pitchFamily="34" charset="0"/>
+              <a:buChar char="•"/>
+            </a:pPr>
+            <a:r>
+              <a:rPr lang="en-US" sz="2200" dirty="0"/>
+              <a:t>Variance is high</a:t>
             </a:r>
           </a:p>
         </p:txBody>
@@ -8519,6 +8810,45 @@
               <a:t>9</a:t>
             </a:fld>
             <a:endParaRPr lang="en-US"/>
+          </a:p>
+        </p:txBody>
+      </p:sp>
+      <p:sp>
+        <p:nvSpPr>
+          <p:cNvPr id="39" name="TextBox 38">
+            <a:extLst>
+              <a:ext uri="{FF2B5EF4-FFF2-40B4-BE49-F238E27FC236}">
+                <a16:creationId xmlns:a16="http://schemas.microsoft.com/office/drawing/2014/main" id="{7A4D2DAD-5151-A648-AEF9-F1E6EF0E3F30}"/>
+              </a:ext>
+            </a:extLst>
+          </p:cNvPr>
+          <p:cNvSpPr txBox="1"/>
+          <p:nvPr/>
+        </p:nvSpPr>
+        <p:spPr>
+          <a:xfrm>
+            <a:off x="5283059" y="3913912"/>
+            <a:ext cx="503664" cy="369332"/>
+          </a:xfrm>
+          <a:prstGeom prst="rect">
+            <a:avLst/>
+          </a:prstGeom>
+          <a:noFill/>
+        </p:spPr>
+        <p:txBody>
+          <a:bodyPr wrap="none" rtlCol="0">
+            <a:spAutoFit/>
+          </a:bodyPr>
+          <a:lstStyle/>
+          <a:p>
+            <a:r>
+              <a:rPr lang="en-US" dirty="0">
+                <a:solidFill>
+                  <a:srgbClr val="FF0000"/>
+                </a:solidFill>
+              </a:rPr>
+              <a:t>y=x</a:t>
+            </a:r>
           </a:p>
         </p:txBody>
       </p:sp>

</xml_diff>

<commit_message>
Slight updates to presentation.
</commit_message>
<xml_diff>
--- a/Presentation/CovidProjectPresentation.pptx
+++ b/Presentation/CovidProjectPresentation.pptx
@@ -4991,7 +4991,7 @@
             </a:r>
             <a:r>
               <a:rPr lang="en-US" dirty="0"/>
-              <a:t> = 32% on the test data</a:t>
+              <a:t> = 36% on training data, 32% on the test data</a:t>
             </a:r>
           </a:p>
           <a:p>
@@ -5127,8 +5127,16 @@
         </p:nvSpPr>
         <p:spPr/>
         <p:txBody>
-          <a:bodyPr/>
-          <a:lstStyle/>
+          <a:bodyPr>
+            <a:normAutofit/>
+          </a:bodyPr>
+          <a:lstStyle/>
+          <a:p>
+            <a:r>
+              <a:rPr lang="en-US" dirty="0"/>
+              <a:t>Investigate trend of model to overestimate the number of deaths</a:t>
+            </a:r>
+          </a:p>
           <a:p>
             <a:r>
               <a:rPr lang="en-US" dirty="0"/>
@@ -5155,30 +5163,6 @@
               <a:rPr lang="en-US" dirty="0"/>
               <a:t>Finer granularity: cities or census tracts</a:t>
             </a:r>
-          </a:p>
-          <a:p>
-            <a:r>
-              <a:rPr lang="en-US" dirty="0"/>
-              <a:t>This analysis workflow could be applied on other target variables entirely since census data is pretty general</a:t>
-            </a:r>
-          </a:p>
-          <a:p>
-            <a:pPr lvl="1"/>
-            <a:r>
-              <a:rPr lang="en-US" dirty="0"/>
-              <a:t>Other diseases</a:t>
-            </a:r>
-          </a:p>
-          <a:p>
-            <a:pPr lvl="1"/>
-            <a:r>
-              <a:rPr lang="en-US" dirty="0"/>
-              <a:t>Business focus</a:t>
-            </a:r>
-          </a:p>
-          <a:p>
-            <a:pPr lvl="1"/>
-            <a:endParaRPr lang="en-US" dirty="0"/>
           </a:p>
         </p:txBody>
       </p:sp>
@@ -8524,7 +8508,7 @@
         <p:spPr/>
         <p:txBody>
           <a:bodyPr>
-            <a:normAutofit/>
+            <a:normAutofit lnSpcReduction="10000"/>
           </a:bodyPr>
           <a:lstStyle/>
           <a:p>
@@ -8556,9 +8540,23 @@
             </a:r>
           </a:p>
           <a:p>
+            <a:pPr lvl="1"/>
+            <a:r>
+              <a:rPr lang="en-US" dirty="0"/>
+              <a:t>Verified with cross validation</a:t>
+            </a:r>
+          </a:p>
+          <a:p>
             <a:r>
               <a:rPr lang="en-US" dirty="0"/>
               <a:t>I decided this because this was an analysis on life/death data, and every little bit matters</a:t>
+            </a:r>
+          </a:p>
+          <a:p>
+            <a:pPr lvl="1"/>
+            <a:r>
+              <a:rPr lang="en-US" dirty="0"/>
+              <a:t>Did choose Lasso over Ridge for better interpretability</a:t>
             </a:r>
           </a:p>
           <a:p>

</xml_diff>